<commit_message>
Adafruit IO und IFTTT Ergänzungen
</commit_message>
<xml_diff>
--- a/PES_FH_VERS.pptx
+++ b/PES_FH_VERS.pptx
@@ -6,10 +6,10 @@
     <p:sldMasterId id="2147483666" r:id="rId2"/>
   </p:sldMasterIdLst>
   <p:notesMasterIdLst>
-    <p:notesMasterId r:id="rId40"/>
+    <p:notesMasterId r:id="rId49"/>
   </p:notesMasterIdLst>
   <p:handoutMasterIdLst>
-    <p:handoutMasterId r:id="rId41"/>
+    <p:handoutMasterId r:id="rId50"/>
   </p:handoutMasterIdLst>
   <p:sldIdLst>
     <p:sldId id="256" r:id="rId3"/>
@@ -40,15 +40,24 @@
     <p:sldId id="349" r:id="rId28"/>
     <p:sldId id="350" r:id="rId29"/>
     <p:sldId id="351" r:id="rId30"/>
-    <p:sldId id="329" r:id="rId31"/>
-    <p:sldId id="330" r:id="rId32"/>
-    <p:sldId id="331" r:id="rId33"/>
-    <p:sldId id="332" r:id="rId34"/>
-    <p:sldId id="334" r:id="rId35"/>
-    <p:sldId id="333" r:id="rId36"/>
-    <p:sldId id="335" r:id="rId37"/>
-    <p:sldId id="336" r:id="rId38"/>
-    <p:sldId id="337" r:id="rId39"/>
+    <p:sldId id="352" r:id="rId31"/>
+    <p:sldId id="353" r:id="rId32"/>
+    <p:sldId id="354" r:id="rId33"/>
+    <p:sldId id="355" r:id="rId34"/>
+    <p:sldId id="356" r:id="rId35"/>
+    <p:sldId id="332" r:id="rId36"/>
+    <p:sldId id="334" r:id="rId37"/>
+    <p:sldId id="335" r:id="rId38"/>
+    <p:sldId id="330" r:id="rId39"/>
+    <p:sldId id="333" r:id="rId40"/>
+    <p:sldId id="357" r:id="rId41"/>
+    <p:sldId id="358" r:id="rId42"/>
+    <p:sldId id="359" r:id="rId43"/>
+    <p:sldId id="360" r:id="rId44"/>
+    <p:sldId id="337" r:id="rId45"/>
+    <p:sldId id="329" r:id="rId46"/>
+    <p:sldId id="331" r:id="rId47"/>
+    <p:sldId id="336" r:id="rId48"/>
   </p:sldIdLst>
   <p:sldSz cx="9144000" cy="6858000" type="screen4x3"/>
   <p:notesSz cx="6858000" cy="9144000"/>
@@ -210,15 +219,24 @@
             <p14:sldId id="349"/>
             <p14:sldId id="350"/>
             <p14:sldId id="351"/>
-            <p14:sldId id="329"/>
-            <p14:sldId id="330"/>
-            <p14:sldId id="331"/>
+            <p14:sldId id="352"/>
+            <p14:sldId id="353"/>
+            <p14:sldId id="354"/>
+            <p14:sldId id="355"/>
+            <p14:sldId id="356"/>
             <p14:sldId id="332"/>
             <p14:sldId id="334"/>
+            <p14:sldId id="335"/>
+            <p14:sldId id="330"/>
             <p14:sldId id="333"/>
-            <p14:sldId id="335"/>
+            <p14:sldId id="357"/>
+            <p14:sldId id="358"/>
+            <p14:sldId id="359"/>
+            <p14:sldId id="360"/>
+            <p14:sldId id="337"/>
+            <p14:sldId id="329"/>
+            <p14:sldId id="331"/>
             <p14:sldId id="336"/>
-            <p14:sldId id="337"/>
           </p14:sldIdLst>
         </p14:section>
       </p14:sectionLst>
@@ -14955,23 +14973,7 @@
                   <a:schemeClr val="tx1"/>
                 </a:solidFill>
               </a:rPr>
-              <a:t>Screenshot des </a:t>
-            </a:r>
-            <a:r>
-              <a:rPr lang="de-DE" dirty="0" err="1">
-                <a:solidFill>
-                  <a:schemeClr val="tx1"/>
-                </a:solidFill>
-              </a:rPr>
-              <a:t>sendens</a:t>
-            </a:r>
-            <a:r>
-              <a:rPr lang="de-DE" dirty="0">
-                <a:solidFill>
-                  <a:schemeClr val="tx1"/>
-                </a:solidFill>
-              </a:rPr>
-              <a:t> !!!</a:t>
+              <a:t>Screenshot des Sendens !!!</a:t>
             </a:r>
           </a:p>
         </p:txBody>
@@ -15026,6 +15028,3352 @@
               <a:rPr lang="de-DE" smtClean="0"/>
               <a:pPr/>
               <a:t>29</a:t>
+            </a:fld>
+            <a:endParaRPr lang="de-DE" dirty="0"/>
+          </a:p>
+        </p:txBody>
+      </p:sp>
+      <p:sp>
+        <p:nvSpPr>
+          <p:cNvPr id="3" name="Textplatzhalter 2"/>
+          <p:cNvSpPr>
+            <a:spLocks noGrp="1"/>
+          </p:cNvSpPr>
+          <p:nvPr>
+            <p:ph type="body" sz="quarter" idx="15"/>
+          </p:nvPr>
+        </p:nvSpPr>
+        <p:spPr/>
+        <p:txBody>
+          <a:bodyPr/>
+          <a:lstStyle/>
+          <a:p>
+            <a:pPr marL="285750" indent="-285750">
+              <a:buFont typeface="Courier New" panose="02070309020205020404" pitchFamily="49" charset="0"/>
+              <a:buChar char="o"/>
+            </a:pPr>
+            <a:r>
+              <a:rPr lang="de-DE" dirty="0"/>
+              <a:t>Elektronik, Tools und Zubehör aus New York [6], [11]</a:t>
+            </a:r>
+          </a:p>
+          <a:p>
+            <a:pPr marL="681038" lvl="4" indent="-285750">
+              <a:buFont typeface="Arial" panose="020B0604020202020204" pitchFamily="34" charset="0"/>
+              <a:buChar char="•"/>
+            </a:pPr>
+            <a:r>
+              <a:rPr lang="de-DE" dirty="0" err="1"/>
+              <a:t>Arduino</a:t>
+            </a:r>
+            <a:r>
+              <a:rPr lang="de-DE" dirty="0"/>
+              <a:t> R3</a:t>
+            </a:r>
+          </a:p>
+          <a:p>
+            <a:pPr marL="681038" lvl="4" indent="-285750">
+              <a:buFont typeface="Arial" panose="020B0604020202020204" pitchFamily="34" charset="0"/>
+              <a:buChar char="•"/>
+            </a:pPr>
+            <a:r>
+              <a:rPr lang="de-DE" dirty="0" err="1"/>
+              <a:t>Arduino</a:t>
+            </a:r>
+            <a:r>
+              <a:rPr lang="de-DE" dirty="0"/>
+              <a:t> </a:t>
+            </a:r>
+            <a:r>
+              <a:rPr lang="de-DE" dirty="0" err="1"/>
+              <a:t>Mega</a:t>
+            </a:r>
+            <a:endParaRPr lang="de-DE" dirty="0"/>
+          </a:p>
+          <a:p>
+            <a:pPr marL="0" lvl="1" indent="0">
+              <a:buNone/>
+            </a:pPr>
+            <a:endParaRPr lang="de-DE" dirty="0"/>
+          </a:p>
+          <a:p>
+            <a:pPr marL="309563" lvl="2" indent="-285750">
+              <a:buFont typeface="Arial" panose="020B0604020202020204" pitchFamily="34" charset="0"/>
+              <a:buChar char="•"/>
+            </a:pPr>
+            <a:endParaRPr lang="de-DE" dirty="0"/>
+          </a:p>
+          <a:p>
+            <a:pPr marL="309563" lvl="2" indent="-285750">
+              <a:buFont typeface="Arial" panose="020B0604020202020204" pitchFamily="34" charset="0"/>
+              <a:buChar char="•"/>
+            </a:pPr>
+            <a:endParaRPr lang="de-DE" dirty="0"/>
+          </a:p>
+        </p:txBody>
+      </p:sp>
+      <p:sp>
+        <p:nvSpPr>
+          <p:cNvPr id="4" name="Titel 3"/>
+          <p:cNvSpPr>
+            <a:spLocks noGrp="1"/>
+          </p:cNvSpPr>
+          <p:nvPr>
+            <p:ph type="title"/>
+          </p:nvPr>
+        </p:nvSpPr>
+        <p:spPr/>
+        <p:txBody>
+          <a:bodyPr/>
+          <a:lstStyle/>
+          <a:p>
+            <a:r>
+              <a:rPr lang="de-DE" dirty="0" err="1"/>
+              <a:t>Adafruit</a:t>
+            </a:r>
+            <a:endParaRPr lang="de-DE" dirty="0"/>
+          </a:p>
+        </p:txBody>
+      </p:sp>
+      <p:sp>
+        <p:nvSpPr>
+          <p:cNvPr id="5" name="Fußzeilenplatzhalter 4"/>
+          <p:cNvSpPr>
+            <a:spLocks noGrp="1"/>
+          </p:cNvSpPr>
+          <p:nvPr>
+            <p:ph type="ftr" sz="quarter" idx="16"/>
+          </p:nvPr>
+        </p:nvSpPr>
+        <p:spPr/>
+        <p:txBody>
+          <a:bodyPr/>
+          <a:lstStyle/>
+          <a:p>
+            <a:r>
+              <a:rPr lang="en-US" altLang="de-DE"/>
+              <a:t>Hochschule Mannheim | Julia Geigl, Clemens Behr, Kevin Höfle</a:t>
+            </a:r>
+            <a:endParaRPr lang="de-DE" altLang="de-DE" dirty="0"/>
+          </a:p>
+        </p:txBody>
+      </p:sp>
+    </p:spTree>
+    <p:extLst>
+      <p:ext uri="{BB962C8B-B14F-4D97-AF65-F5344CB8AC3E}">
+        <p14:creationId xmlns:p14="http://schemas.microsoft.com/office/powerpoint/2010/main" val="316495987"/>
+      </p:ext>
+    </p:extLst>
+  </p:cSld>
+  <p:clrMapOvr>
+    <a:masterClrMapping/>
+  </p:clrMapOvr>
+  <p:transition/>
+</p:sld>
+</file>
+
+<file path=ppt/slides/slide3.xml><?xml version="1.0" encoding="utf-8"?>
+<p:sld xmlns:a="http://schemas.openxmlformats.org/drawingml/2006/main" xmlns:r="http://schemas.openxmlformats.org/officeDocument/2006/relationships" xmlns:p="http://schemas.openxmlformats.org/presentationml/2006/main">
+  <p:cSld>
+    <p:spTree>
+      <p:nvGrpSpPr>
+        <p:cNvPr id="1" name=""/>
+        <p:cNvGrpSpPr/>
+        <p:nvPr/>
+      </p:nvGrpSpPr>
+      <p:grpSpPr>
+        <a:xfrm>
+          <a:off x="0" y="0"/>
+          <a:ext cx="0" cy="0"/>
+          <a:chOff x="0" y="0"/>
+          <a:chExt cx="0" cy="0"/>
+        </a:xfrm>
+      </p:grpSpPr>
+      <p:sp>
+        <p:nvSpPr>
+          <p:cNvPr id="2" name="Foliennummernplatzhalter 1"/>
+          <p:cNvSpPr>
+            <a:spLocks noGrp="1"/>
+          </p:cNvSpPr>
+          <p:nvPr>
+            <p:ph type="sldNum" sz="quarter" idx="11"/>
+          </p:nvPr>
+        </p:nvSpPr>
+        <p:spPr/>
+        <p:txBody>
+          <a:bodyPr/>
+          <a:lstStyle/>
+          <a:p>
+            <a:fld id="{57D12BB6-0ED4-46B6-AB23-7758AD07EFBF}" type="slidenum">
+              <a:rPr lang="de-DE" smtClean="0"/>
+              <a:pPr/>
+              <a:t>3</a:t>
+            </a:fld>
+            <a:endParaRPr lang="de-DE" dirty="0"/>
+          </a:p>
+        </p:txBody>
+      </p:sp>
+      <p:sp>
+        <p:nvSpPr>
+          <p:cNvPr id="4" name="Titel 3"/>
+          <p:cNvSpPr>
+            <a:spLocks noGrp="1"/>
+          </p:cNvSpPr>
+          <p:nvPr>
+            <p:ph type="title"/>
+          </p:nvPr>
+        </p:nvSpPr>
+        <p:spPr>
+          <a:xfrm>
+            <a:off x="467544" y="2960948"/>
+            <a:ext cx="5040560" cy="863600"/>
+          </a:xfrm>
+        </p:spPr>
+        <p:txBody>
+          <a:bodyPr/>
+          <a:lstStyle/>
+          <a:p>
+            <a:r>
+              <a:rPr lang="de-DE" sz="9600" dirty="0"/>
+              <a:t>INTRO</a:t>
+            </a:r>
+            <a:br>
+              <a:rPr lang="de-DE" sz="9600" dirty="0"/>
+            </a:br>
+            <a:endParaRPr lang="de-DE" sz="9600" dirty="0"/>
+          </a:p>
+        </p:txBody>
+      </p:sp>
+      <p:sp>
+        <p:nvSpPr>
+          <p:cNvPr id="5" name="Fußzeilenplatzhalter 4"/>
+          <p:cNvSpPr>
+            <a:spLocks noGrp="1"/>
+          </p:cNvSpPr>
+          <p:nvPr>
+            <p:ph type="ftr" sz="quarter" idx="16"/>
+          </p:nvPr>
+        </p:nvSpPr>
+        <p:spPr/>
+        <p:txBody>
+          <a:bodyPr/>
+          <a:lstStyle/>
+          <a:p>
+            <a:r>
+              <a:rPr lang="en-US" altLang="de-DE"/>
+              <a:t>Hochschule Mannheim | Julia Geigl, Clemens Behr, Kevin Höfle</a:t>
+            </a:r>
+            <a:endParaRPr lang="de-DE" altLang="de-DE" dirty="0"/>
+          </a:p>
+        </p:txBody>
+      </p:sp>
+    </p:spTree>
+    <p:extLst>
+      <p:ext uri="{BB962C8B-B14F-4D97-AF65-F5344CB8AC3E}">
+        <p14:creationId xmlns:p14="http://schemas.microsoft.com/office/powerpoint/2010/main" val="2053114095"/>
+      </p:ext>
+    </p:extLst>
+  </p:cSld>
+  <p:clrMapOvr>
+    <a:masterClrMapping/>
+  </p:clrMapOvr>
+  <p:transition/>
+</p:sld>
+</file>
+
+<file path=ppt/slides/slide30.xml><?xml version="1.0" encoding="utf-8"?>
+<p:sld xmlns:a="http://schemas.openxmlformats.org/drawingml/2006/main" xmlns:r="http://schemas.openxmlformats.org/officeDocument/2006/relationships" xmlns:p="http://schemas.openxmlformats.org/presentationml/2006/main">
+  <p:cSld>
+    <p:spTree>
+      <p:nvGrpSpPr>
+        <p:cNvPr id="1" name=""/>
+        <p:cNvGrpSpPr/>
+        <p:nvPr/>
+      </p:nvGrpSpPr>
+      <p:grpSpPr>
+        <a:xfrm>
+          <a:off x="0" y="0"/>
+          <a:ext cx="0" cy="0"/>
+          <a:chOff x="0" y="0"/>
+          <a:chExt cx="0" cy="0"/>
+        </a:xfrm>
+      </p:grpSpPr>
+      <p:sp>
+        <p:nvSpPr>
+          <p:cNvPr id="2" name="Foliennummernplatzhalter 1"/>
+          <p:cNvSpPr>
+            <a:spLocks noGrp="1"/>
+          </p:cNvSpPr>
+          <p:nvPr>
+            <p:ph type="sldNum" sz="quarter" idx="11"/>
+          </p:nvPr>
+        </p:nvSpPr>
+        <p:spPr/>
+        <p:txBody>
+          <a:bodyPr/>
+          <a:lstStyle/>
+          <a:p>
+            <a:fld id="{57D12BB6-0ED4-46B6-AB23-7758AD07EFBF}" type="slidenum">
+              <a:rPr lang="de-DE" smtClean="0"/>
+              <a:pPr/>
+              <a:t>30</a:t>
+            </a:fld>
+            <a:endParaRPr lang="de-DE" dirty="0"/>
+          </a:p>
+        </p:txBody>
+      </p:sp>
+      <p:sp>
+        <p:nvSpPr>
+          <p:cNvPr id="3" name="Textplatzhalter 2"/>
+          <p:cNvSpPr>
+            <a:spLocks noGrp="1"/>
+          </p:cNvSpPr>
+          <p:nvPr>
+            <p:ph type="body" sz="quarter" idx="15"/>
+          </p:nvPr>
+        </p:nvSpPr>
+        <p:spPr>
+          <a:xfrm>
+            <a:off x="971550" y="2292349"/>
+            <a:ext cx="7740650" cy="4257675"/>
+          </a:xfrm>
+        </p:spPr>
+        <p:txBody>
+          <a:bodyPr/>
+          <a:lstStyle/>
+          <a:p>
+            <a:pPr marL="285750" indent="-285750">
+              <a:buFont typeface="Courier New" panose="02070309020205020404" pitchFamily="49" charset="0"/>
+              <a:buChar char="o"/>
+            </a:pPr>
+            <a:r>
+              <a:rPr lang="de-DE" sz="2000" dirty="0" err="1"/>
+              <a:t>IoT</a:t>
+            </a:r>
+            <a:r>
+              <a:rPr lang="de-DE" sz="2000" dirty="0"/>
+              <a:t> Plattform</a:t>
+            </a:r>
+          </a:p>
+          <a:p>
+            <a:pPr marL="495300" lvl="3" indent="-285750">
+              <a:buFont typeface="Arial" panose="020B0604020202020204" pitchFamily="34" charset="0"/>
+              <a:buChar char="•"/>
+            </a:pPr>
+            <a:r>
+              <a:rPr lang="de-DE" dirty="0"/>
+              <a:t>Einfache Bedienung</a:t>
+            </a:r>
+          </a:p>
+          <a:p>
+            <a:pPr marL="495300" lvl="3" indent="-285750">
+              <a:buFont typeface="Arial" panose="020B0604020202020204" pitchFamily="34" charset="0"/>
+              <a:buChar char="•"/>
+            </a:pPr>
+            <a:r>
+              <a:rPr lang="de-DE" dirty="0"/>
+              <a:t>Simpler Datenaustausch</a:t>
+            </a:r>
+          </a:p>
+          <a:p>
+            <a:pPr marL="495300" lvl="3" indent="-285750">
+              <a:buFont typeface="Arial" panose="020B0604020202020204" pitchFamily="34" charset="0"/>
+              <a:buChar char="•"/>
+            </a:pPr>
+            <a:r>
+              <a:rPr lang="de-DE" dirty="0"/>
+              <a:t>Kleine Programmierschnittstelle</a:t>
+            </a:r>
+          </a:p>
+          <a:p>
+            <a:pPr marL="495300" lvl="3" indent="-285750">
+              <a:buFont typeface="Arial" panose="020B0604020202020204" pitchFamily="34" charset="0"/>
+              <a:buChar char="•"/>
+            </a:pPr>
+            <a:endParaRPr lang="de-DE" dirty="0"/>
+          </a:p>
+          <a:p>
+            <a:pPr marL="125413" lvl="1" indent="-285750">
+              <a:buFont typeface="Courier New" panose="02070309020205020404" pitchFamily="49" charset="0"/>
+              <a:buChar char="o"/>
+            </a:pPr>
+            <a:r>
+              <a:rPr lang="de-DE" sz="2000" dirty="0"/>
+              <a:t>MQTT API</a:t>
+            </a:r>
+          </a:p>
+          <a:p>
+            <a:pPr marL="125413" lvl="1" indent="-285750">
+              <a:buFont typeface="Courier New" panose="02070309020205020404" pitchFamily="49" charset="0"/>
+              <a:buChar char="o"/>
+            </a:pPr>
+            <a:r>
+              <a:rPr lang="de-DE" sz="2000" dirty="0"/>
+              <a:t>REST API</a:t>
+            </a:r>
+          </a:p>
+          <a:p>
+            <a:pPr marL="495300" lvl="3" indent="-285750">
+              <a:buFont typeface="Arial" panose="020B0604020202020204" pitchFamily="34" charset="0"/>
+              <a:buChar char="•"/>
+            </a:pPr>
+            <a:endParaRPr lang="de-DE" sz="2000" dirty="0"/>
+          </a:p>
+          <a:p>
+            <a:pPr marL="309563" lvl="2" indent="-285750">
+              <a:buFont typeface="Courier New" panose="02070309020205020404" pitchFamily="49" charset="0"/>
+              <a:buChar char="o"/>
+            </a:pPr>
+            <a:r>
+              <a:rPr lang="de-DE" sz="2000" dirty="0" err="1"/>
+              <a:t>Adafruit</a:t>
+            </a:r>
+            <a:r>
+              <a:rPr lang="de-DE" sz="2000" dirty="0"/>
+              <a:t> Open Beta: </a:t>
+            </a:r>
+            <a:r>
+              <a:rPr lang="de-DE" sz="2000" dirty="0">
+                <a:hlinkClick r:id="rId2"/>
+              </a:rPr>
+              <a:t>https://io.adafruit.com/</a:t>
+            </a:r>
+            <a:r>
+              <a:rPr lang="de-DE" sz="2000" dirty="0"/>
+              <a:t> </a:t>
+            </a:r>
+            <a:endParaRPr lang="de-DE" sz="2000" dirty="0"/>
+          </a:p>
+          <a:p>
+            <a:pPr marL="495300" lvl="3" indent="-285750">
+              <a:buFont typeface="Arial" panose="020B0604020202020204" pitchFamily="34" charset="0"/>
+              <a:buChar char="•"/>
+            </a:pPr>
+            <a:endParaRPr lang="de-DE" dirty="0"/>
+          </a:p>
+          <a:p>
+            <a:pPr marL="209550" lvl="3" indent="0">
+              <a:buNone/>
+            </a:pPr>
+            <a:r>
+              <a:rPr lang="de-DE" sz="1200" dirty="0"/>
+              <a:t>API = </a:t>
+            </a:r>
+            <a:r>
+              <a:rPr lang="de-DE" sz="1200" dirty="0" err="1"/>
+              <a:t>Application</a:t>
+            </a:r>
+            <a:r>
+              <a:rPr lang="de-DE" sz="1200" dirty="0"/>
+              <a:t> </a:t>
+            </a:r>
+            <a:r>
+              <a:rPr lang="de-DE" sz="1200" dirty="0" err="1"/>
+              <a:t>Programming</a:t>
+            </a:r>
+            <a:r>
+              <a:rPr lang="de-DE" sz="1200" dirty="0"/>
+              <a:t> Interface</a:t>
+            </a:r>
+          </a:p>
+          <a:p>
+            <a:pPr marL="209550" lvl="3" indent="0">
+              <a:buNone/>
+            </a:pPr>
+            <a:r>
+              <a:rPr lang="de-DE" sz="1200" dirty="0"/>
+              <a:t>REST = </a:t>
+            </a:r>
+            <a:r>
+              <a:rPr lang="de-DE" sz="1200" dirty="0" err="1"/>
+              <a:t>Representational</a:t>
+            </a:r>
+            <a:r>
+              <a:rPr lang="de-DE" sz="1200" dirty="0"/>
+              <a:t> State Transfer</a:t>
+            </a:r>
+          </a:p>
+        </p:txBody>
+      </p:sp>
+      <p:sp>
+        <p:nvSpPr>
+          <p:cNvPr id="4" name="Titel 3"/>
+          <p:cNvSpPr>
+            <a:spLocks noGrp="1"/>
+          </p:cNvSpPr>
+          <p:nvPr>
+            <p:ph type="title"/>
+          </p:nvPr>
+        </p:nvSpPr>
+        <p:spPr/>
+        <p:txBody>
+          <a:bodyPr/>
+          <a:lstStyle/>
+          <a:p>
+            <a:r>
+              <a:rPr lang="de-DE" dirty="0" err="1"/>
+              <a:t>Adafruit</a:t>
+            </a:r>
+            <a:r>
+              <a:rPr lang="de-DE" dirty="0"/>
+              <a:t> IO </a:t>
+            </a:r>
+            <a:r>
+              <a:rPr lang="de-DE" sz="1200" b="0" dirty="0"/>
+              <a:t>[12]</a:t>
+            </a:r>
+            <a:endParaRPr lang="de-DE" b="0" dirty="0"/>
+          </a:p>
+        </p:txBody>
+      </p:sp>
+      <p:sp>
+        <p:nvSpPr>
+          <p:cNvPr id="5" name="Fußzeilenplatzhalter 4"/>
+          <p:cNvSpPr>
+            <a:spLocks noGrp="1"/>
+          </p:cNvSpPr>
+          <p:nvPr>
+            <p:ph type="ftr" sz="quarter" idx="16"/>
+          </p:nvPr>
+        </p:nvSpPr>
+        <p:spPr/>
+        <p:txBody>
+          <a:bodyPr/>
+          <a:lstStyle/>
+          <a:p>
+            <a:r>
+              <a:rPr lang="en-US" altLang="de-DE"/>
+              <a:t>Hochschule Mannheim | Julia Geigl, Clemens Behr, Kevin Höfle</a:t>
+            </a:r>
+            <a:endParaRPr lang="de-DE" altLang="de-DE" dirty="0"/>
+          </a:p>
+        </p:txBody>
+      </p:sp>
+      <p:pic>
+        <p:nvPicPr>
+          <p:cNvPr id="6" name="Picture 2" descr="Adafruit Logo"/>
+          <p:cNvPicPr>
+            <a:picLocks noChangeAspect="1" noChangeArrowheads="1"/>
+          </p:cNvPicPr>
+          <p:nvPr/>
+        </p:nvPicPr>
+        <p:blipFill>
+          <a:blip r:embed="rId3">
+            <a:extLst>
+              <a:ext uri="{28A0092B-C50C-407E-A947-70E740481C1C}">
+                <a14:useLocalDpi xmlns:a14="http://schemas.microsoft.com/office/drawing/2010/main" val="0"/>
+              </a:ext>
+            </a:extLst>
+          </a:blip>
+          <a:srcRect/>
+          <a:stretch>
+            <a:fillRect/>
+          </a:stretch>
+        </p:blipFill>
+        <p:spPr bwMode="auto">
+          <a:xfrm>
+            <a:off x="6192180" y="1542594"/>
+            <a:ext cx="2457451" cy="857251"/>
+          </a:xfrm>
+          <a:prstGeom prst="rect">
+            <a:avLst/>
+          </a:prstGeom>
+          <a:noFill/>
+          <a:extLst>
+            <a:ext uri="{909E8E84-426E-40DD-AFC4-6F175D3DCCD1}">
+              <a14:hiddenFill xmlns:a14="http://schemas.microsoft.com/office/drawing/2010/main">
+                <a:solidFill>
+                  <a:srgbClr val="FFFFFF"/>
+                </a:solidFill>
+              </a14:hiddenFill>
+            </a:ext>
+          </a:extLst>
+        </p:spPr>
+      </p:pic>
+    </p:spTree>
+    <p:extLst>
+      <p:ext uri="{BB962C8B-B14F-4D97-AF65-F5344CB8AC3E}">
+        <p14:creationId xmlns:p14="http://schemas.microsoft.com/office/powerpoint/2010/main" val="4036735921"/>
+      </p:ext>
+    </p:extLst>
+  </p:cSld>
+  <p:clrMapOvr>
+    <a:masterClrMapping/>
+  </p:clrMapOvr>
+  <p:transition/>
+</p:sld>
+</file>
+
+<file path=ppt/slides/slide31.xml><?xml version="1.0" encoding="utf-8"?>
+<p:sld xmlns:a="http://schemas.openxmlformats.org/drawingml/2006/main" xmlns:r="http://schemas.openxmlformats.org/officeDocument/2006/relationships" xmlns:p="http://schemas.openxmlformats.org/presentationml/2006/main">
+  <p:cSld>
+    <p:spTree>
+      <p:nvGrpSpPr>
+        <p:cNvPr id="1" name=""/>
+        <p:cNvGrpSpPr/>
+        <p:nvPr/>
+      </p:nvGrpSpPr>
+      <p:grpSpPr>
+        <a:xfrm>
+          <a:off x="0" y="0"/>
+          <a:ext cx="0" cy="0"/>
+          <a:chOff x="0" y="0"/>
+          <a:chExt cx="0" cy="0"/>
+        </a:xfrm>
+      </p:grpSpPr>
+      <p:sp>
+        <p:nvSpPr>
+          <p:cNvPr id="2" name="Foliennummernplatzhalter 1"/>
+          <p:cNvSpPr>
+            <a:spLocks noGrp="1"/>
+          </p:cNvSpPr>
+          <p:nvPr>
+            <p:ph type="sldNum" sz="quarter" idx="11"/>
+          </p:nvPr>
+        </p:nvSpPr>
+        <p:spPr/>
+        <p:txBody>
+          <a:bodyPr/>
+          <a:lstStyle/>
+          <a:p>
+            <a:fld id="{57D12BB6-0ED4-46B6-AB23-7758AD07EFBF}" type="slidenum">
+              <a:rPr lang="de-DE" smtClean="0"/>
+              <a:pPr/>
+              <a:t>31</a:t>
+            </a:fld>
+            <a:endParaRPr lang="de-DE" dirty="0"/>
+          </a:p>
+        </p:txBody>
+      </p:sp>
+      <p:sp>
+        <p:nvSpPr>
+          <p:cNvPr id="3" name="Textplatzhalter 2"/>
+          <p:cNvSpPr>
+            <a:spLocks noGrp="1"/>
+          </p:cNvSpPr>
+          <p:nvPr>
+            <p:ph type="body" sz="quarter" idx="15"/>
+          </p:nvPr>
+        </p:nvSpPr>
+        <p:spPr>
+          <a:xfrm>
+            <a:off x="971550" y="2292349"/>
+            <a:ext cx="7740650" cy="4257675"/>
+          </a:xfrm>
+        </p:spPr>
+        <p:txBody>
+          <a:bodyPr/>
+          <a:lstStyle/>
+          <a:p>
+            <a:pPr marL="285750" indent="-285750">
+              <a:buFont typeface="Courier New" panose="02070309020205020404" pitchFamily="49" charset="0"/>
+              <a:buChar char="o"/>
+            </a:pPr>
+            <a:r>
+              <a:rPr lang="de-DE" sz="2000" dirty="0"/>
+              <a:t>Libraries</a:t>
+            </a:r>
+          </a:p>
+          <a:p>
+            <a:pPr marL="495300" lvl="3" indent="-285750">
+              <a:buFont typeface="Arial" panose="020B0604020202020204" pitchFamily="34" charset="0"/>
+              <a:buChar char="•"/>
+            </a:pPr>
+            <a:r>
+              <a:rPr lang="de-DE" dirty="0" err="1"/>
+              <a:t>Arduino</a:t>
+            </a:r>
+            <a:endParaRPr lang="de-DE" dirty="0"/>
+          </a:p>
+          <a:p>
+            <a:pPr marL="495300" lvl="3" indent="-285750">
+              <a:buFont typeface="Arial" panose="020B0604020202020204" pitchFamily="34" charset="0"/>
+              <a:buChar char="•"/>
+            </a:pPr>
+            <a:r>
+              <a:rPr lang="de-DE" dirty="0"/>
+              <a:t>Ruby</a:t>
+            </a:r>
+          </a:p>
+          <a:p>
+            <a:pPr marL="495300" lvl="3" indent="-285750">
+              <a:buFont typeface="Arial" panose="020B0604020202020204" pitchFamily="34" charset="0"/>
+              <a:buChar char="•"/>
+            </a:pPr>
+            <a:r>
+              <a:rPr lang="de-DE" dirty="0"/>
+              <a:t>Python</a:t>
+            </a:r>
+          </a:p>
+          <a:p>
+            <a:pPr marL="495300" lvl="3" indent="-285750">
+              <a:buFont typeface="Arial" panose="020B0604020202020204" pitchFamily="34" charset="0"/>
+              <a:buChar char="•"/>
+            </a:pPr>
+            <a:r>
+              <a:rPr lang="de-DE" dirty="0"/>
+              <a:t>Node.js</a:t>
+            </a:r>
+          </a:p>
+          <a:p>
+            <a:pPr marL="209550" lvl="3" indent="0">
+              <a:buNone/>
+            </a:pPr>
+            <a:r>
+              <a:rPr lang="de-DE" sz="1200" dirty="0"/>
+              <a:t>[13]</a:t>
+            </a:r>
+          </a:p>
+          <a:p>
+            <a:pPr marL="209550" lvl="3" indent="0">
+              <a:buNone/>
+            </a:pPr>
+            <a:endParaRPr lang="de-DE" dirty="0"/>
+          </a:p>
+          <a:p>
+            <a:pPr marL="285750" lvl="1" indent="-285750">
+              <a:buFont typeface="Courier New" panose="02070309020205020404" pitchFamily="49" charset="0"/>
+              <a:buChar char="o"/>
+            </a:pPr>
+            <a:r>
+              <a:rPr lang="de-DE" sz="2000" dirty="0"/>
+              <a:t>Browser Beispiele</a:t>
+            </a:r>
+            <a:endParaRPr lang="de-DE" dirty="0"/>
+          </a:p>
+          <a:p>
+            <a:pPr marL="285750" lvl="1" indent="-285750">
+              <a:buFont typeface="Courier New" panose="02070309020205020404" pitchFamily="49" charset="0"/>
+              <a:buChar char="o"/>
+            </a:pPr>
+            <a:endParaRPr lang="de-DE" dirty="0"/>
+          </a:p>
+          <a:p>
+            <a:pPr marL="285750" lvl="1" indent="-285750">
+              <a:buFont typeface="Courier New" panose="02070309020205020404" pitchFamily="49" charset="0"/>
+              <a:buChar char="o"/>
+            </a:pPr>
+            <a:endParaRPr lang="de-DE" dirty="0"/>
+          </a:p>
+          <a:p>
+            <a:pPr marL="285750" lvl="1" indent="-285750">
+              <a:buFont typeface="Courier New" panose="02070309020205020404" pitchFamily="49" charset="0"/>
+              <a:buChar char="o"/>
+            </a:pPr>
+            <a:endParaRPr lang="de-DE" dirty="0"/>
+          </a:p>
+          <a:p>
+            <a:pPr marL="0" lvl="1" indent="0">
+              <a:buNone/>
+            </a:pPr>
+            <a:r>
+              <a:rPr lang="de-DE" sz="1200" dirty="0"/>
+              <a:t>     [14]</a:t>
+            </a:r>
+            <a:endParaRPr lang="de-DE" dirty="0"/>
+          </a:p>
+        </p:txBody>
+      </p:sp>
+      <p:sp>
+        <p:nvSpPr>
+          <p:cNvPr id="4" name="Titel 3"/>
+          <p:cNvSpPr>
+            <a:spLocks noGrp="1"/>
+          </p:cNvSpPr>
+          <p:nvPr>
+            <p:ph type="title"/>
+          </p:nvPr>
+        </p:nvSpPr>
+        <p:spPr/>
+        <p:txBody>
+          <a:bodyPr/>
+          <a:lstStyle/>
+          <a:p>
+            <a:r>
+              <a:rPr lang="de-DE" dirty="0" err="1"/>
+              <a:t>Adafruit</a:t>
+            </a:r>
+            <a:r>
+              <a:rPr lang="de-DE" dirty="0"/>
+              <a:t> IO - Einstiegshilfen</a:t>
+            </a:r>
+            <a:endParaRPr lang="de-DE" b="0" dirty="0"/>
+          </a:p>
+        </p:txBody>
+      </p:sp>
+      <p:sp>
+        <p:nvSpPr>
+          <p:cNvPr id="5" name="Fußzeilenplatzhalter 4"/>
+          <p:cNvSpPr>
+            <a:spLocks noGrp="1"/>
+          </p:cNvSpPr>
+          <p:nvPr>
+            <p:ph type="ftr" sz="quarter" idx="16"/>
+          </p:nvPr>
+        </p:nvSpPr>
+        <p:spPr/>
+        <p:txBody>
+          <a:bodyPr/>
+          <a:lstStyle/>
+          <a:p>
+            <a:r>
+              <a:rPr lang="en-US" altLang="de-DE"/>
+              <a:t>Hochschule Mannheim | Julia Geigl, Clemens Behr, Kevin Höfle</a:t>
+            </a:r>
+            <a:endParaRPr lang="de-DE" altLang="de-DE" dirty="0"/>
+          </a:p>
+        </p:txBody>
+      </p:sp>
+      <p:pic>
+        <p:nvPicPr>
+          <p:cNvPr id="6" name="Grafik 5"/>
+          <p:cNvPicPr>
+            <a:picLocks noChangeAspect="1"/>
+          </p:cNvPicPr>
+          <p:nvPr/>
+        </p:nvPicPr>
+        <p:blipFill>
+          <a:blip r:embed="rId2"/>
+          <a:stretch>
+            <a:fillRect/>
+          </a:stretch>
+        </p:blipFill>
+        <p:spPr>
+          <a:xfrm>
+            <a:off x="971550" y="5089754"/>
+            <a:ext cx="7296150" cy="1076325"/>
+          </a:xfrm>
+          <a:prstGeom prst="rect">
+            <a:avLst/>
+          </a:prstGeom>
+        </p:spPr>
+      </p:pic>
+    </p:spTree>
+    <p:extLst>
+      <p:ext uri="{BB962C8B-B14F-4D97-AF65-F5344CB8AC3E}">
+        <p14:creationId xmlns:p14="http://schemas.microsoft.com/office/powerpoint/2010/main" val="1420314666"/>
+      </p:ext>
+    </p:extLst>
+  </p:cSld>
+  <p:clrMapOvr>
+    <a:masterClrMapping/>
+  </p:clrMapOvr>
+  <p:transition/>
+</p:sld>
+</file>
+
+<file path=ppt/slides/slide32.xml><?xml version="1.0" encoding="utf-8"?>
+<p:sld xmlns:a="http://schemas.openxmlformats.org/drawingml/2006/main" xmlns:r="http://schemas.openxmlformats.org/officeDocument/2006/relationships" xmlns:p="http://schemas.openxmlformats.org/presentationml/2006/main">
+  <p:cSld>
+    <p:spTree>
+      <p:nvGrpSpPr>
+        <p:cNvPr id="1" name=""/>
+        <p:cNvGrpSpPr/>
+        <p:nvPr/>
+      </p:nvGrpSpPr>
+      <p:grpSpPr>
+        <a:xfrm>
+          <a:off x="0" y="0"/>
+          <a:ext cx="0" cy="0"/>
+          <a:chOff x="0" y="0"/>
+          <a:chExt cx="0" cy="0"/>
+        </a:xfrm>
+      </p:grpSpPr>
+      <p:sp>
+        <p:nvSpPr>
+          <p:cNvPr id="2" name="Foliennummernplatzhalter 1"/>
+          <p:cNvSpPr>
+            <a:spLocks noGrp="1"/>
+          </p:cNvSpPr>
+          <p:nvPr>
+            <p:ph type="sldNum" sz="quarter" idx="11"/>
+          </p:nvPr>
+        </p:nvSpPr>
+        <p:spPr/>
+        <p:txBody>
+          <a:bodyPr/>
+          <a:lstStyle/>
+          <a:p>
+            <a:fld id="{57D12BB6-0ED4-46B6-AB23-7758AD07EFBF}" type="slidenum">
+              <a:rPr lang="de-DE" smtClean="0"/>
+              <a:pPr/>
+              <a:t>32</a:t>
+            </a:fld>
+            <a:endParaRPr lang="de-DE" dirty="0"/>
+          </a:p>
+        </p:txBody>
+      </p:sp>
+      <p:sp>
+        <p:nvSpPr>
+          <p:cNvPr id="3" name="Textplatzhalter 2"/>
+          <p:cNvSpPr>
+            <a:spLocks noGrp="1"/>
+          </p:cNvSpPr>
+          <p:nvPr>
+            <p:ph type="body" sz="quarter" idx="15"/>
+          </p:nvPr>
+        </p:nvSpPr>
+        <p:spPr/>
+        <p:txBody>
+          <a:bodyPr/>
+          <a:lstStyle/>
+          <a:p>
+            <a:pPr marL="285750" indent="-285750">
+              <a:buFont typeface="Courier New" panose="02070309020205020404" pitchFamily="49" charset="0"/>
+              <a:buChar char="o"/>
+            </a:pPr>
+            <a:r>
+              <a:rPr lang="de-DE" dirty="0"/>
+              <a:t>REST API</a:t>
+            </a:r>
+          </a:p>
+          <a:p>
+            <a:pPr marL="0" indent="0">
+              <a:buNone/>
+            </a:pPr>
+            <a:r>
+              <a:rPr lang="de-DE" dirty="0">
+                <a:hlinkClick r:id="rId2"/>
+              </a:rPr>
+              <a:t>https://io.adafruit.com/api/docs/#!/Feeds/all</a:t>
+            </a:r>
+            <a:endParaRPr lang="de-DE" dirty="0"/>
+          </a:p>
+          <a:p>
+            <a:pPr marL="0" indent="0">
+              <a:buNone/>
+            </a:pPr>
+            <a:endParaRPr lang="de-DE" dirty="0"/>
+          </a:p>
+        </p:txBody>
+      </p:sp>
+      <p:sp>
+        <p:nvSpPr>
+          <p:cNvPr id="4" name="Titel 3"/>
+          <p:cNvSpPr>
+            <a:spLocks noGrp="1"/>
+          </p:cNvSpPr>
+          <p:nvPr>
+            <p:ph type="title"/>
+          </p:nvPr>
+        </p:nvSpPr>
+        <p:spPr/>
+        <p:txBody>
+          <a:bodyPr/>
+          <a:lstStyle/>
+          <a:p>
+            <a:r>
+              <a:rPr lang="de-DE" dirty="0" err="1"/>
+              <a:t>Adafruit</a:t>
+            </a:r>
+            <a:r>
+              <a:rPr lang="de-DE" dirty="0"/>
+              <a:t> IO - Einstiegshilfen</a:t>
+            </a:r>
+          </a:p>
+        </p:txBody>
+      </p:sp>
+      <p:sp>
+        <p:nvSpPr>
+          <p:cNvPr id="5" name="Fußzeilenplatzhalter 4"/>
+          <p:cNvSpPr>
+            <a:spLocks noGrp="1"/>
+          </p:cNvSpPr>
+          <p:nvPr>
+            <p:ph type="ftr" sz="quarter" idx="16"/>
+          </p:nvPr>
+        </p:nvSpPr>
+        <p:spPr/>
+        <p:txBody>
+          <a:bodyPr/>
+          <a:lstStyle/>
+          <a:p>
+            <a:r>
+              <a:rPr lang="en-US" altLang="de-DE"/>
+              <a:t>Hochschule Mannheim | Julia Geigl, Clemens Behr, Kevin Höfle</a:t>
+            </a:r>
+            <a:endParaRPr lang="de-DE" altLang="de-DE" dirty="0"/>
+          </a:p>
+        </p:txBody>
+      </p:sp>
+      <p:pic>
+        <p:nvPicPr>
+          <p:cNvPr id="6" name="Grafik 5"/>
+          <p:cNvPicPr>
+            <a:picLocks noChangeAspect="1"/>
+          </p:cNvPicPr>
+          <p:nvPr/>
+        </p:nvPicPr>
+        <p:blipFill>
+          <a:blip r:embed="rId3"/>
+          <a:stretch>
+            <a:fillRect/>
+          </a:stretch>
+        </p:blipFill>
+        <p:spPr>
+          <a:xfrm>
+            <a:off x="966774" y="2996953"/>
+            <a:ext cx="5297414" cy="3292838"/>
+          </a:xfrm>
+          <a:prstGeom prst="rect">
+            <a:avLst/>
+          </a:prstGeom>
+        </p:spPr>
+      </p:pic>
+    </p:spTree>
+    <p:extLst>
+      <p:ext uri="{BB962C8B-B14F-4D97-AF65-F5344CB8AC3E}">
+        <p14:creationId xmlns:p14="http://schemas.microsoft.com/office/powerpoint/2010/main" val="3584832991"/>
+      </p:ext>
+    </p:extLst>
+  </p:cSld>
+  <p:clrMapOvr>
+    <a:masterClrMapping/>
+  </p:clrMapOvr>
+  <p:transition/>
+</p:sld>
+</file>
+
+<file path=ppt/slides/slide33.xml><?xml version="1.0" encoding="utf-8"?>
+<p:sld xmlns:a="http://schemas.openxmlformats.org/drawingml/2006/main" xmlns:r="http://schemas.openxmlformats.org/officeDocument/2006/relationships" xmlns:p="http://schemas.openxmlformats.org/presentationml/2006/main">
+  <p:cSld>
+    <p:spTree>
+      <p:nvGrpSpPr>
+        <p:cNvPr id="1" name=""/>
+        <p:cNvGrpSpPr/>
+        <p:nvPr/>
+      </p:nvGrpSpPr>
+      <p:grpSpPr>
+        <a:xfrm>
+          <a:off x="0" y="0"/>
+          <a:ext cx="0" cy="0"/>
+          <a:chOff x="0" y="0"/>
+          <a:chExt cx="0" cy="0"/>
+        </a:xfrm>
+      </p:grpSpPr>
+      <p:sp>
+        <p:nvSpPr>
+          <p:cNvPr id="2" name="Foliennummernplatzhalter 1"/>
+          <p:cNvSpPr>
+            <a:spLocks noGrp="1"/>
+          </p:cNvSpPr>
+          <p:nvPr>
+            <p:ph type="sldNum" sz="quarter" idx="11"/>
+          </p:nvPr>
+        </p:nvSpPr>
+        <p:spPr/>
+        <p:txBody>
+          <a:bodyPr/>
+          <a:lstStyle/>
+          <a:p>
+            <a:fld id="{57D12BB6-0ED4-46B6-AB23-7758AD07EFBF}" type="slidenum">
+              <a:rPr lang="de-DE" smtClean="0"/>
+              <a:pPr/>
+              <a:t>33</a:t>
+            </a:fld>
+            <a:endParaRPr lang="de-DE" dirty="0"/>
+          </a:p>
+        </p:txBody>
+      </p:sp>
+      <p:sp>
+        <p:nvSpPr>
+          <p:cNvPr id="3" name="Textplatzhalter 2"/>
+          <p:cNvSpPr>
+            <a:spLocks noGrp="1"/>
+          </p:cNvSpPr>
+          <p:nvPr>
+            <p:ph type="body" sz="quarter" idx="15"/>
+          </p:nvPr>
+        </p:nvSpPr>
+        <p:spPr/>
+        <p:txBody>
+          <a:bodyPr/>
+          <a:lstStyle/>
+          <a:p>
+            <a:pPr marL="0" indent="0">
+              <a:buNone/>
+            </a:pPr>
+            <a:r>
+              <a:rPr lang="de-DE" sz="2000" dirty="0"/>
+              <a:t>Host:	io.adafruit.com</a:t>
+            </a:r>
+          </a:p>
+          <a:p>
+            <a:pPr marL="0" indent="0">
+              <a:buNone/>
+            </a:pPr>
+            <a:endParaRPr lang="de-DE" dirty="0"/>
+          </a:p>
+          <a:p>
+            <a:pPr marL="285750" indent="-285750">
+              <a:buFont typeface="Courier New" panose="02070309020205020404" pitchFamily="49" charset="0"/>
+              <a:buChar char="o"/>
+            </a:pPr>
+            <a:r>
+              <a:rPr lang="de-DE" dirty="0"/>
+              <a:t>HTTP		=&gt; 	Port 80</a:t>
+            </a:r>
+          </a:p>
+          <a:p>
+            <a:pPr marL="285750" indent="-285750">
+              <a:buFont typeface="Courier New" panose="02070309020205020404" pitchFamily="49" charset="0"/>
+              <a:buChar char="o"/>
+            </a:pPr>
+            <a:r>
+              <a:rPr lang="de-DE" dirty="0"/>
+              <a:t>HTTPS	=&gt;	Port 443</a:t>
+            </a:r>
+          </a:p>
+          <a:p>
+            <a:pPr marL="285750" indent="-285750">
+              <a:buFont typeface="Courier New" panose="02070309020205020404" pitchFamily="49" charset="0"/>
+              <a:buChar char="o"/>
+            </a:pPr>
+            <a:r>
+              <a:rPr lang="de-DE" dirty="0"/>
+              <a:t>MQTT	=&gt;	Port 1883</a:t>
+            </a:r>
+          </a:p>
+          <a:p>
+            <a:pPr marL="285750" indent="-285750">
+              <a:buFont typeface="Courier New" panose="02070309020205020404" pitchFamily="49" charset="0"/>
+              <a:buChar char="o"/>
+            </a:pPr>
+            <a:r>
+              <a:rPr lang="de-DE" dirty="0"/>
+              <a:t>MQTT + SSL	=&gt;	Port 8883</a:t>
+            </a:r>
+          </a:p>
+          <a:p>
+            <a:pPr marL="0" indent="0">
+              <a:buNone/>
+            </a:pPr>
+            <a:r>
+              <a:rPr lang="de-DE" sz="1200" dirty="0"/>
+              <a:t>[15]</a:t>
+            </a:r>
+            <a:endParaRPr lang="de-DE" dirty="0"/>
+          </a:p>
+        </p:txBody>
+      </p:sp>
+      <p:sp>
+        <p:nvSpPr>
+          <p:cNvPr id="4" name="Titel 3"/>
+          <p:cNvSpPr>
+            <a:spLocks noGrp="1"/>
+          </p:cNvSpPr>
+          <p:nvPr>
+            <p:ph type="title"/>
+          </p:nvPr>
+        </p:nvSpPr>
+        <p:spPr/>
+        <p:txBody>
+          <a:bodyPr/>
+          <a:lstStyle/>
+          <a:p>
+            <a:r>
+              <a:rPr lang="de-DE" dirty="0" err="1"/>
+              <a:t>Adafruit</a:t>
+            </a:r>
+            <a:r>
+              <a:rPr lang="de-DE" dirty="0"/>
+              <a:t> IO - Verbindung</a:t>
+            </a:r>
+          </a:p>
+        </p:txBody>
+      </p:sp>
+      <p:sp>
+        <p:nvSpPr>
+          <p:cNvPr id="5" name="Fußzeilenplatzhalter 4"/>
+          <p:cNvSpPr>
+            <a:spLocks noGrp="1"/>
+          </p:cNvSpPr>
+          <p:nvPr>
+            <p:ph type="ftr" sz="quarter" idx="16"/>
+          </p:nvPr>
+        </p:nvSpPr>
+        <p:spPr/>
+        <p:txBody>
+          <a:bodyPr/>
+          <a:lstStyle/>
+          <a:p>
+            <a:r>
+              <a:rPr lang="en-US" altLang="de-DE"/>
+              <a:t>Hochschule Mannheim | Julia Geigl, Clemens Behr, Kevin Höfle</a:t>
+            </a:r>
+            <a:endParaRPr lang="de-DE" altLang="de-DE" dirty="0"/>
+          </a:p>
+        </p:txBody>
+      </p:sp>
+    </p:spTree>
+    <p:extLst>
+      <p:ext uri="{BB962C8B-B14F-4D97-AF65-F5344CB8AC3E}">
+        <p14:creationId xmlns:p14="http://schemas.microsoft.com/office/powerpoint/2010/main" val="1689601534"/>
+      </p:ext>
+    </p:extLst>
+  </p:cSld>
+  <p:clrMapOvr>
+    <a:masterClrMapping/>
+  </p:clrMapOvr>
+  <p:transition/>
+</p:sld>
+</file>
+
+<file path=ppt/slides/slide34.xml><?xml version="1.0" encoding="utf-8"?>
+<p:sld xmlns:a="http://schemas.openxmlformats.org/drawingml/2006/main" xmlns:r="http://schemas.openxmlformats.org/officeDocument/2006/relationships" xmlns:p="http://schemas.openxmlformats.org/presentationml/2006/main">
+  <p:cSld>
+    <p:spTree>
+      <p:nvGrpSpPr>
+        <p:cNvPr id="1" name=""/>
+        <p:cNvGrpSpPr/>
+        <p:nvPr/>
+      </p:nvGrpSpPr>
+      <p:grpSpPr>
+        <a:xfrm>
+          <a:off x="0" y="0"/>
+          <a:ext cx="0" cy="0"/>
+          <a:chOff x="0" y="0"/>
+          <a:chExt cx="0" cy="0"/>
+        </a:xfrm>
+      </p:grpSpPr>
+      <p:sp>
+        <p:nvSpPr>
+          <p:cNvPr id="2" name="Foliennummernplatzhalter 1"/>
+          <p:cNvSpPr>
+            <a:spLocks noGrp="1"/>
+          </p:cNvSpPr>
+          <p:nvPr>
+            <p:ph type="sldNum" sz="quarter" idx="11"/>
+          </p:nvPr>
+        </p:nvSpPr>
+        <p:spPr/>
+        <p:txBody>
+          <a:bodyPr/>
+          <a:lstStyle/>
+          <a:p>
+            <a:fld id="{57D12BB6-0ED4-46B6-AB23-7758AD07EFBF}" type="slidenum">
+              <a:rPr lang="de-DE" smtClean="0"/>
+              <a:pPr/>
+              <a:t>34</a:t>
+            </a:fld>
+            <a:endParaRPr lang="de-DE" dirty="0"/>
+          </a:p>
+        </p:txBody>
+      </p:sp>
+      <p:sp>
+        <p:nvSpPr>
+          <p:cNvPr id="4" name="Titel 3"/>
+          <p:cNvSpPr>
+            <a:spLocks noGrp="1"/>
+          </p:cNvSpPr>
+          <p:nvPr>
+            <p:ph type="title"/>
+          </p:nvPr>
+        </p:nvSpPr>
+        <p:spPr/>
+        <p:txBody>
+          <a:bodyPr/>
+          <a:lstStyle/>
+          <a:p>
+            <a:r>
+              <a:rPr lang="de-DE" dirty="0" err="1"/>
+              <a:t>Adafruit</a:t>
+            </a:r>
+            <a:r>
+              <a:rPr lang="de-DE" dirty="0"/>
+              <a:t> IO – Feeds</a:t>
+            </a:r>
+          </a:p>
+        </p:txBody>
+      </p:sp>
+      <p:sp>
+        <p:nvSpPr>
+          <p:cNvPr id="5" name="Fußzeilenplatzhalter 4"/>
+          <p:cNvSpPr>
+            <a:spLocks noGrp="1"/>
+          </p:cNvSpPr>
+          <p:nvPr>
+            <p:ph type="ftr" sz="quarter" idx="16"/>
+          </p:nvPr>
+        </p:nvSpPr>
+        <p:spPr/>
+        <p:txBody>
+          <a:bodyPr/>
+          <a:lstStyle/>
+          <a:p>
+            <a:r>
+              <a:rPr lang="en-US" altLang="de-DE"/>
+              <a:t>Hochschule Mannheim | Julia Geigl, Clemens Behr, Kevin Höfle</a:t>
+            </a:r>
+            <a:endParaRPr lang="de-DE" altLang="de-DE" dirty="0"/>
+          </a:p>
+        </p:txBody>
+      </p:sp>
+      <p:pic>
+        <p:nvPicPr>
+          <p:cNvPr id="3" name="Grafik 2"/>
+          <p:cNvPicPr>
+            <a:picLocks noChangeAspect="1"/>
+          </p:cNvPicPr>
+          <p:nvPr/>
+        </p:nvPicPr>
+        <p:blipFill>
+          <a:blip r:embed="rId2"/>
+          <a:stretch>
+            <a:fillRect/>
+          </a:stretch>
+        </p:blipFill>
+        <p:spPr>
+          <a:xfrm>
+            <a:off x="503548" y="2996952"/>
+            <a:ext cx="8218276" cy="2972568"/>
+          </a:xfrm>
+          <a:prstGeom prst="rect">
+            <a:avLst/>
+          </a:prstGeom>
+        </p:spPr>
+      </p:pic>
+      <p:sp>
+        <p:nvSpPr>
+          <p:cNvPr id="8" name="Textfeld 7"/>
+          <p:cNvSpPr txBox="1"/>
+          <p:nvPr/>
+        </p:nvSpPr>
+        <p:spPr>
+          <a:xfrm>
+            <a:off x="719572" y="2291366"/>
+            <a:ext cx="7884876" cy="400110"/>
+          </a:xfrm>
+          <a:prstGeom prst="rect">
+            <a:avLst/>
+          </a:prstGeom>
+          <a:noFill/>
+        </p:spPr>
+        <p:txBody>
+          <a:bodyPr wrap="square" rtlCol="0">
+            <a:spAutoFit/>
+          </a:bodyPr>
+          <a:lstStyle/>
+          <a:p>
+            <a:pPr marL="285750" indent="-285750" algn="l">
+              <a:buFont typeface="Courier New" panose="02070309020205020404" pitchFamily="49" charset="0"/>
+              <a:buChar char="o"/>
+            </a:pPr>
+            <a:r>
+              <a:rPr lang="de-DE" sz="2000" dirty="0"/>
+              <a:t>Feed enthält die Daten =&gt; Folge von Daten</a:t>
+            </a:r>
+          </a:p>
+        </p:txBody>
+      </p:sp>
+    </p:spTree>
+    <p:extLst>
+      <p:ext uri="{BB962C8B-B14F-4D97-AF65-F5344CB8AC3E}">
+        <p14:creationId xmlns:p14="http://schemas.microsoft.com/office/powerpoint/2010/main" val="2769674007"/>
+      </p:ext>
+    </p:extLst>
+  </p:cSld>
+  <p:clrMapOvr>
+    <a:masterClrMapping/>
+  </p:clrMapOvr>
+  <p:transition/>
+</p:sld>
+</file>
+
+<file path=ppt/slides/slide35.xml><?xml version="1.0" encoding="utf-8"?>
+<p:sld xmlns:a="http://schemas.openxmlformats.org/drawingml/2006/main" xmlns:r="http://schemas.openxmlformats.org/officeDocument/2006/relationships" xmlns:p="http://schemas.openxmlformats.org/presentationml/2006/main">
+  <p:cSld>
+    <p:spTree>
+      <p:nvGrpSpPr>
+        <p:cNvPr id="1" name=""/>
+        <p:cNvGrpSpPr/>
+        <p:nvPr/>
+      </p:nvGrpSpPr>
+      <p:grpSpPr>
+        <a:xfrm>
+          <a:off x="0" y="0"/>
+          <a:ext cx="0" cy="0"/>
+          <a:chOff x="0" y="0"/>
+          <a:chExt cx="0" cy="0"/>
+        </a:xfrm>
+      </p:grpSpPr>
+      <p:sp>
+        <p:nvSpPr>
+          <p:cNvPr id="2" name="Foliennummernplatzhalter 1"/>
+          <p:cNvSpPr>
+            <a:spLocks noGrp="1"/>
+          </p:cNvSpPr>
+          <p:nvPr>
+            <p:ph type="sldNum" sz="quarter" idx="11"/>
+          </p:nvPr>
+        </p:nvSpPr>
+        <p:spPr/>
+        <p:txBody>
+          <a:bodyPr/>
+          <a:lstStyle/>
+          <a:p>
+            <a:fld id="{57D12BB6-0ED4-46B6-AB23-7758AD07EFBF}" type="slidenum">
+              <a:rPr lang="de-DE" smtClean="0"/>
+              <a:pPr/>
+              <a:t>35</a:t>
+            </a:fld>
+            <a:endParaRPr lang="de-DE" dirty="0"/>
+          </a:p>
+        </p:txBody>
+      </p:sp>
+      <p:sp>
+        <p:nvSpPr>
+          <p:cNvPr id="4" name="Titel 3"/>
+          <p:cNvSpPr>
+            <a:spLocks noGrp="1"/>
+          </p:cNvSpPr>
+          <p:nvPr>
+            <p:ph type="title"/>
+          </p:nvPr>
+        </p:nvSpPr>
+        <p:spPr/>
+        <p:txBody>
+          <a:bodyPr/>
+          <a:lstStyle/>
+          <a:p>
+            <a:r>
+              <a:rPr lang="de-DE" dirty="0" err="1"/>
+              <a:t>Adafruit</a:t>
+            </a:r>
+            <a:r>
+              <a:rPr lang="de-DE" dirty="0"/>
+              <a:t> IO – Create Feed</a:t>
+            </a:r>
+          </a:p>
+        </p:txBody>
+      </p:sp>
+      <p:sp>
+        <p:nvSpPr>
+          <p:cNvPr id="5" name="Fußzeilenplatzhalter 4"/>
+          <p:cNvSpPr>
+            <a:spLocks noGrp="1"/>
+          </p:cNvSpPr>
+          <p:nvPr>
+            <p:ph type="ftr" sz="quarter" idx="16"/>
+          </p:nvPr>
+        </p:nvSpPr>
+        <p:spPr/>
+        <p:txBody>
+          <a:bodyPr/>
+          <a:lstStyle/>
+          <a:p>
+            <a:r>
+              <a:rPr lang="en-US" altLang="de-DE"/>
+              <a:t>Hochschule Mannheim | Julia Geigl, Clemens Behr, Kevin Höfle</a:t>
+            </a:r>
+            <a:endParaRPr lang="de-DE" altLang="de-DE" dirty="0"/>
+          </a:p>
+        </p:txBody>
+      </p:sp>
+      <p:pic>
+        <p:nvPicPr>
+          <p:cNvPr id="6" name="Inhaltsplatzhalter 3"/>
+          <p:cNvPicPr>
+            <a:picLocks noChangeAspect="1"/>
+          </p:cNvPicPr>
+          <p:nvPr/>
+        </p:nvPicPr>
+        <p:blipFill>
+          <a:blip r:embed="rId2"/>
+          <a:stretch>
+            <a:fillRect/>
+          </a:stretch>
+        </p:blipFill>
+        <p:spPr>
+          <a:xfrm>
+            <a:off x="107504" y="2420888"/>
+            <a:ext cx="5070023" cy="1219256"/>
+          </a:xfrm>
+          <a:prstGeom prst="rect">
+            <a:avLst/>
+          </a:prstGeom>
+        </p:spPr>
+      </p:pic>
+      <p:sp>
+        <p:nvSpPr>
+          <p:cNvPr id="7" name="Pfeil nach rechts 4"/>
+          <p:cNvSpPr/>
+          <p:nvPr/>
+        </p:nvSpPr>
+        <p:spPr>
+          <a:xfrm rot="10800000">
+            <a:off x="5088506" y="2444746"/>
+            <a:ext cx="780863" cy="454937"/>
+          </a:xfrm>
+          <a:prstGeom prst="rightArrow">
+            <a:avLst/>
+          </a:prstGeom>
+          <a:solidFill>
+            <a:srgbClr val="FF0000"/>
+          </a:solidFill>
+        </p:spPr>
+        <p:style>
+          <a:lnRef idx="2">
+            <a:schemeClr val="accent1">
+              <a:shade val="50000"/>
+            </a:schemeClr>
+          </a:lnRef>
+          <a:fillRef idx="1">
+            <a:schemeClr val="accent1"/>
+          </a:fillRef>
+          <a:effectRef idx="0">
+            <a:schemeClr val="accent1"/>
+          </a:effectRef>
+          <a:fontRef idx="minor">
+            <a:schemeClr val="lt1"/>
+          </a:fontRef>
+        </p:style>
+        <p:txBody>
+          <a:bodyPr rtlCol="0" anchor="ctr"/>
+          <a:lstStyle/>
+          <a:p>
+            <a:pPr algn="ctr"/>
+            <a:endParaRPr lang="de-DE" sz="1351">
+              <a:solidFill>
+                <a:srgbClr val="FF0000"/>
+              </a:solidFill>
+            </a:endParaRPr>
+          </a:p>
+        </p:txBody>
+      </p:sp>
+      <p:pic>
+        <p:nvPicPr>
+          <p:cNvPr id="8" name="Grafik 7"/>
+          <p:cNvPicPr>
+            <a:picLocks noChangeAspect="1"/>
+          </p:cNvPicPr>
+          <p:nvPr/>
+        </p:nvPicPr>
+        <p:blipFill>
+          <a:blip r:embed="rId3"/>
+          <a:stretch>
+            <a:fillRect/>
+          </a:stretch>
+        </p:blipFill>
+        <p:spPr>
+          <a:xfrm>
+            <a:off x="4640651" y="3720402"/>
+            <a:ext cx="4237775" cy="1614203"/>
+          </a:xfrm>
+          <a:prstGeom prst="rect">
+            <a:avLst/>
+          </a:prstGeom>
+        </p:spPr>
+      </p:pic>
+    </p:spTree>
+    <p:extLst>
+      <p:ext uri="{BB962C8B-B14F-4D97-AF65-F5344CB8AC3E}">
+        <p14:creationId xmlns:p14="http://schemas.microsoft.com/office/powerpoint/2010/main" val="3321184630"/>
+      </p:ext>
+    </p:extLst>
+  </p:cSld>
+  <p:clrMapOvr>
+    <a:masterClrMapping/>
+  </p:clrMapOvr>
+  <p:transition/>
+</p:sld>
+</file>
+
+<file path=ppt/slides/slide36.xml><?xml version="1.0" encoding="utf-8"?>
+<p:sld xmlns:a="http://schemas.openxmlformats.org/drawingml/2006/main" xmlns:r="http://schemas.openxmlformats.org/officeDocument/2006/relationships" xmlns:p="http://schemas.openxmlformats.org/presentationml/2006/main">
+  <p:cSld>
+    <p:spTree>
+      <p:nvGrpSpPr>
+        <p:cNvPr id="1" name=""/>
+        <p:cNvGrpSpPr/>
+        <p:nvPr/>
+      </p:nvGrpSpPr>
+      <p:grpSpPr>
+        <a:xfrm>
+          <a:off x="0" y="0"/>
+          <a:ext cx="0" cy="0"/>
+          <a:chOff x="0" y="0"/>
+          <a:chExt cx="0" cy="0"/>
+        </a:xfrm>
+      </p:grpSpPr>
+      <p:sp>
+        <p:nvSpPr>
+          <p:cNvPr id="2" name="Foliennummernplatzhalter 1"/>
+          <p:cNvSpPr>
+            <a:spLocks noGrp="1"/>
+          </p:cNvSpPr>
+          <p:nvPr>
+            <p:ph type="sldNum" sz="quarter" idx="11"/>
+          </p:nvPr>
+        </p:nvSpPr>
+        <p:spPr/>
+        <p:txBody>
+          <a:bodyPr/>
+          <a:lstStyle/>
+          <a:p>
+            <a:fld id="{57D12BB6-0ED4-46B6-AB23-7758AD07EFBF}" type="slidenum">
+              <a:rPr lang="de-DE" smtClean="0"/>
+              <a:pPr/>
+              <a:t>36</a:t>
+            </a:fld>
+            <a:endParaRPr lang="de-DE" dirty="0"/>
+          </a:p>
+        </p:txBody>
+      </p:sp>
+      <p:sp>
+        <p:nvSpPr>
+          <p:cNvPr id="4" name="Titel 3"/>
+          <p:cNvSpPr>
+            <a:spLocks noGrp="1"/>
+          </p:cNvSpPr>
+          <p:nvPr>
+            <p:ph type="title"/>
+          </p:nvPr>
+        </p:nvSpPr>
+        <p:spPr/>
+        <p:txBody>
+          <a:bodyPr/>
+          <a:lstStyle/>
+          <a:p>
+            <a:r>
+              <a:rPr lang="de-DE" dirty="0" err="1"/>
+              <a:t>Adafruit</a:t>
+            </a:r>
+            <a:r>
+              <a:rPr lang="de-DE" dirty="0"/>
+              <a:t> IO – Groups</a:t>
+            </a:r>
+          </a:p>
+        </p:txBody>
+      </p:sp>
+      <p:sp>
+        <p:nvSpPr>
+          <p:cNvPr id="5" name="Fußzeilenplatzhalter 4"/>
+          <p:cNvSpPr>
+            <a:spLocks noGrp="1"/>
+          </p:cNvSpPr>
+          <p:nvPr>
+            <p:ph type="ftr" sz="quarter" idx="16"/>
+          </p:nvPr>
+        </p:nvSpPr>
+        <p:spPr/>
+        <p:txBody>
+          <a:bodyPr/>
+          <a:lstStyle/>
+          <a:p>
+            <a:r>
+              <a:rPr lang="en-US" altLang="de-DE"/>
+              <a:t>Hochschule Mannheim | Julia Geigl, Clemens Behr, Kevin Höfle</a:t>
+            </a:r>
+            <a:endParaRPr lang="de-DE" altLang="de-DE" dirty="0"/>
+          </a:p>
+        </p:txBody>
+      </p:sp>
+      <p:pic>
+        <p:nvPicPr>
+          <p:cNvPr id="3" name="Grafik 2"/>
+          <p:cNvPicPr>
+            <a:picLocks noChangeAspect="1"/>
+          </p:cNvPicPr>
+          <p:nvPr/>
+        </p:nvPicPr>
+        <p:blipFill>
+          <a:blip r:embed="rId2"/>
+          <a:stretch>
+            <a:fillRect/>
+          </a:stretch>
+        </p:blipFill>
+        <p:spPr>
+          <a:xfrm>
+            <a:off x="539750" y="3119455"/>
+            <a:ext cx="8172450" cy="2195830"/>
+          </a:xfrm>
+          <a:prstGeom prst="rect">
+            <a:avLst/>
+          </a:prstGeom>
+        </p:spPr>
+      </p:pic>
+      <p:sp>
+        <p:nvSpPr>
+          <p:cNvPr id="7" name="Textfeld 6"/>
+          <p:cNvSpPr txBox="1"/>
+          <p:nvPr/>
+        </p:nvSpPr>
+        <p:spPr>
+          <a:xfrm>
+            <a:off x="719572" y="2291366"/>
+            <a:ext cx="8002252" cy="400110"/>
+          </a:xfrm>
+          <a:prstGeom prst="rect">
+            <a:avLst/>
+          </a:prstGeom>
+          <a:noFill/>
+        </p:spPr>
+        <p:txBody>
+          <a:bodyPr wrap="square" rtlCol="0">
+            <a:spAutoFit/>
+          </a:bodyPr>
+          <a:lstStyle/>
+          <a:p>
+            <a:pPr marL="285750" indent="-285750" algn="l">
+              <a:buFont typeface="Courier New" panose="02070309020205020404" pitchFamily="49" charset="0"/>
+              <a:buChar char="o"/>
+            </a:pPr>
+            <a:r>
+              <a:rPr lang="de-DE" sz="2000" dirty="0"/>
+              <a:t>Feeds können in Gruppen eingeteilt werden</a:t>
+            </a:r>
+          </a:p>
+        </p:txBody>
+      </p:sp>
+    </p:spTree>
+    <p:extLst>
+      <p:ext uri="{BB962C8B-B14F-4D97-AF65-F5344CB8AC3E}">
+        <p14:creationId xmlns:p14="http://schemas.microsoft.com/office/powerpoint/2010/main" val="2151750626"/>
+      </p:ext>
+    </p:extLst>
+  </p:cSld>
+  <p:clrMapOvr>
+    <a:masterClrMapping/>
+  </p:clrMapOvr>
+  <p:transition/>
+</p:sld>
+</file>
+
+<file path=ppt/slides/slide37.xml><?xml version="1.0" encoding="utf-8"?>
+<p:sld xmlns:a="http://schemas.openxmlformats.org/drawingml/2006/main" xmlns:r="http://schemas.openxmlformats.org/officeDocument/2006/relationships" xmlns:p="http://schemas.openxmlformats.org/presentationml/2006/main">
+  <p:cSld>
+    <p:spTree>
+      <p:nvGrpSpPr>
+        <p:cNvPr id="1" name=""/>
+        <p:cNvGrpSpPr/>
+        <p:nvPr/>
+      </p:nvGrpSpPr>
+      <p:grpSpPr>
+        <a:xfrm>
+          <a:off x="0" y="0"/>
+          <a:ext cx="0" cy="0"/>
+          <a:chOff x="0" y="0"/>
+          <a:chExt cx="0" cy="0"/>
+        </a:xfrm>
+      </p:grpSpPr>
+      <p:sp>
+        <p:nvSpPr>
+          <p:cNvPr id="2" name="Foliennummernplatzhalter 1"/>
+          <p:cNvSpPr>
+            <a:spLocks noGrp="1"/>
+          </p:cNvSpPr>
+          <p:nvPr>
+            <p:ph type="sldNum" sz="quarter" idx="11"/>
+          </p:nvPr>
+        </p:nvSpPr>
+        <p:spPr/>
+        <p:txBody>
+          <a:bodyPr/>
+          <a:lstStyle/>
+          <a:p>
+            <a:fld id="{57D12BB6-0ED4-46B6-AB23-7758AD07EFBF}" type="slidenum">
+              <a:rPr lang="de-DE" smtClean="0"/>
+              <a:pPr/>
+              <a:t>37</a:t>
+            </a:fld>
+            <a:endParaRPr lang="de-DE" dirty="0"/>
+          </a:p>
+        </p:txBody>
+      </p:sp>
+      <p:sp>
+        <p:nvSpPr>
+          <p:cNvPr id="4" name="Titel 3"/>
+          <p:cNvSpPr>
+            <a:spLocks noGrp="1"/>
+          </p:cNvSpPr>
+          <p:nvPr>
+            <p:ph type="title"/>
+          </p:nvPr>
+        </p:nvSpPr>
+        <p:spPr/>
+        <p:txBody>
+          <a:bodyPr/>
+          <a:lstStyle/>
+          <a:p>
+            <a:r>
+              <a:rPr lang="de-DE" dirty="0" err="1"/>
+              <a:t>Adafruit</a:t>
+            </a:r>
+            <a:r>
+              <a:rPr lang="de-DE" dirty="0"/>
+              <a:t> IO - Dashboard</a:t>
+            </a:r>
+          </a:p>
+        </p:txBody>
+      </p:sp>
+      <p:sp>
+        <p:nvSpPr>
+          <p:cNvPr id="5" name="Fußzeilenplatzhalter 4"/>
+          <p:cNvSpPr>
+            <a:spLocks noGrp="1"/>
+          </p:cNvSpPr>
+          <p:nvPr>
+            <p:ph type="ftr" sz="quarter" idx="16"/>
+          </p:nvPr>
+        </p:nvSpPr>
+        <p:spPr/>
+        <p:txBody>
+          <a:bodyPr/>
+          <a:lstStyle/>
+          <a:p>
+            <a:r>
+              <a:rPr lang="en-US" altLang="de-DE"/>
+              <a:t>Hochschule Mannheim | Julia Geigl, Clemens Behr, Kevin Höfle</a:t>
+            </a:r>
+            <a:endParaRPr lang="de-DE" altLang="de-DE" dirty="0"/>
+          </a:p>
+        </p:txBody>
+      </p:sp>
+      <p:pic>
+        <p:nvPicPr>
+          <p:cNvPr id="3" name="Grafik 2"/>
+          <p:cNvPicPr>
+            <a:picLocks noChangeAspect="1"/>
+          </p:cNvPicPr>
+          <p:nvPr/>
+        </p:nvPicPr>
+        <p:blipFill>
+          <a:blip r:embed="rId2"/>
+          <a:stretch>
+            <a:fillRect/>
+          </a:stretch>
+        </p:blipFill>
+        <p:spPr>
+          <a:xfrm>
+            <a:off x="1493478" y="2491188"/>
+            <a:ext cx="6696794" cy="3878229"/>
+          </a:xfrm>
+          <a:prstGeom prst="rect">
+            <a:avLst/>
+          </a:prstGeom>
+        </p:spPr>
+      </p:pic>
+    </p:spTree>
+    <p:extLst>
+      <p:ext uri="{BB962C8B-B14F-4D97-AF65-F5344CB8AC3E}">
+        <p14:creationId xmlns:p14="http://schemas.microsoft.com/office/powerpoint/2010/main" val="1435382107"/>
+      </p:ext>
+    </p:extLst>
+  </p:cSld>
+  <p:clrMapOvr>
+    <a:masterClrMapping/>
+  </p:clrMapOvr>
+  <p:transition/>
+</p:sld>
+</file>
+
+<file path=ppt/slides/slide38.xml><?xml version="1.0" encoding="utf-8"?>
+<p:sld xmlns:a="http://schemas.openxmlformats.org/drawingml/2006/main" xmlns:r="http://schemas.openxmlformats.org/officeDocument/2006/relationships" xmlns:p="http://schemas.openxmlformats.org/presentationml/2006/main">
+  <p:cSld>
+    <p:spTree>
+      <p:nvGrpSpPr>
+        <p:cNvPr id="1" name=""/>
+        <p:cNvGrpSpPr/>
+        <p:nvPr/>
+      </p:nvGrpSpPr>
+      <p:grpSpPr>
+        <a:xfrm>
+          <a:off x="0" y="0"/>
+          <a:ext cx="0" cy="0"/>
+          <a:chOff x="0" y="0"/>
+          <a:chExt cx="0" cy="0"/>
+        </a:xfrm>
+      </p:grpSpPr>
+      <p:sp>
+        <p:nvSpPr>
+          <p:cNvPr id="2" name="Foliennummernplatzhalter 1"/>
+          <p:cNvSpPr>
+            <a:spLocks noGrp="1"/>
+          </p:cNvSpPr>
+          <p:nvPr>
+            <p:ph type="sldNum" sz="quarter" idx="11"/>
+          </p:nvPr>
+        </p:nvSpPr>
+        <p:spPr/>
+        <p:txBody>
+          <a:bodyPr/>
+          <a:lstStyle/>
+          <a:p>
+            <a:fld id="{57D12BB6-0ED4-46B6-AB23-7758AD07EFBF}" type="slidenum">
+              <a:rPr lang="de-DE" smtClean="0"/>
+              <a:pPr/>
+              <a:t>38</a:t>
+            </a:fld>
+            <a:endParaRPr lang="de-DE" dirty="0"/>
+          </a:p>
+        </p:txBody>
+      </p:sp>
+      <p:sp>
+        <p:nvSpPr>
+          <p:cNvPr id="4" name="Titel 3"/>
+          <p:cNvSpPr>
+            <a:spLocks noGrp="1"/>
+          </p:cNvSpPr>
+          <p:nvPr>
+            <p:ph type="title"/>
+          </p:nvPr>
+        </p:nvSpPr>
+        <p:spPr/>
+        <p:txBody>
+          <a:bodyPr/>
+          <a:lstStyle/>
+          <a:p>
+            <a:r>
+              <a:rPr lang="de-DE" dirty="0" err="1"/>
+              <a:t>Adafruit</a:t>
+            </a:r>
+            <a:r>
+              <a:rPr lang="de-DE" dirty="0"/>
+              <a:t> IO Feed - Key</a:t>
+            </a:r>
+          </a:p>
+        </p:txBody>
+      </p:sp>
+      <p:sp>
+        <p:nvSpPr>
+          <p:cNvPr id="5" name="Fußzeilenplatzhalter 4"/>
+          <p:cNvSpPr>
+            <a:spLocks noGrp="1"/>
+          </p:cNvSpPr>
+          <p:nvPr>
+            <p:ph type="ftr" sz="quarter" idx="16"/>
+          </p:nvPr>
+        </p:nvSpPr>
+        <p:spPr/>
+        <p:txBody>
+          <a:bodyPr/>
+          <a:lstStyle/>
+          <a:p>
+            <a:r>
+              <a:rPr lang="en-US" altLang="de-DE"/>
+              <a:t>Hochschule Mannheim | Julia Geigl, Clemens Behr, Kevin Höfle</a:t>
+            </a:r>
+            <a:endParaRPr lang="de-DE" altLang="de-DE" dirty="0"/>
+          </a:p>
+        </p:txBody>
+      </p:sp>
+      <p:pic>
+        <p:nvPicPr>
+          <p:cNvPr id="9" name="Grafik 8"/>
+          <p:cNvPicPr>
+            <a:picLocks noChangeAspect="1"/>
+          </p:cNvPicPr>
+          <p:nvPr/>
+        </p:nvPicPr>
+        <p:blipFill>
+          <a:blip r:embed="rId2"/>
+          <a:stretch>
+            <a:fillRect/>
+          </a:stretch>
+        </p:blipFill>
+        <p:spPr>
+          <a:xfrm>
+            <a:off x="1528766" y="2852936"/>
+            <a:ext cx="6115050" cy="2266950"/>
+          </a:xfrm>
+          <a:prstGeom prst="rect">
+            <a:avLst/>
+          </a:prstGeom>
+        </p:spPr>
+      </p:pic>
+      <p:sp>
+        <p:nvSpPr>
+          <p:cNvPr id="10" name="Textfeld 9"/>
+          <p:cNvSpPr txBox="1"/>
+          <p:nvPr/>
+        </p:nvSpPr>
+        <p:spPr>
+          <a:xfrm>
+            <a:off x="955101" y="2291366"/>
+            <a:ext cx="4428492" cy="369332"/>
+          </a:xfrm>
+          <a:prstGeom prst="rect">
+            <a:avLst/>
+          </a:prstGeom>
+          <a:noFill/>
+        </p:spPr>
+        <p:txBody>
+          <a:bodyPr wrap="square" rtlCol="0">
+            <a:spAutoFit/>
+          </a:bodyPr>
+          <a:lstStyle/>
+          <a:p>
+            <a:pPr marL="285750" indent="-285750" algn="l">
+              <a:buFont typeface="Courier New" panose="02070309020205020404" pitchFamily="49" charset="0"/>
+              <a:buChar char="o"/>
+            </a:pPr>
+            <a:r>
+              <a:rPr lang="de-DE" dirty="0"/>
+              <a:t>User Identifikation via AIO Key</a:t>
+            </a:r>
+          </a:p>
+        </p:txBody>
+      </p:sp>
+    </p:spTree>
+    <p:extLst>
+      <p:ext uri="{BB962C8B-B14F-4D97-AF65-F5344CB8AC3E}">
+        <p14:creationId xmlns:p14="http://schemas.microsoft.com/office/powerpoint/2010/main" val="789033031"/>
+      </p:ext>
+    </p:extLst>
+  </p:cSld>
+  <p:clrMapOvr>
+    <a:masterClrMapping/>
+  </p:clrMapOvr>
+  <p:transition/>
+</p:sld>
+</file>
+
+<file path=ppt/slides/slide39.xml><?xml version="1.0" encoding="utf-8"?>
+<p:sld xmlns:a="http://schemas.openxmlformats.org/drawingml/2006/main" xmlns:r="http://schemas.openxmlformats.org/officeDocument/2006/relationships" xmlns:p="http://schemas.openxmlformats.org/presentationml/2006/main">
+  <p:cSld>
+    <p:spTree>
+      <p:nvGrpSpPr>
+        <p:cNvPr id="1" name=""/>
+        <p:cNvGrpSpPr/>
+        <p:nvPr/>
+      </p:nvGrpSpPr>
+      <p:grpSpPr>
+        <a:xfrm>
+          <a:off x="0" y="0"/>
+          <a:ext cx="0" cy="0"/>
+          <a:chOff x="0" y="0"/>
+          <a:chExt cx="0" cy="0"/>
+        </a:xfrm>
+      </p:grpSpPr>
+      <p:sp>
+        <p:nvSpPr>
+          <p:cNvPr id="2" name="Foliennummernplatzhalter 1"/>
+          <p:cNvSpPr>
+            <a:spLocks noGrp="1"/>
+          </p:cNvSpPr>
+          <p:nvPr>
+            <p:ph type="sldNum" sz="quarter" idx="11"/>
+          </p:nvPr>
+        </p:nvSpPr>
+        <p:spPr/>
+        <p:txBody>
+          <a:bodyPr/>
+          <a:lstStyle/>
+          <a:p>
+            <a:fld id="{57D12BB6-0ED4-46B6-AB23-7758AD07EFBF}" type="slidenum">
+              <a:rPr lang="de-DE" smtClean="0"/>
+              <a:pPr/>
+              <a:t>39</a:t>
+            </a:fld>
+            <a:endParaRPr lang="de-DE" dirty="0"/>
+          </a:p>
+        </p:txBody>
+      </p:sp>
+      <p:pic>
+        <p:nvPicPr>
+          <p:cNvPr id="6" name="Grafik 5"/>
+          <p:cNvPicPr>
+            <a:picLocks noChangeAspect="1"/>
+          </p:cNvPicPr>
+          <p:nvPr/>
+        </p:nvPicPr>
+        <p:blipFill>
+          <a:blip r:embed="rId2"/>
+          <a:stretch>
+            <a:fillRect/>
+          </a:stretch>
+        </p:blipFill>
+        <p:spPr>
+          <a:xfrm>
+            <a:off x="3607921" y="3284984"/>
+            <a:ext cx="5312533" cy="2980594"/>
+          </a:xfrm>
+          <a:prstGeom prst="rect">
+            <a:avLst/>
+          </a:prstGeom>
+        </p:spPr>
+      </p:pic>
+      <p:sp>
+        <p:nvSpPr>
+          <p:cNvPr id="3" name="Textplatzhalter 2"/>
+          <p:cNvSpPr>
+            <a:spLocks noGrp="1"/>
+          </p:cNvSpPr>
+          <p:nvPr>
+            <p:ph type="body" sz="quarter" idx="15"/>
+          </p:nvPr>
+        </p:nvSpPr>
+        <p:spPr>
+          <a:xfrm>
+            <a:off x="971550" y="2292349"/>
+            <a:ext cx="7740650" cy="1496691"/>
+          </a:xfrm>
+        </p:spPr>
+        <p:txBody>
+          <a:bodyPr/>
+          <a:lstStyle/>
+          <a:p>
+            <a:pPr marL="285750" indent="-285750">
+              <a:buFont typeface="Courier New" panose="02070309020205020404" pitchFamily="49" charset="0"/>
+              <a:buChar char="o"/>
+            </a:pPr>
+            <a:r>
+              <a:rPr lang="de-DE" dirty="0"/>
+              <a:t>Trigger zur Reaktion auf Änderung von Feeds</a:t>
+            </a:r>
+          </a:p>
+          <a:p>
+            <a:pPr marL="285750" indent="-285750">
+              <a:buFont typeface="Courier New" panose="02070309020205020404" pitchFamily="49" charset="0"/>
+              <a:buChar char="o"/>
+            </a:pPr>
+            <a:r>
+              <a:rPr lang="de-DE" dirty="0"/>
+              <a:t>Reaktion:</a:t>
+            </a:r>
+          </a:p>
+          <a:p>
+            <a:pPr marL="469900" lvl="2" indent="-285750"/>
+            <a:r>
+              <a:rPr lang="de-DE" dirty="0"/>
+              <a:t>Feed Wert setzen</a:t>
+            </a:r>
+          </a:p>
+          <a:p>
+            <a:pPr marL="469900" lvl="2" indent="-285750"/>
+            <a:r>
+              <a:rPr lang="de-DE" dirty="0"/>
+              <a:t>Email versenden</a:t>
+            </a:r>
+          </a:p>
+        </p:txBody>
+      </p:sp>
+      <p:sp>
+        <p:nvSpPr>
+          <p:cNvPr id="4" name="Titel 3"/>
+          <p:cNvSpPr>
+            <a:spLocks noGrp="1"/>
+          </p:cNvSpPr>
+          <p:nvPr>
+            <p:ph type="title"/>
+          </p:nvPr>
+        </p:nvSpPr>
+        <p:spPr/>
+        <p:txBody>
+          <a:bodyPr/>
+          <a:lstStyle/>
+          <a:p>
+            <a:r>
+              <a:rPr lang="de-DE" dirty="0" err="1"/>
+              <a:t>Adafruit</a:t>
+            </a:r>
+            <a:r>
+              <a:rPr lang="de-DE" dirty="0"/>
+              <a:t> IO - Triggers</a:t>
+            </a:r>
+          </a:p>
+        </p:txBody>
+      </p:sp>
+      <p:sp>
+        <p:nvSpPr>
+          <p:cNvPr id="5" name="Fußzeilenplatzhalter 4"/>
+          <p:cNvSpPr>
+            <a:spLocks noGrp="1"/>
+          </p:cNvSpPr>
+          <p:nvPr>
+            <p:ph type="ftr" sz="quarter" idx="16"/>
+          </p:nvPr>
+        </p:nvSpPr>
+        <p:spPr/>
+        <p:txBody>
+          <a:bodyPr/>
+          <a:lstStyle/>
+          <a:p>
+            <a:r>
+              <a:rPr lang="en-US" altLang="de-DE"/>
+              <a:t>Hochschule Mannheim | Julia Geigl, Clemens Behr, Kevin Höfle</a:t>
+            </a:r>
+            <a:endParaRPr lang="de-DE" altLang="de-DE" dirty="0"/>
+          </a:p>
+        </p:txBody>
+      </p:sp>
+    </p:spTree>
+    <p:extLst>
+      <p:ext uri="{BB962C8B-B14F-4D97-AF65-F5344CB8AC3E}">
+        <p14:creationId xmlns:p14="http://schemas.microsoft.com/office/powerpoint/2010/main" val="4255730159"/>
+      </p:ext>
+    </p:extLst>
+  </p:cSld>
+  <p:clrMapOvr>
+    <a:masterClrMapping/>
+  </p:clrMapOvr>
+  <p:transition/>
+</p:sld>
+</file>
+
+<file path=ppt/slides/slide4.xml><?xml version="1.0" encoding="utf-8"?>
+<p:sld xmlns:a="http://schemas.openxmlformats.org/drawingml/2006/main" xmlns:r="http://schemas.openxmlformats.org/officeDocument/2006/relationships" xmlns:p="http://schemas.openxmlformats.org/presentationml/2006/main">
+  <p:cSld>
+    <p:spTree>
+      <p:nvGrpSpPr>
+        <p:cNvPr id="1" name=""/>
+        <p:cNvGrpSpPr/>
+        <p:nvPr/>
+      </p:nvGrpSpPr>
+      <p:grpSpPr>
+        <a:xfrm>
+          <a:off x="0" y="0"/>
+          <a:ext cx="0" cy="0"/>
+          <a:chOff x="0" y="0"/>
+          <a:chExt cx="0" cy="0"/>
+        </a:xfrm>
+      </p:grpSpPr>
+      <p:sp>
+        <p:nvSpPr>
+          <p:cNvPr id="2" name="Foliennummernplatzhalter 1"/>
+          <p:cNvSpPr>
+            <a:spLocks noGrp="1"/>
+          </p:cNvSpPr>
+          <p:nvPr>
+            <p:ph type="sldNum" sz="quarter" idx="11"/>
+          </p:nvPr>
+        </p:nvSpPr>
+        <p:spPr/>
+        <p:txBody>
+          <a:bodyPr/>
+          <a:lstStyle/>
+          <a:p>
+            <a:fld id="{57D12BB6-0ED4-46B6-AB23-7758AD07EFBF}" type="slidenum">
+              <a:rPr lang="de-DE" smtClean="0"/>
+              <a:pPr/>
+              <a:t>4</a:t>
+            </a:fld>
+            <a:endParaRPr lang="de-DE" dirty="0"/>
+          </a:p>
+        </p:txBody>
+      </p:sp>
+      <p:sp>
+        <p:nvSpPr>
+          <p:cNvPr id="3" name="Textplatzhalter 2"/>
+          <p:cNvSpPr>
+            <a:spLocks noGrp="1"/>
+          </p:cNvSpPr>
+          <p:nvPr>
+            <p:ph type="body" sz="quarter" idx="15"/>
+          </p:nvPr>
+        </p:nvSpPr>
+        <p:spPr/>
+        <p:txBody>
+          <a:bodyPr/>
+          <a:lstStyle/>
+          <a:p>
+            <a:pPr>
+              <a:buFont typeface="Arial" panose="020B0604020202020204" pitchFamily="34" charset="0"/>
+              <a:buChar char="•"/>
+            </a:pPr>
+            <a:r>
+              <a:rPr lang="de-DE" dirty="0"/>
+              <a:t>Messen der Luftfeuchtigkeit und Temperatur im Zusammenhang mit Fensterstatus </a:t>
+            </a:r>
+          </a:p>
+          <a:p>
+            <a:pPr marL="285750" indent="-285750">
+              <a:buFont typeface="Arial" panose="020B0604020202020204" pitchFamily="34" charset="0"/>
+              <a:buChar char="•"/>
+            </a:pPr>
+            <a:endParaRPr lang="de-DE" dirty="0"/>
+          </a:p>
+          <a:p>
+            <a:pPr>
+              <a:buFont typeface="Arial" panose="020B0604020202020204" pitchFamily="34" charset="0"/>
+              <a:buChar char="•"/>
+            </a:pPr>
+            <a:r>
+              <a:rPr lang="de-DE" dirty="0"/>
+              <a:t>Speichern und Visualisieren der Daten</a:t>
+            </a:r>
+          </a:p>
+          <a:p>
+            <a:pPr>
+              <a:buFont typeface="Arial" panose="020B0604020202020204" pitchFamily="34" charset="0"/>
+              <a:buChar char="•"/>
+            </a:pPr>
+            <a:endParaRPr lang="de-DE" dirty="0"/>
+          </a:p>
+          <a:p>
+            <a:pPr>
+              <a:buFont typeface="Arial" panose="020B0604020202020204" pitchFamily="34" charset="0"/>
+              <a:buChar char="•"/>
+            </a:pPr>
+            <a:r>
+              <a:rPr lang="de-DE" dirty="0"/>
+              <a:t>Aktion bei Überschreitung eines Feuchtigkeits- oder Temperatur-Wertes</a:t>
+            </a:r>
+          </a:p>
+          <a:p>
+            <a:pPr>
+              <a:buFont typeface="Arial" panose="020B0604020202020204" pitchFamily="34" charset="0"/>
+              <a:buChar char="•"/>
+            </a:pPr>
+            <a:endParaRPr lang="de-DE" dirty="0"/>
+          </a:p>
+          <a:p>
+            <a:pPr marL="0" indent="0">
+              <a:buNone/>
+            </a:pPr>
+            <a:endParaRPr lang="de-DE" dirty="0"/>
+          </a:p>
+          <a:p>
+            <a:endParaRPr lang="de-DE" dirty="0"/>
+          </a:p>
+        </p:txBody>
+      </p:sp>
+      <p:sp>
+        <p:nvSpPr>
+          <p:cNvPr id="4" name="Titel 3"/>
+          <p:cNvSpPr>
+            <a:spLocks noGrp="1"/>
+          </p:cNvSpPr>
+          <p:nvPr>
+            <p:ph type="title"/>
+          </p:nvPr>
+        </p:nvSpPr>
+        <p:spPr/>
+        <p:txBody>
+          <a:bodyPr/>
+          <a:lstStyle/>
+          <a:p>
+            <a:r>
+              <a:rPr lang="de-DE" dirty="0"/>
+              <a:t>Grund Konzept</a:t>
+            </a:r>
+          </a:p>
+        </p:txBody>
+      </p:sp>
+      <p:sp>
+        <p:nvSpPr>
+          <p:cNvPr id="5" name="Fußzeilenplatzhalter 4"/>
+          <p:cNvSpPr>
+            <a:spLocks noGrp="1"/>
+          </p:cNvSpPr>
+          <p:nvPr>
+            <p:ph type="ftr" sz="quarter" idx="16"/>
+          </p:nvPr>
+        </p:nvSpPr>
+        <p:spPr/>
+        <p:txBody>
+          <a:bodyPr/>
+          <a:lstStyle/>
+          <a:p>
+            <a:r>
+              <a:rPr lang="en-US" altLang="de-DE"/>
+              <a:t>Hochschule Mannheim | Julia Geigl, Clemens Behr, Kevin Höfle</a:t>
+            </a:r>
+            <a:endParaRPr lang="de-DE" altLang="de-DE" dirty="0"/>
+          </a:p>
+        </p:txBody>
+      </p:sp>
+    </p:spTree>
+    <p:extLst>
+      <p:ext uri="{BB962C8B-B14F-4D97-AF65-F5344CB8AC3E}">
+        <p14:creationId xmlns:p14="http://schemas.microsoft.com/office/powerpoint/2010/main" val="3888361227"/>
+      </p:ext>
+    </p:extLst>
+  </p:cSld>
+  <p:clrMapOvr>
+    <a:masterClrMapping/>
+  </p:clrMapOvr>
+  <p:transition/>
+</p:sld>
+</file>
+
+<file path=ppt/slides/slide40.xml><?xml version="1.0" encoding="utf-8"?>
+<p:sld xmlns:a="http://schemas.openxmlformats.org/drawingml/2006/main" xmlns:r="http://schemas.openxmlformats.org/officeDocument/2006/relationships" xmlns:p="http://schemas.openxmlformats.org/presentationml/2006/main">
+  <p:cSld>
+    <p:spTree>
+      <p:nvGrpSpPr>
+        <p:cNvPr id="1" name=""/>
+        <p:cNvGrpSpPr/>
+        <p:nvPr/>
+      </p:nvGrpSpPr>
+      <p:grpSpPr>
+        <a:xfrm>
+          <a:off x="0" y="0"/>
+          <a:ext cx="0" cy="0"/>
+          <a:chOff x="0" y="0"/>
+          <a:chExt cx="0" cy="0"/>
+        </a:xfrm>
+      </p:grpSpPr>
+      <p:sp>
+        <p:nvSpPr>
+          <p:cNvPr id="2" name="Foliennummernplatzhalter 1"/>
+          <p:cNvSpPr>
+            <a:spLocks noGrp="1"/>
+          </p:cNvSpPr>
+          <p:nvPr>
+            <p:ph type="sldNum" sz="quarter" idx="11"/>
+          </p:nvPr>
+        </p:nvSpPr>
+        <p:spPr/>
+        <p:txBody>
+          <a:bodyPr/>
+          <a:lstStyle/>
+          <a:p>
+            <a:fld id="{57D12BB6-0ED4-46B6-AB23-7758AD07EFBF}" type="slidenum">
+              <a:rPr lang="de-DE" smtClean="0"/>
+              <a:pPr/>
+              <a:t>40</a:t>
+            </a:fld>
+            <a:endParaRPr lang="de-DE" dirty="0"/>
+          </a:p>
+        </p:txBody>
+      </p:sp>
+      <p:sp>
+        <p:nvSpPr>
+          <p:cNvPr id="3" name="Textplatzhalter 2"/>
+          <p:cNvSpPr>
+            <a:spLocks noGrp="1"/>
+          </p:cNvSpPr>
+          <p:nvPr>
+            <p:ph type="body" sz="quarter" idx="15"/>
+          </p:nvPr>
+        </p:nvSpPr>
+        <p:spPr/>
+        <p:txBody>
+          <a:bodyPr/>
+          <a:lstStyle/>
+          <a:p>
+            <a:pPr marL="285750" indent="-285750">
+              <a:buFont typeface="Courier New" panose="02070309020205020404" pitchFamily="49" charset="0"/>
+              <a:buChar char="o"/>
+            </a:pPr>
+            <a:r>
+              <a:rPr lang="de-DE" dirty="0">
+                <a:hlinkClick r:id="rId2"/>
+              </a:rPr>
+              <a:t>https://ifttt.com/</a:t>
+            </a:r>
+            <a:endParaRPr lang="de-DE" dirty="0"/>
+          </a:p>
+          <a:p>
+            <a:pPr marL="285750" indent="-285750">
+              <a:buFont typeface="Courier New" panose="02070309020205020404" pitchFamily="49" charset="0"/>
+              <a:buChar char="o"/>
+            </a:pPr>
+            <a:r>
+              <a:rPr lang="de-DE" dirty="0"/>
+              <a:t>Applet:</a:t>
+            </a:r>
+          </a:p>
+          <a:p>
+            <a:pPr marL="495300" lvl="3" indent="-285750">
+              <a:buFont typeface="Arial" panose="020B0604020202020204" pitchFamily="34" charset="0"/>
+              <a:buChar char="•"/>
+            </a:pPr>
+            <a:r>
+              <a:rPr lang="de-DE" dirty="0"/>
+              <a:t>Entspricht Trigger</a:t>
+            </a:r>
+          </a:p>
+          <a:p>
+            <a:pPr marL="495300" lvl="3" indent="-285750">
+              <a:buFont typeface="Arial" panose="020B0604020202020204" pitchFamily="34" charset="0"/>
+              <a:buChar char="•"/>
+            </a:pPr>
+            <a:r>
+              <a:rPr lang="de-DE" dirty="0"/>
+              <a:t>Dienst registrieren</a:t>
+            </a:r>
+          </a:p>
+          <a:p>
+            <a:pPr marL="495300" lvl="3" indent="-285750">
+              <a:buFont typeface="Arial" panose="020B0604020202020204" pitchFamily="34" charset="0"/>
+              <a:buChar char="•"/>
+            </a:pPr>
+            <a:r>
+              <a:rPr lang="de-DE" dirty="0"/>
+              <a:t>Auf Dienst reagieren</a:t>
+            </a:r>
+          </a:p>
+          <a:p>
+            <a:pPr marL="495300" lvl="3" indent="-285750">
+              <a:buFont typeface="Arial" panose="020B0604020202020204" pitchFamily="34" charset="0"/>
+              <a:buChar char="•"/>
+            </a:pPr>
+            <a:r>
+              <a:rPr lang="de-DE" dirty="0"/>
+              <a:t>Dienst verwenden</a:t>
+            </a:r>
+          </a:p>
+        </p:txBody>
+      </p:sp>
+      <p:sp>
+        <p:nvSpPr>
+          <p:cNvPr id="4" name="Titel 3"/>
+          <p:cNvSpPr>
+            <a:spLocks noGrp="1"/>
+          </p:cNvSpPr>
+          <p:nvPr>
+            <p:ph type="title"/>
+          </p:nvPr>
+        </p:nvSpPr>
+        <p:spPr/>
+        <p:txBody>
+          <a:bodyPr/>
+          <a:lstStyle/>
+          <a:p>
+            <a:r>
+              <a:rPr lang="de-DE" dirty="0"/>
+              <a:t>IFTTT – </a:t>
+            </a:r>
+            <a:r>
+              <a:rPr lang="de-DE" dirty="0" err="1"/>
+              <a:t>If</a:t>
+            </a:r>
+            <a:r>
+              <a:rPr lang="de-DE" dirty="0"/>
+              <a:t> This </a:t>
+            </a:r>
+            <a:r>
+              <a:rPr lang="de-DE" dirty="0" err="1"/>
+              <a:t>Than</a:t>
+            </a:r>
+            <a:r>
+              <a:rPr lang="de-DE" dirty="0"/>
+              <a:t> </a:t>
+            </a:r>
+            <a:r>
+              <a:rPr lang="de-DE" dirty="0" err="1"/>
+              <a:t>That</a:t>
+            </a:r>
+            <a:endParaRPr lang="de-DE" dirty="0"/>
+          </a:p>
+        </p:txBody>
+      </p:sp>
+      <p:sp>
+        <p:nvSpPr>
+          <p:cNvPr id="5" name="Fußzeilenplatzhalter 4"/>
+          <p:cNvSpPr>
+            <a:spLocks noGrp="1"/>
+          </p:cNvSpPr>
+          <p:nvPr>
+            <p:ph type="ftr" sz="quarter" idx="16"/>
+          </p:nvPr>
+        </p:nvSpPr>
+        <p:spPr/>
+        <p:txBody>
+          <a:bodyPr/>
+          <a:lstStyle/>
+          <a:p>
+            <a:r>
+              <a:rPr lang="en-US" altLang="de-DE"/>
+              <a:t>Hochschule Mannheim | Julia Geigl, Clemens Behr, Kevin Höfle</a:t>
+            </a:r>
+            <a:endParaRPr lang="de-DE" altLang="de-DE" dirty="0"/>
+          </a:p>
+        </p:txBody>
+      </p:sp>
+      <p:pic>
+        <p:nvPicPr>
+          <p:cNvPr id="6" name="Grafik 5"/>
+          <p:cNvPicPr>
+            <a:picLocks noChangeAspect="1"/>
+          </p:cNvPicPr>
+          <p:nvPr/>
+        </p:nvPicPr>
+        <p:blipFill>
+          <a:blip r:embed="rId3"/>
+          <a:stretch>
+            <a:fillRect/>
+          </a:stretch>
+        </p:blipFill>
+        <p:spPr>
+          <a:xfrm>
+            <a:off x="5164236" y="1322388"/>
+            <a:ext cx="2847975" cy="4914900"/>
+          </a:xfrm>
+          <a:prstGeom prst="rect">
+            <a:avLst/>
+          </a:prstGeom>
+        </p:spPr>
+      </p:pic>
+    </p:spTree>
+    <p:extLst>
+      <p:ext uri="{BB962C8B-B14F-4D97-AF65-F5344CB8AC3E}">
+        <p14:creationId xmlns:p14="http://schemas.microsoft.com/office/powerpoint/2010/main" val="1415227468"/>
+      </p:ext>
+    </p:extLst>
+  </p:cSld>
+  <p:clrMapOvr>
+    <a:masterClrMapping/>
+  </p:clrMapOvr>
+  <p:transition/>
+</p:sld>
+</file>
+
+<file path=ppt/slides/slide41.xml><?xml version="1.0" encoding="utf-8"?>
+<p:sld xmlns:a="http://schemas.openxmlformats.org/drawingml/2006/main" xmlns:r="http://schemas.openxmlformats.org/officeDocument/2006/relationships" xmlns:p="http://schemas.openxmlformats.org/presentationml/2006/main">
+  <p:cSld>
+    <p:spTree>
+      <p:nvGrpSpPr>
+        <p:cNvPr id="1" name=""/>
+        <p:cNvGrpSpPr/>
+        <p:nvPr/>
+      </p:nvGrpSpPr>
+      <p:grpSpPr>
+        <a:xfrm>
+          <a:off x="0" y="0"/>
+          <a:ext cx="0" cy="0"/>
+          <a:chOff x="0" y="0"/>
+          <a:chExt cx="0" cy="0"/>
+        </a:xfrm>
+      </p:grpSpPr>
+      <p:sp>
+        <p:nvSpPr>
+          <p:cNvPr id="2" name="Foliennummernplatzhalter 1"/>
+          <p:cNvSpPr>
+            <a:spLocks noGrp="1"/>
+          </p:cNvSpPr>
+          <p:nvPr>
+            <p:ph type="sldNum" sz="quarter" idx="11"/>
+          </p:nvPr>
+        </p:nvSpPr>
+        <p:spPr/>
+        <p:txBody>
+          <a:bodyPr/>
+          <a:lstStyle/>
+          <a:p>
+            <a:fld id="{57D12BB6-0ED4-46B6-AB23-7758AD07EFBF}" type="slidenum">
+              <a:rPr lang="de-DE" smtClean="0"/>
+              <a:pPr/>
+              <a:t>41</a:t>
+            </a:fld>
+            <a:endParaRPr lang="de-DE" dirty="0"/>
+          </a:p>
+        </p:txBody>
+      </p:sp>
+      <p:pic>
+        <p:nvPicPr>
+          <p:cNvPr id="6" name="Grafik 5"/>
+          <p:cNvPicPr>
+            <a:picLocks noChangeAspect="1"/>
+          </p:cNvPicPr>
+          <p:nvPr/>
+        </p:nvPicPr>
+        <p:blipFill>
+          <a:blip r:embed="rId2"/>
+          <a:stretch>
+            <a:fillRect/>
+          </a:stretch>
+        </p:blipFill>
+        <p:spPr>
+          <a:xfrm>
+            <a:off x="719572" y="2309306"/>
+            <a:ext cx="7848364" cy="3457671"/>
+          </a:xfrm>
+          <a:prstGeom prst="rect">
+            <a:avLst/>
+          </a:prstGeom>
+        </p:spPr>
+      </p:pic>
+      <p:sp>
+        <p:nvSpPr>
+          <p:cNvPr id="4" name="Titel 3"/>
+          <p:cNvSpPr>
+            <a:spLocks noGrp="1"/>
+          </p:cNvSpPr>
+          <p:nvPr>
+            <p:ph type="title"/>
+          </p:nvPr>
+        </p:nvSpPr>
+        <p:spPr/>
+        <p:txBody>
+          <a:bodyPr/>
+          <a:lstStyle/>
+          <a:p>
+            <a:r>
+              <a:rPr lang="de-DE" dirty="0"/>
+              <a:t>IFTTT - Dienste</a:t>
+            </a:r>
+          </a:p>
+        </p:txBody>
+      </p:sp>
+      <p:sp>
+        <p:nvSpPr>
+          <p:cNvPr id="5" name="Fußzeilenplatzhalter 4"/>
+          <p:cNvSpPr>
+            <a:spLocks noGrp="1"/>
+          </p:cNvSpPr>
+          <p:nvPr>
+            <p:ph type="ftr" sz="quarter" idx="16"/>
+          </p:nvPr>
+        </p:nvSpPr>
+        <p:spPr/>
+        <p:txBody>
+          <a:bodyPr/>
+          <a:lstStyle/>
+          <a:p>
+            <a:r>
+              <a:rPr lang="en-US" altLang="de-DE"/>
+              <a:t>Hochschule Mannheim | Julia Geigl, Clemens Behr, Kevin Höfle</a:t>
+            </a:r>
+            <a:endParaRPr lang="de-DE" altLang="de-DE" dirty="0"/>
+          </a:p>
+        </p:txBody>
+      </p:sp>
+    </p:spTree>
+    <p:extLst>
+      <p:ext uri="{BB962C8B-B14F-4D97-AF65-F5344CB8AC3E}">
+        <p14:creationId xmlns:p14="http://schemas.microsoft.com/office/powerpoint/2010/main" val="2060748048"/>
+      </p:ext>
+    </p:extLst>
+  </p:cSld>
+  <p:clrMapOvr>
+    <a:masterClrMapping/>
+  </p:clrMapOvr>
+  <p:transition/>
+</p:sld>
+</file>
+
+<file path=ppt/slides/slide42.xml><?xml version="1.0" encoding="utf-8"?>
+<p:sld xmlns:a="http://schemas.openxmlformats.org/drawingml/2006/main" xmlns:r="http://schemas.openxmlformats.org/officeDocument/2006/relationships" xmlns:p="http://schemas.openxmlformats.org/presentationml/2006/main">
+  <p:cSld>
+    <p:spTree>
+      <p:nvGrpSpPr>
+        <p:cNvPr id="1" name=""/>
+        <p:cNvGrpSpPr/>
+        <p:nvPr/>
+      </p:nvGrpSpPr>
+      <p:grpSpPr>
+        <a:xfrm>
+          <a:off x="0" y="0"/>
+          <a:ext cx="0" cy="0"/>
+          <a:chOff x="0" y="0"/>
+          <a:chExt cx="0" cy="0"/>
+        </a:xfrm>
+      </p:grpSpPr>
+      <p:sp>
+        <p:nvSpPr>
+          <p:cNvPr id="2" name="Foliennummernplatzhalter 1"/>
+          <p:cNvSpPr>
+            <a:spLocks noGrp="1"/>
+          </p:cNvSpPr>
+          <p:nvPr>
+            <p:ph type="sldNum" sz="quarter" idx="11"/>
+          </p:nvPr>
+        </p:nvSpPr>
+        <p:spPr/>
+        <p:txBody>
+          <a:bodyPr/>
+          <a:lstStyle/>
+          <a:p>
+            <a:fld id="{57D12BB6-0ED4-46B6-AB23-7758AD07EFBF}" type="slidenum">
+              <a:rPr lang="de-DE" smtClean="0"/>
+              <a:pPr/>
+              <a:t>42</a:t>
+            </a:fld>
+            <a:endParaRPr lang="de-DE" dirty="0"/>
+          </a:p>
+        </p:txBody>
+      </p:sp>
+      <p:sp>
+        <p:nvSpPr>
+          <p:cNvPr id="3" name="Textplatzhalter 2"/>
+          <p:cNvSpPr>
+            <a:spLocks noGrp="1"/>
+          </p:cNvSpPr>
+          <p:nvPr>
+            <p:ph type="body" sz="quarter" idx="15"/>
+          </p:nvPr>
+        </p:nvSpPr>
+        <p:spPr/>
+        <p:txBody>
+          <a:bodyPr/>
+          <a:lstStyle/>
+          <a:p>
+            <a:pPr marL="0" indent="0">
+              <a:buNone/>
+            </a:pPr>
+            <a:endParaRPr lang="de-DE" dirty="0"/>
+          </a:p>
+        </p:txBody>
+      </p:sp>
+      <p:sp>
+        <p:nvSpPr>
+          <p:cNvPr id="4" name="Titel 3"/>
+          <p:cNvSpPr>
+            <a:spLocks noGrp="1"/>
+          </p:cNvSpPr>
+          <p:nvPr>
+            <p:ph type="title"/>
+          </p:nvPr>
+        </p:nvSpPr>
+        <p:spPr/>
+        <p:txBody>
+          <a:bodyPr/>
+          <a:lstStyle/>
+          <a:p>
+            <a:r>
+              <a:rPr lang="de-DE" dirty="0" err="1"/>
+              <a:t>Adafruit</a:t>
+            </a:r>
+            <a:r>
+              <a:rPr lang="de-DE" dirty="0"/>
+              <a:t> IO - Montage</a:t>
+            </a:r>
+          </a:p>
+        </p:txBody>
+      </p:sp>
+      <p:sp>
+        <p:nvSpPr>
+          <p:cNvPr id="5" name="Fußzeilenplatzhalter 4"/>
+          <p:cNvSpPr>
+            <a:spLocks noGrp="1"/>
+          </p:cNvSpPr>
+          <p:nvPr>
+            <p:ph type="ftr" sz="quarter" idx="16"/>
+          </p:nvPr>
+        </p:nvSpPr>
+        <p:spPr/>
+        <p:txBody>
+          <a:bodyPr/>
+          <a:lstStyle/>
+          <a:p>
+            <a:r>
+              <a:rPr lang="en-US" altLang="de-DE"/>
+              <a:t>Hochschule Mannheim | Julia Geigl, Clemens Behr, Kevin Höfle</a:t>
+            </a:r>
+            <a:endParaRPr lang="de-DE" altLang="de-DE" dirty="0"/>
+          </a:p>
+        </p:txBody>
+      </p:sp>
+      <p:pic>
+        <p:nvPicPr>
+          <p:cNvPr id="6" name="Grafik 5"/>
+          <p:cNvPicPr>
+            <a:picLocks noChangeAspect="1"/>
+          </p:cNvPicPr>
+          <p:nvPr/>
+        </p:nvPicPr>
+        <p:blipFill>
+          <a:blip r:embed="rId2" cstate="print">
+            <a:extLst>
+              <a:ext uri="{28A0092B-C50C-407E-A947-70E740481C1C}">
+                <a14:useLocalDpi xmlns:a14="http://schemas.microsoft.com/office/drawing/2010/main" val="0"/>
+              </a:ext>
+            </a:extLst>
+          </a:blip>
+          <a:stretch>
+            <a:fillRect/>
+          </a:stretch>
+        </p:blipFill>
+        <p:spPr>
+          <a:xfrm>
+            <a:off x="5004048" y="1427766"/>
+            <a:ext cx="2756130" cy="4906518"/>
+          </a:xfrm>
+          <a:prstGeom prst="rect">
+            <a:avLst/>
+          </a:prstGeom>
+        </p:spPr>
+      </p:pic>
+    </p:spTree>
+    <p:extLst>
+      <p:ext uri="{BB962C8B-B14F-4D97-AF65-F5344CB8AC3E}">
+        <p14:creationId xmlns:p14="http://schemas.microsoft.com/office/powerpoint/2010/main" val="3409337842"/>
+      </p:ext>
+    </p:extLst>
+  </p:cSld>
+  <p:clrMapOvr>
+    <a:masterClrMapping/>
+  </p:clrMapOvr>
+  <p:transition/>
+</p:sld>
+</file>
+
+<file path=ppt/slides/slide43.xml><?xml version="1.0" encoding="utf-8"?>
+<p:sld xmlns:a="http://schemas.openxmlformats.org/drawingml/2006/main" xmlns:r="http://schemas.openxmlformats.org/officeDocument/2006/relationships" xmlns:p="http://schemas.openxmlformats.org/presentationml/2006/main">
+  <p:cSld>
+    <p:spTree>
+      <p:nvGrpSpPr>
+        <p:cNvPr id="1" name=""/>
+        <p:cNvGrpSpPr/>
+        <p:nvPr/>
+      </p:nvGrpSpPr>
+      <p:grpSpPr>
+        <a:xfrm>
+          <a:off x="0" y="0"/>
+          <a:ext cx="0" cy="0"/>
+          <a:chOff x="0" y="0"/>
+          <a:chExt cx="0" cy="0"/>
+        </a:xfrm>
+      </p:grpSpPr>
+      <p:sp>
+        <p:nvSpPr>
+          <p:cNvPr id="2" name="Foliennummernplatzhalter 1"/>
+          <p:cNvSpPr>
+            <a:spLocks noGrp="1"/>
+          </p:cNvSpPr>
+          <p:nvPr>
+            <p:ph type="sldNum" sz="quarter" idx="11"/>
+          </p:nvPr>
+        </p:nvSpPr>
+        <p:spPr/>
+        <p:txBody>
+          <a:bodyPr/>
+          <a:lstStyle/>
+          <a:p>
+            <a:fld id="{57D12BB6-0ED4-46B6-AB23-7758AD07EFBF}" type="slidenum">
+              <a:rPr lang="de-DE" smtClean="0"/>
+              <a:pPr/>
+              <a:t>43</a:t>
+            </a:fld>
+            <a:endParaRPr lang="de-DE" dirty="0"/>
+          </a:p>
+        </p:txBody>
+      </p:sp>
+      <p:sp>
+        <p:nvSpPr>
+          <p:cNvPr id="3" name="Textplatzhalter 2"/>
+          <p:cNvSpPr>
+            <a:spLocks noGrp="1"/>
+          </p:cNvSpPr>
+          <p:nvPr>
+            <p:ph type="body" sz="quarter" idx="15"/>
+          </p:nvPr>
+        </p:nvSpPr>
+        <p:spPr>
+          <a:xfrm>
+            <a:off x="971550" y="2292349"/>
+            <a:ext cx="7740650" cy="4257675"/>
+          </a:xfrm>
+        </p:spPr>
+        <p:txBody>
+          <a:bodyPr/>
+          <a:lstStyle/>
+          <a:p>
+            <a:pPr marL="0" indent="0">
+              <a:buNone/>
+            </a:pPr>
+            <a:r>
+              <a:rPr lang="de-DE" sz="1000" dirty="0"/>
+              <a:t>[1] </a:t>
+            </a:r>
+            <a:r>
+              <a:rPr lang="de-DE" sz="1000" dirty="0">
+                <a:hlinkClick r:id="rId2"/>
+              </a:rPr>
+              <a:t>http://blog.gemalto.com/wp-content/uploads/2015/01/M2M-world-of-connected-services.jpg</a:t>
+            </a:r>
+            <a:r>
+              <a:rPr lang="de-DE" sz="1000" dirty="0"/>
+              <a:t> 05.11.2016</a:t>
+            </a:r>
+          </a:p>
+          <a:p>
+            <a:pPr marL="0" indent="0">
+              <a:buNone/>
+            </a:pPr>
+            <a:r>
+              <a:rPr lang="de-DE" sz="1000" dirty="0"/>
+              <a:t>[2] </a:t>
+            </a:r>
+            <a:r>
+              <a:rPr lang="de-DE" sz="1000" dirty="0">
+                <a:hlinkClick r:id="rId3"/>
+              </a:rPr>
+              <a:t>http://howtomechatronics.com/wp-content/uploads/2016/01/DHT11-DDHT22-Working-Principle.png?x57244</a:t>
+            </a:r>
+            <a:r>
+              <a:rPr lang="de-DE" sz="1000" dirty="0"/>
+              <a:t> 05.11.2016 </a:t>
+            </a:r>
+          </a:p>
+          <a:p>
+            <a:pPr marL="0" indent="0">
+              <a:buNone/>
+            </a:pPr>
+            <a:r>
+              <a:rPr lang="de-DE" sz="1000" dirty="0"/>
+              <a:t>[3] </a:t>
+            </a:r>
+            <a:r>
+              <a:rPr lang="de-DE" sz="1000" dirty="0">
+                <a:hlinkClick r:id="rId4"/>
+              </a:rPr>
+              <a:t>http://ic4l.net/wp-content/uploads/dht11-module-300x300.png</a:t>
+            </a:r>
+            <a:r>
+              <a:rPr lang="de-DE" sz="1000" dirty="0"/>
+              <a:t> 05.11.2016</a:t>
+            </a:r>
+          </a:p>
+          <a:p>
+            <a:pPr marL="0" indent="0">
+              <a:buNone/>
+            </a:pPr>
+            <a:r>
+              <a:rPr lang="de-DE" sz="1000" dirty="0"/>
+              <a:t>[4] DHT11 </a:t>
+            </a:r>
+            <a:r>
+              <a:rPr lang="de-DE" sz="1000" dirty="0" err="1"/>
+              <a:t>Humidity</a:t>
+            </a:r>
+            <a:r>
+              <a:rPr lang="de-DE" sz="1000" dirty="0"/>
+              <a:t> &amp; </a:t>
+            </a:r>
+            <a:r>
+              <a:rPr lang="de-DE" sz="1000" dirty="0" err="1"/>
+              <a:t>Temperature</a:t>
+            </a:r>
+            <a:r>
+              <a:rPr lang="de-DE" sz="1000" dirty="0"/>
+              <a:t> Sensor D-</a:t>
+            </a:r>
+            <a:r>
+              <a:rPr lang="de-DE" sz="1000" dirty="0" err="1"/>
+              <a:t>Robotics</a:t>
+            </a:r>
+            <a:r>
+              <a:rPr lang="de-DE" sz="1000" dirty="0"/>
+              <a:t> UK, D-</a:t>
+            </a:r>
+            <a:r>
+              <a:rPr lang="de-DE" sz="1000" dirty="0" err="1"/>
+              <a:t>Robotics</a:t>
+            </a:r>
+            <a:r>
+              <a:rPr lang="de-DE" sz="1000" dirty="0"/>
+              <a:t> 7/30/2010 </a:t>
+            </a:r>
+            <a:r>
+              <a:rPr lang="de-DE" sz="1000" dirty="0">
+                <a:hlinkClick r:id="rId5"/>
+              </a:rPr>
+              <a:t>http://www.micropik.com/PDF/dht11.pdf</a:t>
+            </a:r>
+            <a:r>
+              <a:rPr lang="de-DE" sz="1000" dirty="0"/>
+              <a:t> Seite XX, Absatz XX 05.11.2016</a:t>
+            </a:r>
+          </a:p>
+          <a:p>
+            <a:pPr marL="0" indent="0">
+              <a:buNone/>
+            </a:pPr>
+            <a:r>
+              <a:rPr lang="de-DE" sz="1000" dirty="0"/>
+              <a:t>[5] </a:t>
+            </a:r>
+            <a:r>
+              <a:rPr lang="de-DE" sz="1000" dirty="0">
+                <a:hlinkClick r:id="rId6"/>
+              </a:rPr>
+              <a:t>https://youtu.be/VelviRLkUeo</a:t>
+            </a:r>
+            <a:r>
+              <a:rPr lang="de-DE" sz="1000" dirty="0"/>
+              <a:t> 05.11.2016</a:t>
+            </a:r>
+          </a:p>
+          <a:p>
+            <a:pPr marL="0" indent="0">
+              <a:buNone/>
+            </a:pPr>
+            <a:r>
+              <a:rPr lang="de-DE" sz="1000" dirty="0"/>
+              <a:t>[6] </a:t>
+            </a:r>
+            <a:r>
+              <a:rPr lang="de-DE" sz="1000" dirty="0">
+                <a:hlinkClick r:id="rId7"/>
+              </a:rPr>
+              <a:t>https://www.adafruit.com/about</a:t>
+            </a:r>
+            <a:r>
+              <a:rPr lang="de-DE" sz="1000" dirty="0"/>
+              <a:t> 05.11.2016</a:t>
+            </a:r>
+          </a:p>
+          <a:p>
+            <a:pPr marL="0" indent="0">
+              <a:buNone/>
+            </a:pPr>
+            <a:r>
+              <a:rPr lang="de-DE" sz="1000" dirty="0"/>
+              <a:t>[7] </a:t>
+            </a:r>
+            <a:r>
+              <a:rPr lang="de-DE" sz="1000" dirty="0">
+                <a:hlinkClick r:id="rId8"/>
+              </a:rPr>
+              <a:t>https://io.adafruit.com/logos/logo_2x.png 05.11.2016</a:t>
+            </a:r>
+            <a:endParaRPr lang="de-DE" sz="1000" dirty="0"/>
+          </a:p>
+          <a:p>
+            <a:pPr marL="0" indent="0">
+              <a:buNone/>
+            </a:pPr>
+            <a:r>
+              <a:rPr lang="de-DE" sz="1000" dirty="0"/>
+              <a:t>[8] </a:t>
+            </a:r>
+            <a:r>
+              <a:rPr lang="de-DE" sz="1000" dirty="0">
+                <a:hlinkClick r:id="rId9"/>
+              </a:rPr>
+              <a:t>http://4sitewebsolutions.com/hvac/wp-content/uploads/2013/04/carrier3.png 06.11.2016</a:t>
+            </a:r>
+            <a:r>
+              <a:rPr lang="de-DE" sz="1000" dirty="0"/>
+              <a:t> </a:t>
+            </a:r>
+          </a:p>
+          <a:p>
+            <a:pPr marL="0" indent="0">
+              <a:buNone/>
+            </a:pPr>
+            <a:r>
+              <a:rPr lang="de-DE" sz="1000" dirty="0"/>
+              <a:t>[9] </a:t>
+            </a:r>
+            <a:r>
+              <a:rPr lang="de-DE" sz="1000" dirty="0">
+                <a:hlinkClick r:id="rId10"/>
+              </a:rPr>
+              <a:t>http://www.umweltbundesamt.de/themen/gesundheit/umwelteinfluesse-auf-den-menschen/schimmel/richtig-lueften-schimmelbildung-vermeiden 06.11.2016</a:t>
+            </a:r>
+            <a:endParaRPr lang="de-DE" sz="1000" dirty="0"/>
+          </a:p>
+          <a:p>
+            <a:pPr marL="0" indent="0">
+              <a:buNone/>
+            </a:pPr>
+            <a:r>
+              <a:rPr lang="de-DE" sz="1000" dirty="0"/>
+              <a:t>[10]http://images.google.de/imgres?imgurl=http%3A%2F%2Fwww.radon.com%2Fimages%2Ffigure6.gif&amp;imgrefurl=http%3A%2F%2Fwww.radon.com%2Fradon%2Fradon_analysis.html&amp;h=268&amp;w=337&amp;tbnid=OpSfZ3xZmypDgM%3A&amp;vet=1&amp;docid=NvviVYV6guTSMM&amp;ei=WKwhWKbEJcHlUea2gfgL&amp;tbm=isch&amp;client=firefox-b-ab&amp;iact=rc&amp;uact=3&amp;dur=460&amp;page=0&amp;start=0&amp;ndsp=41&amp;ved=0ahUKEwim0KyA_ZjQAhXBchQKHWZbAL8QMwggKAQwBA&amp;bih=969&amp;biw=1920 08.11.2016 </a:t>
+            </a:r>
+          </a:p>
+          <a:p>
+            <a:pPr marL="0" indent="0">
+              <a:buNone/>
+            </a:pPr>
+            <a:r>
+              <a:rPr lang="de-DE" sz="1000" dirty="0"/>
+              <a:t>[11] </a:t>
+            </a:r>
+            <a:r>
+              <a:rPr lang="de-DE" sz="1000" dirty="0">
+                <a:hlinkClick r:id="rId11"/>
+              </a:rPr>
+              <a:t>https://www.adafruit.com/category/17</a:t>
+            </a:r>
+            <a:r>
+              <a:rPr lang="de-DE" sz="1000" dirty="0"/>
+              <a:t> 	06.12.2016</a:t>
+            </a:r>
+          </a:p>
+          <a:p>
+            <a:pPr marL="0" indent="0">
+              <a:buNone/>
+            </a:pPr>
+            <a:r>
+              <a:rPr lang="de-DE" sz="1000" dirty="0"/>
+              <a:t>[12] </a:t>
+            </a:r>
+            <a:r>
+              <a:rPr lang="de-DE" sz="1000" dirty="0">
+                <a:hlinkClick r:id="rId12"/>
+              </a:rPr>
+              <a:t>https://learn.adafruit.com/adafruit-io/overview</a:t>
+            </a:r>
+            <a:r>
+              <a:rPr lang="de-DE" sz="1000" dirty="0"/>
+              <a:t>	06.12.2016</a:t>
+            </a:r>
+          </a:p>
+          <a:p>
+            <a:pPr marL="0" indent="0">
+              <a:buNone/>
+            </a:pPr>
+            <a:r>
+              <a:rPr lang="de-DE" sz="1000" dirty="0"/>
+              <a:t>[13] </a:t>
+            </a:r>
+            <a:r>
+              <a:rPr lang="de-DE" sz="1000" dirty="0">
+                <a:hlinkClick r:id="rId13"/>
+              </a:rPr>
+              <a:t>https://learn.adafruit.com/adafruit-io/client-libraries</a:t>
+            </a:r>
+            <a:r>
+              <a:rPr lang="de-DE" sz="1000" dirty="0"/>
+              <a:t>	06.12.2016</a:t>
+            </a:r>
+          </a:p>
+          <a:p>
+            <a:pPr marL="0" indent="0">
+              <a:buNone/>
+            </a:pPr>
+            <a:r>
+              <a:rPr lang="de-DE" sz="1000" dirty="0"/>
+              <a:t>[14] </a:t>
+            </a:r>
+            <a:r>
+              <a:rPr lang="de-DE" sz="1000" dirty="0">
+                <a:hlinkClick r:id="rId14"/>
+              </a:rPr>
+              <a:t>https://learn.adafruit.com/adafruit-io/browser</a:t>
+            </a:r>
+            <a:r>
+              <a:rPr lang="de-DE" sz="1000" dirty="0"/>
+              <a:t>		06.12.2016</a:t>
+            </a:r>
+          </a:p>
+          <a:p>
+            <a:pPr marL="0" indent="0">
+              <a:buNone/>
+            </a:pPr>
+            <a:r>
+              <a:rPr lang="de-DE" sz="1000" dirty="0"/>
+              <a:t>[15] </a:t>
+            </a:r>
+            <a:r>
+              <a:rPr lang="de-DE" sz="1000" dirty="0">
+                <a:hlinkClick r:id="rId15"/>
+              </a:rPr>
+              <a:t>https://learn.adafruit.com/adafruit-io/mqtt-api</a:t>
+            </a:r>
+            <a:r>
+              <a:rPr lang="de-DE" sz="1000" dirty="0"/>
+              <a:t>		06.12.2016</a:t>
+            </a:r>
+          </a:p>
+          <a:p>
+            <a:pPr marL="0" indent="0">
+              <a:buNone/>
+            </a:pPr>
+            <a:endParaRPr lang="de-DE" sz="1000" dirty="0"/>
+          </a:p>
+          <a:p>
+            <a:pPr marL="0" indent="0">
+              <a:buNone/>
+            </a:pPr>
+            <a:endParaRPr lang="de-DE" sz="1000" dirty="0"/>
+          </a:p>
+          <a:p>
+            <a:pPr marL="0" indent="0">
+              <a:buNone/>
+            </a:pPr>
+            <a:endParaRPr lang="de-DE" sz="1000" dirty="0"/>
+          </a:p>
+          <a:p>
+            <a:pPr marL="0" indent="0">
+              <a:buNone/>
+            </a:pPr>
+            <a:endParaRPr lang="de-DE" sz="1000" dirty="0"/>
+          </a:p>
+        </p:txBody>
+      </p:sp>
+      <p:sp>
+        <p:nvSpPr>
+          <p:cNvPr id="4" name="Titel 3"/>
+          <p:cNvSpPr>
+            <a:spLocks noGrp="1"/>
+          </p:cNvSpPr>
+          <p:nvPr>
+            <p:ph type="title"/>
+          </p:nvPr>
+        </p:nvSpPr>
+        <p:spPr/>
+        <p:txBody>
+          <a:bodyPr/>
+          <a:lstStyle/>
+          <a:p>
+            <a:r>
+              <a:rPr lang="de-DE" dirty="0"/>
+              <a:t>Quellen</a:t>
+            </a:r>
+          </a:p>
+        </p:txBody>
+      </p:sp>
+      <p:sp>
+        <p:nvSpPr>
+          <p:cNvPr id="5" name="Fußzeilenplatzhalter 4"/>
+          <p:cNvSpPr>
+            <a:spLocks noGrp="1"/>
+          </p:cNvSpPr>
+          <p:nvPr>
+            <p:ph type="ftr" sz="quarter" idx="16"/>
+          </p:nvPr>
+        </p:nvSpPr>
+        <p:spPr/>
+        <p:txBody>
+          <a:bodyPr/>
+          <a:lstStyle/>
+          <a:p>
+            <a:r>
+              <a:rPr lang="en-US" altLang="de-DE"/>
+              <a:t>Hochschule Mannheim | Julia Geigl, Clemens Behr, Kevin Höfle</a:t>
+            </a:r>
+            <a:endParaRPr lang="de-DE" altLang="de-DE" dirty="0"/>
+          </a:p>
+        </p:txBody>
+      </p:sp>
+    </p:spTree>
+    <p:extLst>
+      <p:ext uri="{BB962C8B-B14F-4D97-AF65-F5344CB8AC3E}">
+        <p14:creationId xmlns:p14="http://schemas.microsoft.com/office/powerpoint/2010/main" val="3863859420"/>
+      </p:ext>
+    </p:extLst>
+  </p:cSld>
+  <p:clrMapOvr>
+    <a:masterClrMapping/>
+  </p:clrMapOvr>
+  <p:transition/>
+</p:sld>
+</file>
+
+<file path=ppt/slides/slide44.xml><?xml version="1.0" encoding="utf-8"?>
+<p:sld xmlns:a="http://schemas.openxmlformats.org/drawingml/2006/main" xmlns:r="http://schemas.openxmlformats.org/officeDocument/2006/relationships" xmlns:p="http://schemas.openxmlformats.org/presentationml/2006/main">
+  <p:cSld>
+    <p:spTree>
+      <p:nvGrpSpPr>
+        <p:cNvPr id="1" name=""/>
+        <p:cNvGrpSpPr/>
+        <p:nvPr/>
+      </p:nvGrpSpPr>
+      <p:grpSpPr>
+        <a:xfrm>
+          <a:off x="0" y="0"/>
+          <a:ext cx="0" cy="0"/>
+          <a:chOff x="0" y="0"/>
+          <a:chExt cx="0" cy="0"/>
+        </a:xfrm>
+      </p:grpSpPr>
+      <p:sp>
+        <p:nvSpPr>
+          <p:cNvPr id="2" name="Foliennummernplatzhalter 1"/>
+          <p:cNvSpPr>
+            <a:spLocks noGrp="1"/>
+          </p:cNvSpPr>
+          <p:nvPr>
+            <p:ph type="sldNum" sz="quarter" idx="11"/>
+          </p:nvPr>
+        </p:nvSpPr>
+        <p:spPr/>
+        <p:txBody>
+          <a:bodyPr/>
+          <a:lstStyle/>
+          <a:p>
+            <a:fld id="{57D12BB6-0ED4-46B6-AB23-7758AD07EFBF}" type="slidenum">
+              <a:rPr lang="de-DE" smtClean="0"/>
+              <a:pPr/>
+              <a:t>44</a:t>
             </a:fld>
             <a:endParaRPr lang="de-DE" dirty="0"/>
           </a:p>
@@ -15643,7 +18991,7 @@
 </p:sld>
 </file>
 
-<file path=ppt/slides/slide3.xml><?xml version="1.0" encoding="utf-8"?>
+<file path=ppt/slides/slide45.xml><?xml version="1.0" encoding="utf-8"?>
 <p:sld xmlns:a="http://schemas.openxmlformats.org/drawingml/2006/main" xmlns:r="http://schemas.openxmlformats.org/officeDocument/2006/relationships" xmlns:p="http://schemas.openxmlformats.org/presentationml/2006/main">
   <p:cSld>
     <p:spTree>
@@ -15678,240 +19026,7 @@
             <a:fld id="{57D12BB6-0ED4-46B6-AB23-7758AD07EFBF}" type="slidenum">
               <a:rPr lang="de-DE" smtClean="0"/>
               <a:pPr/>
-              <a:t>3</a:t>
-            </a:fld>
-            <a:endParaRPr lang="de-DE" dirty="0"/>
-          </a:p>
-        </p:txBody>
-      </p:sp>
-      <p:sp>
-        <p:nvSpPr>
-          <p:cNvPr id="4" name="Titel 3"/>
-          <p:cNvSpPr>
-            <a:spLocks noGrp="1"/>
-          </p:cNvSpPr>
-          <p:nvPr>
-            <p:ph type="title"/>
-          </p:nvPr>
-        </p:nvSpPr>
-        <p:spPr>
-          <a:xfrm>
-            <a:off x="467544" y="2960948"/>
-            <a:ext cx="5040560" cy="863600"/>
-          </a:xfrm>
-        </p:spPr>
-        <p:txBody>
-          <a:bodyPr/>
-          <a:lstStyle/>
-          <a:p>
-            <a:r>
-              <a:rPr lang="de-DE" sz="9600" dirty="0"/>
-              <a:t>INTRO</a:t>
-            </a:r>
-            <a:br>
-              <a:rPr lang="de-DE" sz="9600" dirty="0"/>
-            </a:br>
-            <a:endParaRPr lang="de-DE" sz="9600" dirty="0"/>
-          </a:p>
-        </p:txBody>
-      </p:sp>
-      <p:sp>
-        <p:nvSpPr>
-          <p:cNvPr id="5" name="Fußzeilenplatzhalter 4"/>
-          <p:cNvSpPr>
-            <a:spLocks noGrp="1"/>
-          </p:cNvSpPr>
-          <p:nvPr>
-            <p:ph type="ftr" sz="quarter" idx="16"/>
-          </p:nvPr>
-        </p:nvSpPr>
-        <p:spPr/>
-        <p:txBody>
-          <a:bodyPr/>
-          <a:lstStyle/>
-          <a:p>
-            <a:r>
-              <a:rPr lang="en-US" altLang="de-DE"/>
-              <a:t>Hochschule Mannheim | Julia Geigl, Clemens Behr, Kevin Höfle</a:t>
-            </a:r>
-            <a:endParaRPr lang="de-DE" altLang="de-DE" dirty="0"/>
-          </a:p>
-        </p:txBody>
-      </p:sp>
-    </p:spTree>
-    <p:extLst>
-      <p:ext uri="{BB962C8B-B14F-4D97-AF65-F5344CB8AC3E}">
-        <p14:creationId xmlns:p14="http://schemas.microsoft.com/office/powerpoint/2010/main" val="2053114095"/>
-      </p:ext>
-    </p:extLst>
-  </p:cSld>
-  <p:clrMapOvr>
-    <a:masterClrMapping/>
-  </p:clrMapOvr>
-  <p:transition/>
-</p:sld>
-</file>
-
-<file path=ppt/slides/slide30.xml><?xml version="1.0" encoding="utf-8"?>
-<p:sld xmlns:a="http://schemas.openxmlformats.org/drawingml/2006/main" xmlns:r="http://schemas.openxmlformats.org/officeDocument/2006/relationships" xmlns:p="http://schemas.openxmlformats.org/presentationml/2006/main">
-  <p:cSld>
-    <p:spTree>
-      <p:nvGrpSpPr>
-        <p:cNvPr id="1" name=""/>
-        <p:cNvGrpSpPr/>
-        <p:nvPr/>
-      </p:nvGrpSpPr>
-      <p:grpSpPr>
-        <a:xfrm>
-          <a:off x="0" y="0"/>
-          <a:ext cx="0" cy="0"/>
-          <a:chOff x="0" y="0"/>
-          <a:chExt cx="0" cy="0"/>
-        </a:xfrm>
-      </p:grpSpPr>
-      <p:sp>
-        <p:nvSpPr>
-          <p:cNvPr id="2" name="Foliennummernplatzhalter 1"/>
-          <p:cNvSpPr>
-            <a:spLocks noGrp="1"/>
-          </p:cNvSpPr>
-          <p:nvPr>
-            <p:ph type="sldNum" sz="quarter" idx="11"/>
-          </p:nvPr>
-        </p:nvSpPr>
-        <p:spPr/>
-        <p:txBody>
-          <a:bodyPr/>
-          <a:lstStyle/>
-          <a:p>
-            <a:fld id="{57D12BB6-0ED4-46B6-AB23-7758AD07EFBF}" type="slidenum">
-              <a:rPr lang="de-DE" smtClean="0"/>
-              <a:pPr/>
-              <a:t>30</a:t>
-            </a:fld>
-            <a:endParaRPr lang="de-DE" dirty="0"/>
-          </a:p>
-        </p:txBody>
-      </p:sp>
-      <p:sp>
-        <p:nvSpPr>
-          <p:cNvPr id="4" name="Titel 3"/>
-          <p:cNvSpPr>
-            <a:spLocks noGrp="1"/>
-          </p:cNvSpPr>
-          <p:nvPr>
-            <p:ph type="title"/>
-          </p:nvPr>
-        </p:nvSpPr>
-        <p:spPr/>
-        <p:txBody>
-          <a:bodyPr/>
-          <a:lstStyle/>
-          <a:p>
-            <a:r>
-              <a:rPr lang="de-DE" dirty="0"/>
-              <a:t>ADAFRUIT IO</a:t>
-            </a:r>
-          </a:p>
-        </p:txBody>
-      </p:sp>
-      <p:sp>
-        <p:nvSpPr>
-          <p:cNvPr id="5" name="Fußzeilenplatzhalter 4"/>
-          <p:cNvSpPr>
-            <a:spLocks noGrp="1"/>
-          </p:cNvSpPr>
-          <p:nvPr>
-            <p:ph type="ftr" sz="quarter" idx="16"/>
-          </p:nvPr>
-        </p:nvSpPr>
-        <p:spPr/>
-        <p:txBody>
-          <a:bodyPr/>
-          <a:lstStyle/>
-          <a:p>
-            <a:r>
-              <a:rPr lang="en-US" altLang="de-DE"/>
-              <a:t>Hochschule Mannheim | Julia Geigl, Clemens Behr, Kevin Höfle</a:t>
-            </a:r>
-            <a:endParaRPr lang="de-DE" altLang="de-DE" dirty="0"/>
-          </a:p>
-        </p:txBody>
-      </p:sp>
-      <p:pic>
-        <p:nvPicPr>
-          <p:cNvPr id="6" name="Inhaltsplatzhalter 3"/>
-          <p:cNvPicPr>
-            <a:picLocks noChangeAspect="1"/>
-          </p:cNvPicPr>
-          <p:nvPr/>
-        </p:nvPicPr>
-        <p:blipFill>
-          <a:blip r:embed="rId2"/>
-          <a:stretch>
-            <a:fillRect/>
-          </a:stretch>
-        </p:blipFill>
-        <p:spPr>
-          <a:xfrm>
-            <a:off x="814" y="2094214"/>
-            <a:ext cx="9143185" cy="4174542"/>
-          </a:xfrm>
-          <a:prstGeom prst="rect">
-            <a:avLst/>
-          </a:prstGeom>
-        </p:spPr>
-      </p:pic>
-    </p:spTree>
-    <p:extLst>
-      <p:ext uri="{BB962C8B-B14F-4D97-AF65-F5344CB8AC3E}">
-        <p14:creationId xmlns:p14="http://schemas.microsoft.com/office/powerpoint/2010/main" val="1435382107"/>
-      </p:ext>
-    </p:extLst>
-  </p:cSld>
-  <p:clrMapOvr>
-    <a:masterClrMapping/>
-  </p:clrMapOvr>
-  <p:transition/>
-</p:sld>
-</file>
-
-<file path=ppt/slides/slide31.xml><?xml version="1.0" encoding="utf-8"?>
-<p:sld xmlns:a="http://schemas.openxmlformats.org/drawingml/2006/main" xmlns:r="http://schemas.openxmlformats.org/officeDocument/2006/relationships" xmlns:p="http://schemas.openxmlformats.org/presentationml/2006/main">
-  <p:cSld>
-    <p:spTree>
-      <p:nvGrpSpPr>
-        <p:cNvPr id="1" name=""/>
-        <p:cNvGrpSpPr/>
-        <p:nvPr/>
-      </p:nvGrpSpPr>
-      <p:grpSpPr>
-        <a:xfrm>
-          <a:off x="0" y="0"/>
-          <a:ext cx="0" cy="0"/>
-          <a:chOff x="0" y="0"/>
-          <a:chExt cx="0" cy="0"/>
-        </a:xfrm>
-      </p:grpSpPr>
-      <p:sp>
-        <p:nvSpPr>
-          <p:cNvPr id="2" name="Foliennummernplatzhalter 1"/>
-          <p:cNvSpPr>
-            <a:spLocks noGrp="1"/>
-          </p:cNvSpPr>
-          <p:nvPr>
-            <p:ph type="sldNum" sz="quarter" idx="11"/>
-          </p:nvPr>
-        </p:nvSpPr>
-        <p:spPr/>
-        <p:txBody>
-          <a:bodyPr/>
-          <a:lstStyle/>
-          <a:p>
-            <a:fld id="{57D12BB6-0ED4-46B6-AB23-7758AD07EFBF}" type="slidenum">
-              <a:rPr lang="de-DE" smtClean="0"/>
-              <a:pPr/>
-              <a:t>31</a:t>
+              <a:t>45</a:t>
             </a:fld>
             <a:endParaRPr lang="de-DE" dirty="0"/>
           </a:p>
@@ -16012,7 +19127,7 @@
 </p:sld>
 </file>
 
-<file path=ppt/slides/slide32.xml><?xml version="1.0" encoding="utf-8"?>
+<file path=ppt/slides/slide46.xml><?xml version="1.0" encoding="utf-8"?>
 <p:sld xmlns:a="http://schemas.openxmlformats.org/drawingml/2006/main" xmlns:r="http://schemas.openxmlformats.org/officeDocument/2006/relationships" xmlns:p="http://schemas.openxmlformats.org/presentationml/2006/main">
   <p:cSld>
     <p:spTree>
@@ -16047,683 +19162,7 @@
             <a:fld id="{57D12BB6-0ED4-46B6-AB23-7758AD07EFBF}" type="slidenum">
               <a:rPr lang="de-DE" smtClean="0"/>
               <a:pPr/>
-              <a:t>32</a:t>
-            </a:fld>
-            <a:endParaRPr lang="de-DE" dirty="0"/>
-          </a:p>
-        </p:txBody>
-      </p:sp>
-      <p:sp>
-        <p:nvSpPr>
-          <p:cNvPr id="4" name="Titel 3"/>
-          <p:cNvSpPr>
-            <a:spLocks noGrp="1"/>
-          </p:cNvSpPr>
-          <p:nvPr>
-            <p:ph type="title"/>
-          </p:nvPr>
-        </p:nvSpPr>
-        <p:spPr/>
-        <p:txBody>
-          <a:bodyPr/>
-          <a:lstStyle/>
-          <a:p>
-            <a:r>
-              <a:rPr lang="de-DE" dirty="0" err="1"/>
-              <a:t>Adafruit</a:t>
-            </a:r>
-            <a:r>
-              <a:rPr lang="de-DE" dirty="0"/>
-              <a:t> IO – </a:t>
-            </a:r>
-            <a:r>
-              <a:rPr lang="de-DE" dirty="0" err="1"/>
-              <a:t>Your</a:t>
-            </a:r>
-            <a:r>
-              <a:rPr lang="de-DE" dirty="0"/>
-              <a:t> </a:t>
-            </a:r>
-            <a:r>
-              <a:rPr lang="de-DE" dirty="0" err="1"/>
-              <a:t>feeds</a:t>
-            </a:r>
-            <a:endParaRPr lang="de-DE" dirty="0"/>
-          </a:p>
-        </p:txBody>
-      </p:sp>
-      <p:sp>
-        <p:nvSpPr>
-          <p:cNvPr id="5" name="Fußzeilenplatzhalter 4"/>
-          <p:cNvSpPr>
-            <a:spLocks noGrp="1"/>
-          </p:cNvSpPr>
-          <p:nvPr>
-            <p:ph type="ftr" sz="quarter" idx="16"/>
-          </p:nvPr>
-        </p:nvSpPr>
-        <p:spPr/>
-        <p:txBody>
-          <a:bodyPr/>
-          <a:lstStyle/>
-          <a:p>
-            <a:r>
-              <a:rPr lang="en-US" altLang="de-DE"/>
-              <a:t>Hochschule Mannheim | Julia Geigl, Clemens Behr, Kevin Höfle</a:t>
-            </a:r>
-            <a:endParaRPr lang="de-DE" altLang="de-DE" dirty="0"/>
-          </a:p>
-        </p:txBody>
-      </p:sp>
-      <p:pic>
-        <p:nvPicPr>
-          <p:cNvPr id="6" name="Inhaltsplatzhalter 3"/>
-          <p:cNvPicPr>
-            <a:picLocks noChangeAspect="1"/>
-          </p:cNvPicPr>
-          <p:nvPr/>
-        </p:nvPicPr>
-        <p:blipFill>
-          <a:blip r:embed="rId2"/>
-          <a:stretch>
-            <a:fillRect/>
-          </a:stretch>
-        </p:blipFill>
-        <p:spPr>
-          <a:xfrm>
-            <a:off x="10679" y="2456892"/>
-            <a:ext cx="9132623" cy="2196244"/>
-          </a:xfrm>
-          <a:prstGeom prst="rect">
-            <a:avLst/>
-          </a:prstGeom>
-        </p:spPr>
-      </p:pic>
-    </p:spTree>
-    <p:extLst>
-      <p:ext uri="{BB962C8B-B14F-4D97-AF65-F5344CB8AC3E}">
-        <p14:creationId xmlns:p14="http://schemas.microsoft.com/office/powerpoint/2010/main" val="2769674007"/>
-      </p:ext>
-    </p:extLst>
-  </p:cSld>
-  <p:clrMapOvr>
-    <a:masterClrMapping/>
-  </p:clrMapOvr>
-  <p:transition/>
-</p:sld>
-</file>
-
-<file path=ppt/slides/slide33.xml><?xml version="1.0" encoding="utf-8"?>
-<p:sld xmlns:a="http://schemas.openxmlformats.org/drawingml/2006/main" xmlns:r="http://schemas.openxmlformats.org/officeDocument/2006/relationships" xmlns:p="http://schemas.openxmlformats.org/presentationml/2006/main">
-  <p:cSld>
-    <p:spTree>
-      <p:nvGrpSpPr>
-        <p:cNvPr id="1" name=""/>
-        <p:cNvGrpSpPr/>
-        <p:nvPr/>
-      </p:nvGrpSpPr>
-      <p:grpSpPr>
-        <a:xfrm>
-          <a:off x="0" y="0"/>
-          <a:ext cx="0" cy="0"/>
-          <a:chOff x="0" y="0"/>
-          <a:chExt cx="0" cy="0"/>
-        </a:xfrm>
-      </p:grpSpPr>
-      <p:sp>
-        <p:nvSpPr>
-          <p:cNvPr id="2" name="Foliennummernplatzhalter 1"/>
-          <p:cNvSpPr>
-            <a:spLocks noGrp="1"/>
-          </p:cNvSpPr>
-          <p:nvPr>
-            <p:ph type="sldNum" sz="quarter" idx="11"/>
-          </p:nvPr>
-        </p:nvSpPr>
-        <p:spPr/>
-        <p:txBody>
-          <a:bodyPr/>
-          <a:lstStyle/>
-          <a:p>
-            <a:fld id="{57D12BB6-0ED4-46B6-AB23-7758AD07EFBF}" type="slidenum">
-              <a:rPr lang="de-DE" smtClean="0"/>
-              <a:pPr/>
-              <a:t>33</a:t>
-            </a:fld>
-            <a:endParaRPr lang="de-DE" dirty="0"/>
-          </a:p>
-        </p:txBody>
-      </p:sp>
-      <p:sp>
-        <p:nvSpPr>
-          <p:cNvPr id="4" name="Titel 3"/>
-          <p:cNvSpPr>
-            <a:spLocks noGrp="1"/>
-          </p:cNvSpPr>
-          <p:nvPr>
-            <p:ph type="title"/>
-          </p:nvPr>
-        </p:nvSpPr>
-        <p:spPr/>
-        <p:txBody>
-          <a:bodyPr/>
-          <a:lstStyle/>
-          <a:p>
-            <a:r>
-              <a:rPr lang="de-DE" dirty="0" err="1"/>
-              <a:t>Adafruit</a:t>
-            </a:r>
-            <a:r>
-              <a:rPr lang="de-DE" dirty="0"/>
-              <a:t> IO – Create </a:t>
-            </a:r>
-            <a:r>
-              <a:rPr lang="de-DE" dirty="0" err="1"/>
-              <a:t>feed</a:t>
-            </a:r>
-            <a:endParaRPr lang="de-DE" dirty="0"/>
-          </a:p>
-        </p:txBody>
-      </p:sp>
-      <p:sp>
-        <p:nvSpPr>
-          <p:cNvPr id="5" name="Fußzeilenplatzhalter 4"/>
-          <p:cNvSpPr>
-            <a:spLocks noGrp="1"/>
-          </p:cNvSpPr>
-          <p:nvPr>
-            <p:ph type="ftr" sz="quarter" idx="16"/>
-          </p:nvPr>
-        </p:nvSpPr>
-        <p:spPr/>
-        <p:txBody>
-          <a:bodyPr/>
-          <a:lstStyle/>
-          <a:p>
-            <a:r>
-              <a:rPr lang="en-US" altLang="de-DE"/>
-              <a:t>Hochschule Mannheim | Julia Geigl, Clemens Behr, Kevin Höfle</a:t>
-            </a:r>
-            <a:endParaRPr lang="de-DE" altLang="de-DE" dirty="0"/>
-          </a:p>
-        </p:txBody>
-      </p:sp>
-      <p:pic>
-        <p:nvPicPr>
-          <p:cNvPr id="6" name="Inhaltsplatzhalter 3"/>
-          <p:cNvPicPr>
-            <a:picLocks noChangeAspect="1"/>
-          </p:cNvPicPr>
-          <p:nvPr/>
-        </p:nvPicPr>
-        <p:blipFill>
-          <a:blip r:embed="rId2"/>
-          <a:stretch>
-            <a:fillRect/>
-          </a:stretch>
-        </p:blipFill>
-        <p:spPr>
-          <a:xfrm>
-            <a:off x="107504" y="2420888"/>
-            <a:ext cx="5070023" cy="1219256"/>
-          </a:xfrm>
-          <a:prstGeom prst="rect">
-            <a:avLst/>
-          </a:prstGeom>
-        </p:spPr>
-      </p:pic>
-      <p:sp>
-        <p:nvSpPr>
-          <p:cNvPr id="7" name="Pfeil nach rechts 4"/>
-          <p:cNvSpPr/>
-          <p:nvPr/>
-        </p:nvSpPr>
-        <p:spPr>
-          <a:xfrm rot="10800000">
-            <a:off x="5088506" y="2444746"/>
-            <a:ext cx="780863" cy="454937"/>
-          </a:xfrm>
-          <a:prstGeom prst="rightArrow">
-            <a:avLst/>
-          </a:prstGeom>
-          <a:solidFill>
-            <a:srgbClr val="FF0000"/>
-          </a:solidFill>
-        </p:spPr>
-        <p:style>
-          <a:lnRef idx="2">
-            <a:schemeClr val="accent1">
-              <a:shade val="50000"/>
-            </a:schemeClr>
-          </a:lnRef>
-          <a:fillRef idx="1">
-            <a:schemeClr val="accent1"/>
-          </a:fillRef>
-          <a:effectRef idx="0">
-            <a:schemeClr val="accent1"/>
-          </a:effectRef>
-          <a:fontRef idx="minor">
-            <a:schemeClr val="lt1"/>
-          </a:fontRef>
-        </p:style>
-        <p:txBody>
-          <a:bodyPr rtlCol="0" anchor="ctr"/>
-          <a:lstStyle/>
-          <a:p>
-            <a:pPr algn="ctr"/>
-            <a:endParaRPr lang="de-DE" sz="1351">
-              <a:solidFill>
-                <a:srgbClr val="FF0000"/>
-              </a:solidFill>
-            </a:endParaRPr>
-          </a:p>
-        </p:txBody>
-      </p:sp>
-      <p:pic>
-        <p:nvPicPr>
-          <p:cNvPr id="8" name="Grafik 7"/>
-          <p:cNvPicPr>
-            <a:picLocks noChangeAspect="1"/>
-          </p:cNvPicPr>
-          <p:nvPr/>
-        </p:nvPicPr>
-        <p:blipFill>
-          <a:blip r:embed="rId3"/>
-          <a:stretch>
-            <a:fillRect/>
-          </a:stretch>
-        </p:blipFill>
-        <p:spPr>
-          <a:xfrm>
-            <a:off x="4640651" y="3720402"/>
-            <a:ext cx="4237775" cy="1614203"/>
-          </a:xfrm>
-          <a:prstGeom prst="rect">
-            <a:avLst/>
-          </a:prstGeom>
-        </p:spPr>
-      </p:pic>
-    </p:spTree>
-    <p:extLst>
-      <p:ext uri="{BB962C8B-B14F-4D97-AF65-F5344CB8AC3E}">
-        <p14:creationId xmlns:p14="http://schemas.microsoft.com/office/powerpoint/2010/main" val="3321184630"/>
-      </p:ext>
-    </p:extLst>
-  </p:cSld>
-  <p:clrMapOvr>
-    <a:masterClrMapping/>
-  </p:clrMapOvr>
-  <p:transition/>
-</p:sld>
-</file>
-
-<file path=ppt/slides/slide34.xml><?xml version="1.0" encoding="utf-8"?>
-<p:sld xmlns:a="http://schemas.openxmlformats.org/drawingml/2006/main" xmlns:r="http://schemas.openxmlformats.org/officeDocument/2006/relationships" xmlns:p="http://schemas.openxmlformats.org/presentationml/2006/main">
-  <p:cSld>
-    <p:spTree>
-      <p:nvGrpSpPr>
-        <p:cNvPr id="1" name=""/>
-        <p:cNvGrpSpPr/>
-        <p:nvPr/>
-      </p:nvGrpSpPr>
-      <p:grpSpPr>
-        <a:xfrm>
-          <a:off x="0" y="0"/>
-          <a:ext cx="0" cy="0"/>
-          <a:chOff x="0" y="0"/>
-          <a:chExt cx="0" cy="0"/>
-        </a:xfrm>
-      </p:grpSpPr>
-      <p:sp>
-        <p:nvSpPr>
-          <p:cNvPr id="2" name="Foliennummernplatzhalter 1"/>
-          <p:cNvSpPr>
-            <a:spLocks noGrp="1"/>
-          </p:cNvSpPr>
-          <p:nvPr>
-            <p:ph type="sldNum" sz="quarter" idx="11"/>
-          </p:nvPr>
-        </p:nvSpPr>
-        <p:spPr/>
-        <p:txBody>
-          <a:bodyPr/>
-          <a:lstStyle/>
-          <a:p>
-            <a:fld id="{57D12BB6-0ED4-46B6-AB23-7758AD07EFBF}" type="slidenum">
-              <a:rPr lang="de-DE" smtClean="0"/>
-              <a:pPr/>
-              <a:t>34</a:t>
-            </a:fld>
-            <a:endParaRPr lang="de-DE" dirty="0"/>
-          </a:p>
-        </p:txBody>
-      </p:sp>
-      <p:sp>
-        <p:nvSpPr>
-          <p:cNvPr id="4" name="Titel 3"/>
-          <p:cNvSpPr>
-            <a:spLocks noGrp="1"/>
-          </p:cNvSpPr>
-          <p:nvPr>
-            <p:ph type="title"/>
-          </p:nvPr>
-        </p:nvSpPr>
-        <p:spPr/>
-        <p:txBody>
-          <a:bodyPr/>
-          <a:lstStyle/>
-          <a:p>
-            <a:r>
-              <a:rPr lang="de-DE" dirty="0" err="1"/>
-              <a:t>Adafruit</a:t>
-            </a:r>
-            <a:r>
-              <a:rPr lang="de-DE" dirty="0"/>
-              <a:t> IO Feed - Key</a:t>
-            </a:r>
-          </a:p>
-        </p:txBody>
-      </p:sp>
-      <p:sp>
-        <p:nvSpPr>
-          <p:cNvPr id="5" name="Fußzeilenplatzhalter 4"/>
-          <p:cNvSpPr>
-            <a:spLocks noGrp="1"/>
-          </p:cNvSpPr>
-          <p:nvPr>
-            <p:ph type="ftr" sz="quarter" idx="16"/>
-          </p:nvPr>
-        </p:nvSpPr>
-        <p:spPr/>
-        <p:txBody>
-          <a:bodyPr/>
-          <a:lstStyle/>
-          <a:p>
-            <a:r>
-              <a:rPr lang="en-US" altLang="de-DE"/>
-              <a:t>Hochschule Mannheim | Julia Geigl, Clemens Behr, Kevin Höfle</a:t>
-            </a:r>
-            <a:endParaRPr lang="de-DE" altLang="de-DE" dirty="0"/>
-          </a:p>
-        </p:txBody>
-      </p:sp>
-      <p:pic>
-        <p:nvPicPr>
-          <p:cNvPr id="6" name="Inhaltsplatzhalter 3"/>
-          <p:cNvPicPr>
-            <a:picLocks noChangeAspect="1"/>
-          </p:cNvPicPr>
-          <p:nvPr/>
-        </p:nvPicPr>
-        <p:blipFill>
-          <a:blip r:embed="rId2"/>
-          <a:stretch>
-            <a:fillRect/>
-          </a:stretch>
-        </p:blipFill>
-        <p:spPr>
-          <a:xfrm>
-            <a:off x="71500" y="2708920"/>
-            <a:ext cx="4214917" cy="2608831"/>
-          </a:xfrm>
-          <a:prstGeom prst="rect">
-            <a:avLst/>
-          </a:prstGeom>
-        </p:spPr>
-      </p:pic>
-      <p:sp>
-        <p:nvSpPr>
-          <p:cNvPr id="7" name="Pfeil nach links 4"/>
-          <p:cNvSpPr/>
-          <p:nvPr/>
-        </p:nvSpPr>
-        <p:spPr>
-          <a:xfrm>
-            <a:off x="4196606" y="2602785"/>
-            <a:ext cx="625959" cy="391887"/>
-          </a:xfrm>
-          <a:prstGeom prst="leftArrow">
-            <a:avLst/>
-          </a:prstGeom>
-          <a:solidFill>
-            <a:srgbClr val="FF0000"/>
-          </a:solidFill>
-        </p:spPr>
-        <p:style>
-          <a:lnRef idx="2">
-            <a:schemeClr val="accent1">
-              <a:shade val="50000"/>
-            </a:schemeClr>
-          </a:lnRef>
-          <a:fillRef idx="1">
-            <a:schemeClr val="accent1"/>
-          </a:fillRef>
-          <a:effectRef idx="0">
-            <a:schemeClr val="accent1"/>
-          </a:effectRef>
-          <a:fontRef idx="minor">
-            <a:schemeClr val="lt1"/>
-          </a:fontRef>
-        </p:style>
-        <p:txBody>
-          <a:bodyPr rtlCol="0" anchor="ctr"/>
-          <a:lstStyle/>
-          <a:p>
-            <a:pPr algn="ctr"/>
-            <a:endParaRPr lang="de-DE" sz="1351"/>
-          </a:p>
-        </p:txBody>
-      </p:sp>
-      <p:pic>
-        <p:nvPicPr>
-          <p:cNvPr id="8" name="Grafik 7"/>
-          <p:cNvPicPr>
-            <a:picLocks noChangeAspect="1"/>
-          </p:cNvPicPr>
-          <p:nvPr/>
-        </p:nvPicPr>
-        <p:blipFill>
-          <a:blip r:embed="rId3"/>
-          <a:stretch>
-            <a:fillRect/>
-          </a:stretch>
-        </p:blipFill>
-        <p:spPr>
-          <a:xfrm>
-            <a:off x="4877936" y="2602788"/>
-            <a:ext cx="4069741" cy="1495007"/>
-          </a:xfrm>
-          <a:prstGeom prst="rect">
-            <a:avLst/>
-          </a:prstGeom>
-        </p:spPr>
-      </p:pic>
-    </p:spTree>
-    <p:extLst>
-      <p:ext uri="{BB962C8B-B14F-4D97-AF65-F5344CB8AC3E}">
-        <p14:creationId xmlns:p14="http://schemas.microsoft.com/office/powerpoint/2010/main" val="789033031"/>
-      </p:ext>
-    </p:extLst>
-  </p:cSld>
-  <p:clrMapOvr>
-    <a:masterClrMapping/>
-  </p:clrMapOvr>
-  <p:transition/>
-</p:sld>
-</file>
-
-<file path=ppt/slides/slide35.xml><?xml version="1.0" encoding="utf-8"?>
-<p:sld xmlns:a="http://schemas.openxmlformats.org/drawingml/2006/main" xmlns:r="http://schemas.openxmlformats.org/officeDocument/2006/relationships" xmlns:p="http://schemas.openxmlformats.org/presentationml/2006/main">
-  <p:cSld>
-    <p:spTree>
-      <p:nvGrpSpPr>
-        <p:cNvPr id="1" name=""/>
-        <p:cNvGrpSpPr/>
-        <p:nvPr/>
-      </p:nvGrpSpPr>
-      <p:grpSpPr>
-        <a:xfrm>
-          <a:off x="0" y="0"/>
-          <a:ext cx="0" cy="0"/>
-          <a:chOff x="0" y="0"/>
-          <a:chExt cx="0" cy="0"/>
-        </a:xfrm>
-      </p:grpSpPr>
-      <p:sp>
-        <p:nvSpPr>
-          <p:cNvPr id="2" name="Foliennummernplatzhalter 1"/>
-          <p:cNvSpPr>
-            <a:spLocks noGrp="1"/>
-          </p:cNvSpPr>
-          <p:nvPr>
-            <p:ph type="sldNum" sz="quarter" idx="11"/>
-          </p:nvPr>
-        </p:nvSpPr>
-        <p:spPr/>
-        <p:txBody>
-          <a:bodyPr/>
-          <a:lstStyle/>
-          <a:p>
-            <a:fld id="{57D12BB6-0ED4-46B6-AB23-7758AD07EFBF}" type="slidenum">
-              <a:rPr lang="de-DE" smtClean="0"/>
-              <a:pPr/>
-              <a:t>35</a:t>
-            </a:fld>
-            <a:endParaRPr lang="de-DE" dirty="0"/>
-          </a:p>
-        </p:txBody>
-      </p:sp>
-      <p:sp>
-        <p:nvSpPr>
-          <p:cNvPr id="4" name="Titel 3"/>
-          <p:cNvSpPr>
-            <a:spLocks noGrp="1"/>
-          </p:cNvSpPr>
-          <p:nvPr>
-            <p:ph type="title"/>
-          </p:nvPr>
-        </p:nvSpPr>
-        <p:spPr/>
-        <p:txBody>
-          <a:bodyPr/>
-          <a:lstStyle/>
-          <a:p>
-            <a:r>
-              <a:rPr lang="de-DE" dirty="0" err="1"/>
-              <a:t>Adafruit</a:t>
-            </a:r>
-            <a:r>
-              <a:rPr lang="de-DE" dirty="0"/>
-              <a:t> IO – </a:t>
-            </a:r>
-            <a:r>
-              <a:rPr lang="de-DE" dirty="0" err="1"/>
-              <a:t>Your</a:t>
-            </a:r>
-            <a:r>
-              <a:rPr lang="de-DE" dirty="0"/>
-              <a:t> Groups</a:t>
-            </a:r>
-          </a:p>
-        </p:txBody>
-      </p:sp>
-      <p:sp>
-        <p:nvSpPr>
-          <p:cNvPr id="5" name="Fußzeilenplatzhalter 4"/>
-          <p:cNvSpPr>
-            <a:spLocks noGrp="1"/>
-          </p:cNvSpPr>
-          <p:nvPr>
-            <p:ph type="ftr" sz="quarter" idx="16"/>
-          </p:nvPr>
-        </p:nvSpPr>
-        <p:spPr/>
-        <p:txBody>
-          <a:bodyPr/>
-          <a:lstStyle/>
-          <a:p>
-            <a:r>
-              <a:rPr lang="en-US" altLang="de-DE"/>
-              <a:t>Hochschule Mannheim | Julia Geigl, Clemens Behr, Kevin Höfle</a:t>
-            </a:r>
-            <a:endParaRPr lang="de-DE" altLang="de-DE" dirty="0"/>
-          </a:p>
-        </p:txBody>
-      </p:sp>
-      <p:pic>
-        <p:nvPicPr>
-          <p:cNvPr id="6" name="Inhaltsplatzhalter 3"/>
-          <p:cNvPicPr>
-            <a:picLocks noChangeAspect="1"/>
-          </p:cNvPicPr>
-          <p:nvPr/>
-        </p:nvPicPr>
-        <p:blipFill>
-          <a:blip r:embed="rId2"/>
-          <a:stretch>
-            <a:fillRect/>
-          </a:stretch>
-        </p:blipFill>
-        <p:spPr>
-          <a:xfrm>
-            <a:off x="0" y="2291366"/>
-            <a:ext cx="9135773" cy="2253758"/>
-          </a:xfrm>
-          <a:prstGeom prst="rect">
-            <a:avLst/>
-          </a:prstGeom>
-        </p:spPr>
-      </p:pic>
-    </p:spTree>
-    <p:extLst>
-      <p:ext uri="{BB962C8B-B14F-4D97-AF65-F5344CB8AC3E}">
-        <p14:creationId xmlns:p14="http://schemas.microsoft.com/office/powerpoint/2010/main" val="2151750626"/>
-      </p:ext>
-    </p:extLst>
-  </p:cSld>
-  <p:clrMapOvr>
-    <a:masterClrMapping/>
-  </p:clrMapOvr>
-  <p:transition/>
-</p:sld>
-</file>
-
-<file path=ppt/slides/slide36.xml><?xml version="1.0" encoding="utf-8"?>
-<p:sld xmlns:a="http://schemas.openxmlformats.org/drawingml/2006/main" xmlns:r="http://schemas.openxmlformats.org/officeDocument/2006/relationships" xmlns:p="http://schemas.openxmlformats.org/presentationml/2006/main">
-  <p:cSld>
-    <p:spTree>
-      <p:nvGrpSpPr>
-        <p:cNvPr id="1" name=""/>
-        <p:cNvGrpSpPr/>
-        <p:nvPr/>
-      </p:nvGrpSpPr>
-      <p:grpSpPr>
-        <a:xfrm>
-          <a:off x="0" y="0"/>
-          <a:ext cx="0" cy="0"/>
-          <a:chOff x="0" y="0"/>
-          <a:chExt cx="0" cy="0"/>
-        </a:xfrm>
-      </p:grpSpPr>
-      <p:sp>
-        <p:nvSpPr>
-          <p:cNvPr id="2" name="Foliennummernplatzhalter 1"/>
-          <p:cNvSpPr>
-            <a:spLocks noGrp="1"/>
-          </p:cNvSpPr>
-          <p:nvPr>
-            <p:ph type="sldNum" sz="quarter" idx="11"/>
-          </p:nvPr>
-        </p:nvSpPr>
-        <p:spPr/>
-        <p:txBody>
-          <a:bodyPr/>
-          <a:lstStyle/>
-          <a:p>
-            <a:fld id="{57D12BB6-0ED4-46B6-AB23-7758AD07EFBF}" type="slidenum">
-              <a:rPr lang="de-DE" smtClean="0"/>
-              <a:pPr/>
-              <a:t>36</a:t>
+              <a:t>46</a:t>
             </a:fld>
             <a:endParaRPr lang="de-DE" dirty="0"/>
           </a:p>
@@ -16814,507 +19253,6 @@
     <p:extLst>
       <p:ext uri="{BB962C8B-B14F-4D97-AF65-F5344CB8AC3E}">
         <p14:creationId xmlns:p14="http://schemas.microsoft.com/office/powerpoint/2010/main" val="3934670538"/>
-      </p:ext>
-    </p:extLst>
-  </p:cSld>
-  <p:clrMapOvr>
-    <a:masterClrMapping/>
-  </p:clrMapOvr>
-  <p:transition/>
-</p:sld>
-</file>
-
-<file path=ppt/slides/slide37.xml><?xml version="1.0" encoding="utf-8"?>
-<p:sld xmlns:a="http://schemas.openxmlformats.org/drawingml/2006/main" xmlns:r="http://schemas.openxmlformats.org/officeDocument/2006/relationships" xmlns:p="http://schemas.openxmlformats.org/presentationml/2006/main">
-  <p:cSld>
-    <p:spTree>
-      <p:nvGrpSpPr>
-        <p:cNvPr id="1" name=""/>
-        <p:cNvGrpSpPr/>
-        <p:nvPr/>
-      </p:nvGrpSpPr>
-      <p:grpSpPr>
-        <a:xfrm>
-          <a:off x="0" y="0"/>
-          <a:ext cx="0" cy="0"/>
-          <a:chOff x="0" y="0"/>
-          <a:chExt cx="0" cy="0"/>
-        </a:xfrm>
-      </p:grpSpPr>
-      <p:sp>
-        <p:nvSpPr>
-          <p:cNvPr id="2" name="Foliennummernplatzhalter 1"/>
-          <p:cNvSpPr>
-            <a:spLocks noGrp="1"/>
-          </p:cNvSpPr>
-          <p:nvPr>
-            <p:ph type="sldNum" sz="quarter" idx="11"/>
-          </p:nvPr>
-        </p:nvSpPr>
-        <p:spPr/>
-        <p:txBody>
-          <a:bodyPr/>
-          <a:lstStyle/>
-          <a:p>
-            <a:fld id="{57D12BB6-0ED4-46B6-AB23-7758AD07EFBF}" type="slidenum">
-              <a:rPr lang="de-DE" smtClean="0"/>
-              <a:pPr/>
-              <a:t>37</a:t>
-            </a:fld>
-            <a:endParaRPr lang="de-DE" dirty="0"/>
-          </a:p>
-        </p:txBody>
-      </p:sp>
-      <p:sp>
-        <p:nvSpPr>
-          <p:cNvPr id="3" name="Textplatzhalter 2"/>
-          <p:cNvSpPr>
-            <a:spLocks noGrp="1"/>
-          </p:cNvSpPr>
-          <p:nvPr>
-            <p:ph type="body" sz="quarter" idx="15"/>
-          </p:nvPr>
-        </p:nvSpPr>
-        <p:spPr/>
-        <p:txBody>
-          <a:bodyPr/>
-          <a:lstStyle/>
-          <a:p>
-            <a:pPr marL="0" indent="0">
-              <a:buNone/>
-            </a:pPr>
-            <a:r>
-              <a:rPr lang="de-DE" sz="1000" dirty="0"/>
-              <a:t>[1] </a:t>
-            </a:r>
-            <a:r>
-              <a:rPr lang="de-DE" sz="1000" dirty="0">
-                <a:hlinkClick r:id="rId2"/>
-              </a:rPr>
-              <a:t>http://blog.gemalto.com/wp-content/uploads/2015/01/M2M-world-of-connected-services.jpg</a:t>
-            </a:r>
-            <a:r>
-              <a:rPr lang="de-DE" sz="1000" dirty="0"/>
-              <a:t> 05.11.2016</a:t>
-            </a:r>
-          </a:p>
-          <a:p>
-            <a:pPr marL="0" indent="0">
-              <a:buNone/>
-            </a:pPr>
-            <a:r>
-              <a:rPr lang="de-DE" sz="1000" dirty="0"/>
-              <a:t>[2] </a:t>
-            </a:r>
-            <a:r>
-              <a:rPr lang="de-DE" sz="1000" dirty="0">
-                <a:hlinkClick r:id="rId3"/>
-              </a:rPr>
-              <a:t>http://howtomechatronics.com/wp-content/uploads/2016/01/DHT11-DDHT22-Working-Principle.png?x57244</a:t>
-            </a:r>
-            <a:r>
-              <a:rPr lang="de-DE" sz="1000" dirty="0"/>
-              <a:t> 05.11.2016 </a:t>
-            </a:r>
-          </a:p>
-          <a:p>
-            <a:pPr marL="0" indent="0">
-              <a:buNone/>
-            </a:pPr>
-            <a:r>
-              <a:rPr lang="de-DE" sz="1000" dirty="0"/>
-              <a:t>[3] </a:t>
-            </a:r>
-            <a:r>
-              <a:rPr lang="de-DE" sz="1000" dirty="0">
-                <a:hlinkClick r:id="rId4"/>
-              </a:rPr>
-              <a:t>http://ic4l.net/wp-content/uploads/dht11-module-300x300.png</a:t>
-            </a:r>
-            <a:r>
-              <a:rPr lang="de-DE" sz="1000" dirty="0"/>
-              <a:t> 05.11.2016</a:t>
-            </a:r>
-          </a:p>
-          <a:p>
-            <a:pPr marL="0" indent="0">
-              <a:buNone/>
-            </a:pPr>
-            <a:r>
-              <a:rPr lang="de-DE" sz="1000" dirty="0"/>
-              <a:t>[4] DHT11 </a:t>
-            </a:r>
-            <a:r>
-              <a:rPr lang="de-DE" sz="1000" dirty="0" err="1"/>
-              <a:t>Humidity</a:t>
-            </a:r>
-            <a:r>
-              <a:rPr lang="de-DE" sz="1000" dirty="0"/>
-              <a:t> &amp; </a:t>
-            </a:r>
-            <a:r>
-              <a:rPr lang="de-DE" sz="1000" dirty="0" err="1"/>
-              <a:t>Temperature</a:t>
-            </a:r>
-            <a:r>
-              <a:rPr lang="de-DE" sz="1000" dirty="0"/>
-              <a:t> Sensor D-</a:t>
-            </a:r>
-            <a:r>
-              <a:rPr lang="de-DE" sz="1000" dirty="0" err="1"/>
-              <a:t>Robotics</a:t>
-            </a:r>
-            <a:r>
-              <a:rPr lang="de-DE" sz="1000" dirty="0"/>
-              <a:t> UK, D-</a:t>
-            </a:r>
-            <a:r>
-              <a:rPr lang="de-DE" sz="1000" dirty="0" err="1"/>
-              <a:t>Robotics</a:t>
-            </a:r>
-            <a:r>
-              <a:rPr lang="de-DE" sz="1000" dirty="0"/>
-              <a:t> 7/30/2010 </a:t>
-            </a:r>
-            <a:r>
-              <a:rPr lang="de-DE" sz="1000" dirty="0">
-                <a:hlinkClick r:id="rId5"/>
-              </a:rPr>
-              <a:t>http://www.micropik.com/PDF/dht11.pdf</a:t>
-            </a:r>
-            <a:r>
-              <a:rPr lang="de-DE" sz="1000" dirty="0"/>
-              <a:t> Seite XX, Absatz XX 05.11.2016</a:t>
-            </a:r>
-          </a:p>
-          <a:p>
-            <a:pPr marL="0" indent="0">
-              <a:buNone/>
-            </a:pPr>
-            <a:r>
-              <a:rPr lang="de-DE" sz="1000" dirty="0"/>
-              <a:t>[5] </a:t>
-            </a:r>
-            <a:r>
-              <a:rPr lang="de-DE" sz="1000" dirty="0">
-                <a:hlinkClick r:id="rId6"/>
-              </a:rPr>
-              <a:t>https://youtu.be/VelviRLkUeo</a:t>
-            </a:r>
-            <a:r>
-              <a:rPr lang="de-DE" sz="1000" dirty="0"/>
-              <a:t> 05.11.2016</a:t>
-            </a:r>
-          </a:p>
-          <a:p>
-            <a:pPr marL="0" indent="0">
-              <a:buNone/>
-            </a:pPr>
-            <a:r>
-              <a:rPr lang="de-DE" sz="1000" dirty="0"/>
-              <a:t>[6] </a:t>
-            </a:r>
-            <a:r>
-              <a:rPr lang="de-DE" sz="1000" dirty="0">
-                <a:hlinkClick r:id="rId7"/>
-              </a:rPr>
-              <a:t>https://www.adafruit.com/about</a:t>
-            </a:r>
-            <a:r>
-              <a:rPr lang="de-DE" sz="1000" dirty="0"/>
-              <a:t> 05.11.2016</a:t>
-            </a:r>
-          </a:p>
-          <a:p>
-            <a:pPr marL="0" indent="0">
-              <a:buNone/>
-            </a:pPr>
-            <a:r>
-              <a:rPr lang="de-DE" sz="1000" dirty="0"/>
-              <a:t>[7] </a:t>
-            </a:r>
-            <a:r>
-              <a:rPr lang="de-DE" sz="1000" dirty="0">
-                <a:hlinkClick r:id="rId8"/>
-              </a:rPr>
-              <a:t>https://io.adafruit.com/logos/logo_2x.png 05.11.2016</a:t>
-            </a:r>
-            <a:endParaRPr lang="de-DE" sz="1000" dirty="0"/>
-          </a:p>
-          <a:p>
-            <a:pPr marL="0" indent="0">
-              <a:buNone/>
-            </a:pPr>
-            <a:r>
-              <a:rPr lang="de-DE" sz="1000" dirty="0"/>
-              <a:t>[8] </a:t>
-            </a:r>
-            <a:r>
-              <a:rPr lang="de-DE" sz="1000" dirty="0">
-                <a:hlinkClick r:id="rId9"/>
-              </a:rPr>
-              <a:t>http://4sitewebsolutions.com/hvac/wp-content/uploads/2013/04/carrier3.png 06.11.2016</a:t>
-            </a:r>
-            <a:r>
-              <a:rPr lang="de-DE" sz="1000" dirty="0"/>
-              <a:t> </a:t>
-            </a:r>
-          </a:p>
-          <a:p>
-            <a:pPr marL="0" indent="0">
-              <a:buNone/>
-            </a:pPr>
-            <a:r>
-              <a:rPr lang="de-DE" sz="1000" dirty="0"/>
-              <a:t>[9] </a:t>
-            </a:r>
-            <a:r>
-              <a:rPr lang="de-DE" sz="1000" dirty="0">
-                <a:hlinkClick r:id="rId10"/>
-              </a:rPr>
-              <a:t>http://www.umweltbundesamt.de/themen/gesundheit/umwelteinfluesse-auf-den-menschen/schimmel/richtig-lueften-schimmelbildung-vermeiden 06.11.2016</a:t>
-            </a:r>
-            <a:endParaRPr lang="de-DE" sz="1000" dirty="0"/>
-          </a:p>
-          <a:p>
-            <a:pPr marL="0" indent="0">
-              <a:buNone/>
-            </a:pPr>
-            <a:r>
-              <a:rPr lang="de-DE" sz="1000" dirty="0"/>
-              <a:t>[10]http://images.google.de/imgres?imgurl=http%3A%2F%2Fwww.radon.com%2Fimages%2Ffigure6.gif&amp;imgrefurl=http%3A%2F%2Fwww.radon.com%2Fradon%2Fradon_analysis.html&amp;h=268&amp;w=337&amp;tbnid=OpSfZ3xZmypDgM%3A&amp;vet=1&amp;docid=NvviVYV6guTSMM&amp;ei=WKwhWKbEJcHlUea2gfgL&amp;tbm=isch&amp;client=firefox-b-ab&amp;iact=rc&amp;uact=3&amp;dur=460&amp;page=0&amp;start=0&amp;ndsp=41&amp;ved=0ahUKEwim0KyA_ZjQAhXBchQKHWZbAL8QMwggKAQwBA&amp;bih=969&amp;biw=1920 08.11.2016 </a:t>
-            </a:r>
-          </a:p>
-          <a:p>
-            <a:endParaRPr lang="de-DE" sz="1000" dirty="0"/>
-          </a:p>
-        </p:txBody>
-      </p:sp>
-      <p:sp>
-        <p:nvSpPr>
-          <p:cNvPr id="4" name="Titel 3"/>
-          <p:cNvSpPr>
-            <a:spLocks noGrp="1"/>
-          </p:cNvSpPr>
-          <p:nvPr>
-            <p:ph type="title"/>
-          </p:nvPr>
-        </p:nvSpPr>
-        <p:spPr/>
-        <p:txBody>
-          <a:bodyPr/>
-          <a:lstStyle/>
-          <a:p>
-            <a:r>
-              <a:rPr lang="de-DE" dirty="0"/>
-              <a:t>Quellen</a:t>
-            </a:r>
-          </a:p>
-        </p:txBody>
-      </p:sp>
-      <p:sp>
-        <p:nvSpPr>
-          <p:cNvPr id="5" name="Fußzeilenplatzhalter 4"/>
-          <p:cNvSpPr>
-            <a:spLocks noGrp="1"/>
-          </p:cNvSpPr>
-          <p:nvPr>
-            <p:ph type="ftr" sz="quarter" idx="16"/>
-          </p:nvPr>
-        </p:nvSpPr>
-        <p:spPr/>
-        <p:txBody>
-          <a:bodyPr/>
-          <a:lstStyle/>
-          <a:p>
-            <a:r>
-              <a:rPr lang="en-US" altLang="de-DE"/>
-              <a:t>Hochschule Mannheim | Julia Geigl, Clemens Behr, Kevin Höfle</a:t>
-            </a:r>
-            <a:endParaRPr lang="de-DE" altLang="de-DE" dirty="0"/>
-          </a:p>
-        </p:txBody>
-      </p:sp>
-    </p:spTree>
-    <p:extLst>
-      <p:ext uri="{BB962C8B-B14F-4D97-AF65-F5344CB8AC3E}">
-        <p14:creationId xmlns:p14="http://schemas.microsoft.com/office/powerpoint/2010/main" val="3863859420"/>
-      </p:ext>
-    </p:extLst>
-  </p:cSld>
-  <p:clrMapOvr>
-    <a:masterClrMapping/>
-  </p:clrMapOvr>
-  <p:transition/>
-</p:sld>
-</file>
-
-<file path=ppt/slides/slide4.xml><?xml version="1.0" encoding="utf-8"?>
-<p:sld xmlns:a="http://schemas.openxmlformats.org/drawingml/2006/main" xmlns:r="http://schemas.openxmlformats.org/officeDocument/2006/relationships" xmlns:p="http://schemas.openxmlformats.org/presentationml/2006/main">
-  <p:cSld>
-    <p:spTree>
-      <p:nvGrpSpPr>
-        <p:cNvPr id="1" name=""/>
-        <p:cNvGrpSpPr/>
-        <p:nvPr/>
-      </p:nvGrpSpPr>
-      <p:grpSpPr>
-        <a:xfrm>
-          <a:off x="0" y="0"/>
-          <a:ext cx="0" cy="0"/>
-          <a:chOff x="0" y="0"/>
-          <a:chExt cx="0" cy="0"/>
-        </a:xfrm>
-      </p:grpSpPr>
-      <p:sp>
-        <p:nvSpPr>
-          <p:cNvPr id="2" name="Foliennummernplatzhalter 1"/>
-          <p:cNvSpPr>
-            <a:spLocks noGrp="1"/>
-          </p:cNvSpPr>
-          <p:nvPr>
-            <p:ph type="sldNum" sz="quarter" idx="11"/>
-          </p:nvPr>
-        </p:nvSpPr>
-        <p:spPr/>
-        <p:txBody>
-          <a:bodyPr/>
-          <a:lstStyle/>
-          <a:p>
-            <a:fld id="{57D12BB6-0ED4-46B6-AB23-7758AD07EFBF}" type="slidenum">
-              <a:rPr lang="de-DE" smtClean="0"/>
-              <a:pPr/>
-              <a:t>4</a:t>
-            </a:fld>
-            <a:endParaRPr lang="de-DE" dirty="0"/>
-          </a:p>
-        </p:txBody>
-      </p:sp>
-      <p:sp>
-        <p:nvSpPr>
-          <p:cNvPr id="3" name="Textplatzhalter 2"/>
-          <p:cNvSpPr>
-            <a:spLocks noGrp="1"/>
-          </p:cNvSpPr>
-          <p:nvPr>
-            <p:ph type="body" sz="quarter" idx="15"/>
-          </p:nvPr>
-        </p:nvSpPr>
-        <p:spPr/>
-        <p:txBody>
-          <a:bodyPr/>
-          <a:lstStyle/>
-          <a:p>
-            <a:pPr>
-              <a:buFont typeface="Arial" panose="020B0604020202020204" pitchFamily="34" charset="0"/>
-              <a:buChar char="•"/>
-            </a:pPr>
-            <a:r>
-              <a:rPr lang="de-DE" dirty="0"/>
-              <a:t>Messen der Luftfeuchtigkeit und Temperatur im Zusammenhang mit Fensterstatus </a:t>
-            </a:r>
-          </a:p>
-          <a:p>
-            <a:pPr marL="285750" indent="-285750">
-              <a:buFont typeface="Arial" panose="020B0604020202020204" pitchFamily="34" charset="0"/>
-              <a:buChar char="•"/>
-            </a:pPr>
-            <a:endParaRPr lang="de-DE" dirty="0"/>
-          </a:p>
-          <a:p>
-            <a:pPr>
-              <a:buFont typeface="Arial" panose="020B0604020202020204" pitchFamily="34" charset="0"/>
-              <a:buChar char="•"/>
-            </a:pPr>
-            <a:r>
-              <a:rPr lang="de-DE" dirty="0"/>
-              <a:t>Speichern und Visualisieren der Daten</a:t>
-            </a:r>
-          </a:p>
-          <a:p>
-            <a:pPr>
-              <a:buFont typeface="Arial" panose="020B0604020202020204" pitchFamily="34" charset="0"/>
-              <a:buChar char="•"/>
-            </a:pPr>
-            <a:endParaRPr lang="de-DE" dirty="0"/>
-          </a:p>
-          <a:p>
-            <a:pPr>
-              <a:buFont typeface="Arial" panose="020B0604020202020204" pitchFamily="34" charset="0"/>
-              <a:buChar char="•"/>
-            </a:pPr>
-            <a:r>
-              <a:rPr lang="de-DE" dirty="0"/>
-              <a:t>Aktion bei Überschreitung eines Feuchtigkeits- oder Temperatur-Wertes</a:t>
-            </a:r>
-          </a:p>
-          <a:p>
-            <a:pPr>
-              <a:buFont typeface="Arial" panose="020B0604020202020204" pitchFamily="34" charset="0"/>
-              <a:buChar char="•"/>
-            </a:pPr>
-            <a:endParaRPr lang="de-DE" dirty="0"/>
-          </a:p>
-          <a:p>
-            <a:pPr marL="0" indent="0">
-              <a:buNone/>
-            </a:pPr>
-            <a:endParaRPr lang="de-DE" dirty="0"/>
-          </a:p>
-          <a:p>
-            <a:endParaRPr lang="de-DE" dirty="0"/>
-          </a:p>
-        </p:txBody>
-      </p:sp>
-      <p:sp>
-        <p:nvSpPr>
-          <p:cNvPr id="4" name="Titel 3"/>
-          <p:cNvSpPr>
-            <a:spLocks noGrp="1"/>
-          </p:cNvSpPr>
-          <p:nvPr>
-            <p:ph type="title"/>
-          </p:nvPr>
-        </p:nvSpPr>
-        <p:spPr/>
-        <p:txBody>
-          <a:bodyPr/>
-          <a:lstStyle/>
-          <a:p>
-            <a:r>
-              <a:rPr lang="de-DE" dirty="0"/>
-              <a:t>Grund Konzept</a:t>
-            </a:r>
-          </a:p>
-        </p:txBody>
-      </p:sp>
-      <p:sp>
-        <p:nvSpPr>
-          <p:cNvPr id="5" name="Fußzeilenplatzhalter 4"/>
-          <p:cNvSpPr>
-            <a:spLocks noGrp="1"/>
-          </p:cNvSpPr>
-          <p:nvPr>
-            <p:ph type="ftr" sz="quarter" idx="16"/>
-          </p:nvPr>
-        </p:nvSpPr>
-        <p:spPr/>
-        <p:txBody>
-          <a:bodyPr/>
-          <a:lstStyle/>
-          <a:p>
-            <a:r>
-              <a:rPr lang="en-US" altLang="de-DE"/>
-              <a:t>Hochschule Mannheim | Julia Geigl, Clemens Behr, Kevin Höfle</a:t>
-            </a:r>
-            <a:endParaRPr lang="de-DE" altLang="de-DE" dirty="0"/>
-          </a:p>
-        </p:txBody>
-      </p:sp>
-    </p:spTree>
-    <p:extLst>
-      <p:ext uri="{BB962C8B-B14F-4D97-AF65-F5344CB8AC3E}">
-        <p14:creationId xmlns:p14="http://schemas.microsoft.com/office/powerpoint/2010/main" val="3888361227"/>
       </p:ext>
     </p:extLst>
   </p:cSld>
@@ -18093,7 +20031,6 @@
               <a:rPr lang="de-DE" dirty="0"/>
               <a:t>-Sensoren</a:t>
             </a:r>
-            <a:endParaRPr lang="de-DE" dirty="0"/>
           </a:p>
         </p:txBody>
       </p:sp>

</xml_diff>

<commit_message>
meisten Folien für IoT Plattform in Live Demo verschoben
</commit_message>
<xml_diff>
--- a/PES_FH_VERS.pptx
+++ b/PES_FH_VERS.pptx
@@ -6,10 +6,10 @@
     <p:sldMasterId id="2147483666" r:id="rId2"/>
   </p:sldMasterIdLst>
   <p:notesMasterIdLst>
-    <p:notesMasterId r:id="rId58"/>
+    <p:notesMasterId r:id="rId59"/>
   </p:notesMasterIdLst>
   <p:handoutMasterIdLst>
-    <p:handoutMasterId r:id="rId59"/>
+    <p:handoutMasterId r:id="rId60"/>
   </p:handoutMasterIdLst>
   <p:sldIdLst>
     <p:sldId id="256" r:id="rId3"/>
@@ -52,21 +52,22 @@
     <p:sldId id="354" r:id="rId40"/>
     <p:sldId id="355" r:id="rId41"/>
     <p:sldId id="356" r:id="rId42"/>
-    <p:sldId id="332" r:id="rId43"/>
-    <p:sldId id="334" r:id="rId44"/>
-    <p:sldId id="335" r:id="rId45"/>
-    <p:sldId id="330" r:id="rId46"/>
-    <p:sldId id="333" r:id="rId47"/>
-    <p:sldId id="357" r:id="rId48"/>
-    <p:sldId id="358" r:id="rId49"/>
-    <p:sldId id="359" r:id="rId50"/>
-    <p:sldId id="360" r:id="rId51"/>
-    <p:sldId id="376" r:id="rId52"/>
-    <p:sldId id="337" r:id="rId53"/>
-    <p:sldId id="364" r:id="rId54"/>
-    <p:sldId id="329" r:id="rId55"/>
-    <p:sldId id="331" r:id="rId56"/>
-    <p:sldId id="336" r:id="rId57"/>
+    <p:sldId id="377" r:id="rId43"/>
+    <p:sldId id="332" r:id="rId44"/>
+    <p:sldId id="334" r:id="rId45"/>
+    <p:sldId id="335" r:id="rId46"/>
+    <p:sldId id="330" r:id="rId47"/>
+    <p:sldId id="333" r:id="rId48"/>
+    <p:sldId id="357" r:id="rId49"/>
+    <p:sldId id="358" r:id="rId50"/>
+    <p:sldId id="359" r:id="rId51"/>
+    <p:sldId id="360" r:id="rId52"/>
+    <p:sldId id="376" r:id="rId53"/>
+    <p:sldId id="337" r:id="rId54"/>
+    <p:sldId id="364" r:id="rId55"/>
+    <p:sldId id="329" r:id="rId56"/>
+    <p:sldId id="331" r:id="rId57"/>
+    <p:sldId id="336" r:id="rId58"/>
   </p:sldIdLst>
   <p:sldSz cx="9144000" cy="6858000" type="screen4x3"/>
   <p:notesSz cx="6858000" cy="9144000"/>
@@ -260,6 +261,7 @@
             <p14:sldId id="354"/>
             <p14:sldId id="355"/>
             <p14:sldId id="356"/>
+            <p14:sldId id="377"/>
             <p14:sldId id="332"/>
             <p14:sldId id="334"/>
             <p14:sldId id="335"/>
@@ -3801,7 +3803,7 @@
             <a:fld id="{1760A340-2167-4270-89CF-50EB6C0DB420}" type="slidenum">
               <a:rPr lang="de-DE" altLang="de-DE" smtClean="0"/>
               <a:pPr/>
-              <a:t>41</a:t>
+              <a:t>42</a:t>
             </a:fld>
             <a:endParaRPr lang="de-DE" altLang="de-DE"/>
           </a:p>
@@ -3909,7 +3911,7 @@
             <a:fld id="{1760A340-2167-4270-89CF-50EB6C0DB420}" type="slidenum">
               <a:rPr lang="de-DE" altLang="de-DE" smtClean="0"/>
               <a:pPr/>
-              <a:t>43</a:t>
+              <a:t>44</a:t>
             </a:fld>
             <a:endParaRPr lang="de-DE" altLang="de-DE"/>
           </a:p>
@@ -4017,7 +4019,7 @@
             <a:fld id="{1760A340-2167-4270-89CF-50EB6C0DB420}" type="slidenum">
               <a:rPr lang="de-DE" altLang="de-DE" smtClean="0"/>
               <a:pPr/>
-              <a:t>44</a:t>
+              <a:t>45</a:t>
             </a:fld>
             <a:endParaRPr lang="de-DE" altLang="de-DE"/>
           </a:p>
@@ -4125,7 +4127,7 @@
             <a:fld id="{1760A340-2167-4270-89CF-50EB6C0DB420}" type="slidenum">
               <a:rPr lang="de-DE" altLang="de-DE" smtClean="0"/>
               <a:pPr/>
-              <a:t>45</a:t>
+              <a:t>46</a:t>
             </a:fld>
             <a:endParaRPr lang="de-DE" altLang="de-DE"/>
           </a:p>
@@ -4233,7 +4235,7 @@
             <a:fld id="{1760A340-2167-4270-89CF-50EB6C0DB420}" type="slidenum">
               <a:rPr lang="de-DE" altLang="de-DE" smtClean="0"/>
               <a:pPr/>
-              <a:t>46</a:t>
+              <a:t>47</a:t>
             </a:fld>
             <a:endParaRPr lang="de-DE" altLang="de-DE"/>
           </a:p>
@@ -4341,7 +4343,7 @@
             <a:fld id="{1760A340-2167-4270-89CF-50EB6C0DB420}" type="slidenum">
               <a:rPr lang="de-DE" altLang="de-DE" smtClean="0"/>
               <a:pPr/>
-              <a:t>47</a:t>
+              <a:t>48</a:t>
             </a:fld>
             <a:endParaRPr lang="de-DE" altLang="de-DE"/>
           </a:p>
@@ -4449,7 +4451,7 @@
             <a:fld id="{1760A340-2167-4270-89CF-50EB6C0DB420}" type="slidenum">
               <a:rPr lang="de-DE" altLang="de-DE" smtClean="0"/>
               <a:pPr/>
-              <a:t>48</a:t>
+              <a:t>49</a:t>
             </a:fld>
             <a:endParaRPr lang="de-DE" altLang="de-DE"/>
           </a:p>
@@ -4665,7 +4667,7 @@
             <a:fld id="{1760A340-2167-4270-89CF-50EB6C0DB420}" type="slidenum">
               <a:rPr lang="de-DE" altLang="de-DE" smtClean="0"/>
               <a:pPr/>
-              <a:t>49</a:t>
+              <a:t>50</a:t>
             </a:fld>
             <a:endParaRPr lang="de-DE" altLang="de-DE"/>
           </a:p>
@@ -4753,7 +4755,7 @@
             <a:fld id="{1760A340-2167-4270-89CF-50EB6C0DB420}" type="slidenum">
               <a:rPr lang="de-DE" altLang="de-DE" smtClean="0"/>
               <a:pPr/>
-              <a:t>50</a:t>
+              <a:t>51</a:t>
             </a:fld>
             <a:endParaRPr lang="de-DE" altLang="de-DE"/>
           </a:p>
@@ -19468,7 +19470,7 @@
         </p:nvSpPr>
         <p:spPr>
           <a:xfrm>
-            <a:off x="1943708" y="2600908"/>
+            <a:off x="539552" y="2204864"/>
             <a:ext cx="1322057" cy="552893"/>
           </a:xfrm>
           <a:prstGeom prst="rect">
@@ -19523,7 +19525,7 @@
         </p:nvSpPr>
         <p:spPr>
           <a:xfrm>
-            <a:off x="1947252" y="3561383"/>
+            <a:off x="543096" y="3165339"/>
             <a:ext cx="1314895" cy="552893"/>
           </a:xfrm>
           <a:prstGeom prst="rect">
@@ -19570,7 +19572,7 @@
         </p:nvSpPr>
         <p:spPr>
           <a:xfrm>
-            <a:off x="1950796" y="4511224"/>
+            <a:off x="546640" y="4115180"/>
             <a:ext cx="1314895" cy="552893"/>
           </a:xfrm>
           <a:prstGeom prst="rect">
@@ -19616,7 +19618,7 @@
         </p:nvSpPr>
         <p:spPr>
           <a:xfrm>
-            <a:off x="1954341" y="5429168"/>
+            <a:off x="550185" y="5033124"/>
             <a:ext cx="1314895" cy="552893"/>
           </a:xfrm>
           <a:prstGeom prst="rect">
@@ -19666,7 +19668,7 @@
         </p:nvCxnSpPr>
         <p:spPr>
           <a:xfrm flipV="1">
-            <a:off x="2604700" y="3153801"/>
+            <a:off x="1200544" y="2757757"/>
             <a:ext cx="37" cy="407582"/>
           </a:xfrm>
           <a:prstGeom prst="straightConnector1">
@@ -19706,7 +19708,7 @@
         </p:nvCxnSpPr>
         <p:spPr>
           <a:xfrm flipH="1" flipV="1">
-            <a:off x="2604700" y="4114276"/>
+            <a:off x="1200544" y="3718232"/>
             <a:ext cx="3544" cy="396948"/>
           </a:xfrm>
           <a:prstGeom prst="straightConnector1">
@@ -19746,7 +19748,7 @@
         </p:nvCxnSpPr>
         <p:spPr>
           <a:xfrm flipH="1" flipV="1">
-            <a:off x="2608244" y="5064117"/>
+            <a:off x="1204088" y="4668073"/>
             <a:ext cx="3545" cy="365051"/>
           </a:xfrm>
           <a:prstGeom prst="straightConnector1">
@@ -19786,7 +19788,7 @@
         </p:nvCxnSpPr>
         <p:spPr>
           <a:xfrm rot="5400000" flipH="1">
-            <a:off x="917686" y="4287959"/>
+            <a:off x="-486470" y="3891915"/>
             <a:ext cx="3381153" cy="7052"/>
           </a:xfrm>
           <a:prstGeom prst="bentConnector5">
@@ -22707,7 +22709,7 @@
 </file>
 
 <file path=ppt/slides/slide36.xml><?xml version="1.0" encoding="utf-8"?>
-<p:sld xmlns:a="http://schemas.openxmlformats.org/drawingml/2006/main" xmlns:r="http://schemas.openxmlformats.org/officeDocument/2006/relationships" xmlns:p="http://schemas.openxmlformats.org/presentationml/2006/main">
+<p:sld xmlns:a="http://schemas.openxmlformats.org/drawingml/2006/main" xmlns:r="http://schemas.openxmlformats.org/officeDocument/2006/relationships" xmlns:p="http://schemas.openxmlformats.org/presentationml/2006/main" show="0">
   <p:cSld>
     <p:spTree>
       <p:nvGrpSpPr>
@@ -23061,7 +23063,7 @@
             </a:pPr>
             <a:r>
               <a:rPr lang="de-DE" sz="1200" dirty="0"/>
-              <a:t>API = </a:t>
+              <a:t>					API = </a:t>
             </a:r>
             <a:r>
               <a:rPr lang="de-DE" sz="1200" dirty="0" err="1"/>
@@ -23086,7 +23088,7 @@
             </a:pPr>
             <a:r>
               <a:rPr lang="de-DE" sz="1200" dirty="0"/>
-              <a:t>REST = </a:t>
+              <a:t>					REST = </a:t>
             </a:r>
             <a:r>
               <a:rPr lang="de-DE" sz="1200" dirty="0" err="1"/>
@@ -23701,7 +23703,7 @@
             </a:pPr>
             <a:r>
               <a:rPr lang="de-DE" dirty="0"/>
-              <a:t>Messen der Luftfeuchtigkeit und Temperatur im Zusammenhang mit Fensterstatus </a:t>
+              <a:t>Messen der Luftfeuchtigkeit und Temperatur im Zusammenhang mit Fensterstatus über Ultraschallsensor</a:t>
             </a:r>
           </a:p>
           <a:p>
@@ -23892,7 +23894,7 @@
             </a:pPr>
             <a:r>
               <a:rPr lang="de-DE" dirty="0"/>
-              <a:t>HTTP		=&gt; 	Port 80</a:t>
+              <a:t>HTTP		  	Port 80</a:t>
             </a:r>
           </a:p>
           <a:p>
@@ -23902,7 +23904,7 @@
             </a:pPr>
             <a:r>
               <a:rPr lang="de-DE" dirty="0"/>
-              <a:t>HTTPS	=&gt;	Port 443</a:t>
+              <a:t>HTTPS		Port 443</a:t>
             </a:r>
           </a:p>
           <a:p>
@@ -23912,7 +23914,7 @@
             </a:pPr>
             <a:r>
               <a:rPr lang="de-DE" dirty="0"/>
-              <a:t>MQTT	=&gt;	Port 1883</a:t>
+              <a:t>MQTT		Port 1883</a:t>
             </a:r>
           </a:p>
           <a:p>
@@ -23922,7 +23924,7 @@
             </a:pPr>
             <a:r>
               <a:rPr lang="de-DE" dirty="0"/>
-              <a:t>MQTT + SSL	=&gt;	Port 8883</a:t>
+              <a:t>MQTT + SSL		Port 8883</a:t>
             </a:r>
           </a:p>
           <a:p>
@@ -23958,7 +23960,7 @@
             </a:r>
             <a:r>
               <a:rPr lang="de-DE" dirty="0"/>
-              <a:t> IO - Verbindung</a:t>
+              <a:t> IO - Kommunikation</a:t>
             </a:r>
           </a:p>
         </p:txBody>
@@ -23983,6 +23985,330 @@
               <a:t>Hochschule Mannheim | Julia Geigl, Klemens Behr, Kevin Höfle</a:t>
             </a:r>
             <a:endParaRPr lang="de-DE" altLang="de-DE" dirty="0"/>
+          </a:p>
+        </p:txBody>
+      </p:sp>
+      <p:sp>
+        <p:nvSpPr>
+          <p:cNvPr id="6" name="Pfeil: nach rechts 5"/>
+          <p:cNvSpPr/>
+          <p:nvPr/>
+        </p:nvSpPr>
+        <p:spPr bwMode="auto">
+          <a:xfrm>
+            <a:off x="2770524" y="3035627"/>
+            <a:ext cx="396044" cy="288032"/>
+          </a:xfrm>
+          <a:prstGeom prst="rightArrow">
+            <a:avLst/>
+          </a:prstGeom>
+          <a:noFill/>
+          <a:ln w="19050" cap="flat" cmpd="sng" algn="ctr">
+            <a:solidFill>
+              <a:schemeClr val="hlink"/>
+            </a:solidFill>
+            <a:prstDash val="solid"/>
+            <a:round/>
+            <a:headEnd type="none" w="med" len="med"/>
+            <a:tailEnd type="none" w="med" len="med"/>
+          </a:ln>
+          <a:effectLst/>
+          <a:extLst>
+            <a:ext uri="{909E8E84-426E-40DD-AFC4-6F175D3DCCD1}">
+              <a14:hiddenFill xmlns:a14="http://schemas.microsoft.com/office/drawing/2010/main">
+                <a:solidFill>
+                  <a:schemeClr val="tx2"/>
+                </a:solidFill>
+              </a14:hiddenFill>
+            </a:ext>
+            <a:ext uri="{AF507438-7753-43E0-B8FC-AC1667EBCBE1}">
+              <a14:hiddenEffects xmlns:a14="http://schemas.microsoft.com/office/drawing/2010/main">
+                <a:effectLst>
+                  <a:outerShdw dist="35921" dir="2700000" algn="ctr" rotWithShape="0">
+                    <a:schemeClr val="bg2"/>
+                  </a:outerShdw>
+                </a:effectLst>
+              </a14:hiddenEffects>
+            </a:ext>
+          </a:extLst>
+        </p:spPr>
+        <p:txBody>
+          <a:bodyPr vert="horz" wrap="square" lIns="90000" tIns="46800" rIns="90000" bIns="46800" numCol="1" rtlCol="0" anchor="ctr" anchorCtr="0" compatLnSpc="1">
+            <a:prstTxWarp prst="textNoShape">
+              <a:avLst/>
+            </a:prstTxWarp>
+          </a:bodyPr>
+          <a:lstStyle/>
+          <a:p>
+            <a:pPr marL="0" marR="0" indent="0" algn="ctr" defTabSz="914400" rtl="0" eaLnBrk="0" fontAlgn="base" latinLnBrk="0" hangingPunct="0">
+              <a:lnSpc>
+                <a:spcPct val="100000"/>
+              </a:lnSpc>
+              <a:spcBef>
+                <a:spcPct val="0"/>
+              </a:spcBef>
+              <a:spcAft>
+                <a:spcPct val="0"/>
+              </a:spcAft>
+              <a:buClrTx/>
+              <a:buSzTx/>
+              <a:buFontTx/>
+              <a:buNone/>
+              <a:tabLst/>
+            </a:pPr>
+            <a:endParaRPr kumimoji="0" lang="de-DE" sz="1800" b="0" i="0" u="none" strike="noStrike" cap="none" normalizeH="0" baseline="0">
+              <a:ln>
+                <a:noFill/>
+              </a:ln>
+              <a:solidFill>
+                <a:schemeClr val="tx1"/>
+              </a:solidFill>
+              <a:effectLst/>
+              <a:latin typeface="Arial" charset="0"/>
+            </a:endParaRPr>
+          </a:p>
+        </p:txBody>
+      </p:sp>
+      <p:sp>
+        <p:nvSpPr>
+          <p:cNvPr id="7" name="Pfeil: nach rechts 6"/>
+          <p:cNvSpPr/>
+          <p:nvPr/>
+        </p:nvSpPr>
+        <p:spPr bwMode="auto">
+          <a:xfrm>
+            <a:off x="2780159" y="3409764"/>
+            <a:ext cx="396044" cy="288032"/>
+          </a:xfrm>
+          <a:prstGeom prst="rightArrow">
+            <a:avLst/>
+          </a:prstGeom>
+          <a:noFill/>
+          <a:ln w="19050" cap="flat" cmpd="sng" algn="ctr">
+            <a:solidFill>
+              <a:schemeClr val="hlink"/>
+            </a:solidFill>
+            <a:prstDash val="solid"/>
+            <a:round/>
+            <a:headEnd type="none" w="med" len="med"/>
+            <a:tailEnd type="none" w="med" len="med"/>
+          </a:ln>
+          <a:effectLst/>
+          <a:extLst>
+            <a:ext uri="{909E8E84-426E-40DD-AFC4-6F175D3DCCD1}">
+              <a14:hiddenFill xmlns:a14="http://schemas.microsoft.com/office/drawing/2010/main">
+                <a:solidFill>
+                  <a:schemeClr val="tx2"/>
+                </a:solidFill>
+              </a14:hiddenFill>
+            </a:ext>
+            <a:ext uri="{AF507438-7753-43E0-B8FC-AC1667EBCBE1}">
+              <a14:hiddenEffects xmlns:a14="http://schemas.microsoft.com/office/drawing/2010/main">
+                <a:effectLst>
+                  <a:outerShdw dist="35921" dir="2700000" algn="ctr" rotWithShape="0">
+                    <a:schemeClr val="bg2"/>
+                  </a:outerShdw>
+                </a:effectLst>
+              </a14:hiddenEffects>
+            </a:ext>
+          </a:extLst>
+        </p:spPr>
+        <p:txBody>
+          <a:bodyPr vert="horz" wrap="square" lIns="90000" tIns="46800" rIns="90000" bIns="46800" numCol="1" rtlCol="0" anchor="ctr" anchorCtr="0" compatLnSpc="1">
+            <a:prstTxWarp prst="textNoShape">
+              <a:avLst/>
+            </a:prstTxWarp>
+          </a:bodyPr>
+          <a:lstStyle/>
+          <a:p>
+            <a:pPr marL="0" marR="0" indent="0" algn="ctr" defTabSz="914400" rtl="0" eaLnBrk="0" fontAlgn="base" latinLnBrk="0" hangingPunct="0">
+              <a:lnSpc>
+                <a:spcPct val="100000"/>
+              </a:lnSpc>
+              <a:spcBef>
+                <a:spcPct val="0"/>
+              </a:spcBef>
+              <a:spcAft>
+                <a:spcPct val="0"/>
+              </a:spcAft>
+              <a:buClrTx/>
+              <a:buSzTx/>
+              <a:buFontTx/>
+              <a:buNone/>
+              <a:tabLst/>
+            </a:pPr>
+            <a:endParaRPr kumimoji="0" lang="de-DE" sz="1800" b="0" i="0" u="none" strike="noStrike" cap="none" normalizeH="0" baseline="0">
+              <a:ln>
+                <a:noFill/>
+              </a:ln>
+              <a:solidFill>
+                <a:schemeClr val="tx1"/>
+              </a:solidFill>
+              <a:effectLst/>
+              <a:latin typeface="Arial" charset="0"/>
+            </a:endParaRPr>
+          </a:p>
+        </p:txBody>
+      </p:sp>
+      <p:sp>
+        <p:nvSpPr>
+          <p:cNvPr id="8" name="Pfeil: nach rechts 7"/>
+          <p:cNvSpPr/>
+          <p:nvPr/>
+        </p:nvSpPr>
+        <p:spPr bwMode="auto">
+          <a:xfrm>
+            <a:off x="2772079" y="3778904"/>
+            <a:ext cx="396044" cy="288032"/>
+          </a:xfrm>
+          <a:prstGeom prst="rightArrow">
+            <a:avLst/>
+          </a:prstGeom>
+          <a:noFill/>
+          <a:ln w="19050" cap="flat" cmpd="sng" algn="ctr">
+            <a:solidFill>
+              <a:schemeClr val="hlink"/>
+            </a:solidFill>
+            <a:prstDash val="solid"/>
+            <a:round/>
+            <a:headEnd type="none" w="med" len="med"/>
+            <a:tailEnd type="none" w="med" len="med"/>
+          </a:ln>
+          <a:effectLst/>
+          <a:extLst>
+            <a:ext uri="{909E8E84-426E-40DD-AFC4-6F175D3DCCD1}">
+              <a14:hiddenFill xmlns:a14="http://schemas.microsoft.com/office/drawing/2010/main">
+                <a:solidFill>
+                  <a:schemeClr val="tx2"/>
+                </a:solidFill>
+              </a14:hiddenFill>
+            </a:ext>
+            <a:ext uri="{AF507438-7753-43E0-B8FC-AC1667EBCBE1}">
+              <a14:hiddenEffects xmlns:a14="http://schemas.microsoft.com/office/drawing/2010/main">
+                <a:effectLst>
+                  <a:outerShdw dist="35921" dir="2700000" algn="ctr" rotWithShape="0">
+                    <a:schemeClr val="bg2"/>
+                  </a:outerShdw>
+                </a:effectLst>
+              </a14:hiddenEffects>
+            </a:ext>
+          </a:extLst>
+        </p:spPr>
+        <p:txBody>
+          <a:bodyPr vert="horz" wrap="square" lIns="90000" tIns="46800" rIns="90000" bIns="46800" numCol="1" rtlCol="0" anchor="ctr" anchorCtr="0" compatLnSpc="1">
+            <a:prstTxWarp prst="textNoShape">
+              <a:avLst/>
+            </a:prstTxWarp>
+          </a:bodyPr>
+          <a:lstStyle/>
+          <a:p>
+            <a:pPr marL="0" marR="0" indent="0" algn="ctr" defTabSz="914400" rtl="0" eaLnBrk="0" fontAlgn="base" latinLnBrk="0" hangingPunct="0">
+              <a:lnSpc>
+                <a:spcPct val="100000"/>
+              </a:lnSpc>
+              <a:spcBef>
+                <a:spcPct val="0"/>
+              </a:spcBef>
+              <a:spcAft>
+                <a:spcPct val="0"/>
+              </a:spcAft>
+              <a:buClrTx/>
+              <a:buSzTx/>
+              <a:buFontTx/>
+              <a:buNone/>
+              <a:tabLst/>
+            </a:pPr>
+            <a:endParaRPr kumimoji="0" lang="de-DE" sz="1800" b="0" i="0" u="none" strike="noStrike" cap="none" normalizeH="0" baseline="0">
+              <a:ln>
+                <a:noFill/>
+              </a:ln>
+              <a:solidFill>
+                <a:schemeClr val="tx1"/>
+              </a:solidFill>
+              <a:effectLst/>
+              <a:latin typeface="Arial" charset="0"/>
+            </a:endParaRPr>
+          </a:p>
+        </p:txBody>
+      </p:sp>
+      <p:sp>
+        <p:nvSpPr>
+          <p:cNvPr id="9" name="Pfeil: nach rechts 8"/>
+          <p:cNvSpPr/>
+          <p:nvPr/>
+        </p:nvSpPr>
+        <p:spPr bwMode="auto">
+          <a:xfrm>
+            <a:off x="2786599" y="4148044"/>
+            <a:ext cx="396044" cy="288032"/>
+          </a:xfrm>
+          <a:prstGeom prst="rightArrow">
+            <a:avLst/>
+          </a:prstGeom>
+          <a:noFill/>
+          <a:ln w="19050" cap="flat" cmpd="sng" algn="ctr">
+            <a:solidFill>
+              <a:schemeClr val="hlink"/>
+            </a:solidFill>
+            <a:prstDash val="solid"/>
+            <a:round/>
+            <a:headEnd type="none" w="med" len="med"/>
+            <a:tailEnd type="none" w="med" len="med"/>
+          </a:ln>
+          <a:effectLst/>
+          <a:extLst>
+            <a:ext uri="{909E8E84-426E-40DD-AFC4-6F175D3DCCD1}">
+              <a14:hiddenFill xmlns:a14="http://schemas.microsoft.com/office/drawing/2010/main">
+                <a:solidFill>
+                  <a:schemeClr val="tx2"/>
+                </a:solidFill>
+              </a14:hiddenFill>
+            </a:ext>
+            <a:ext uri="{AF507438-7753-43E0-B8FC-AC1667EBCBE1}">
+              <a14:hiddenEffects xmlns:a14="http://schemas.microsoft.com/office/drawing/2010/main">
+                <a:effectLst>
+                  <a:outerShdw dist="35921" dir="2700000" algn="ctr" rotWithShape="0">
+                    <a:schemeClr val="bg2"/>
+                  </a:outerShdw>
+                </a:effectLst>
+              </a14:hiddenEffects>
+            </a:ext>
+          </a:extLst>
+        </p:spPr>
+        <p:txBody>
+          <a:bodyPr vert="horz" wrap="square" lIns="90000" tIns="46800" rIns="90000" bIns="46800" numCol="1" rtlCol="0" anchor="ctr" anchorCtr="0" compatLnSpc="1">
+            <a:prstTxWarp prst="textNoShape">
+              <a:avLst/>
+            </a:prstTxWarp>
+          </a:bodyPr>
+          <a:lstStyle/>
+          <a:p>
+            <a:pPr marL="0" marR="0" indent="0" algn="ctr" defTabSz="914400" rtl="0" eaLnBrk="0" fontAlgn="base" latinLnBrk="0" hangingPunct="0">
+              <a:lnSpc>
+                <a:spcPct val="100000"/>
+              </a:lnSpc>
+              <a:spcBef>
+                <a:spcPct val="0"/>
+              </a:spcBef>
+              <a:spcAft>
+                <a:spcPct val="0"/>
+              </a:spcAft>
+              <a:buClrTx/>
+              <a:buSzTx/>
+              <a:buFontTx/>
+              <a:buNone/>
+              <a:tabLst/>
+            </a:pPr>
+            <a:endParaRPr kumimoji="0" lang="de-DE" sz="1800" b="0" i="0" u="none" strike="noStrike" cap="none" normalizeH="0" baseline="0">
+              <a:ln>
+                <a:noFill/>
+              </a:ln>
+              <a:solidFill>
+                <a:schemeClr val="tx1"/>
+              </a:solidFill>
+              <a:effectLst/>
+              <a:latin typeface="Arial" charset="0"/>
+            </a:endParaRPr>
           </a:p>
         </p:txBody>
       </p:sp>
@@ -24043,6 +24369,112 @@
       </p:sp>
       <p:sp>
         <p:nvSpPr>
+          <p:cNvPr id="3" name="Textplatzhalter 2"/>
+          <p:cNvSpPr>
+            <a:spLocks noGrp="1"/>
+          </p:cNvSpPr>
+          <p:nvPr>
+            <p:ph type="body" sz="quarter" idx="15"/>
+          </p:nvPr>
+        </p:nvSpPr>
+        <p:spPr/>
+        <p:txBody>
+          <a:bodyPr/>
+          <a:lstStyle/>
+          <a:p>
+            <a:pPr marL="285750" indent="-285750">
+              <a:buFont typeface="Arial" panose="020B0604020202020204" pitchFamily="34" charset="0"/>
+              <a:buChar char="•"/>
+            </a:pPr>
+            <a:r>
+              <a:rPr lang="de-DE" dirty="0"/>
+              <a:t>Feeds: 50 000 Datensätze nach FIFO-Prinzip gespeichert</a:t>
+            </a:r>
+          </a:p>
+          <a:p>
+            <a:pPr marL="285750" indent="-285750">
+              <a:buFont typeface="Arial" panose="020B0604020202020204" pitchFamily="34" charset="0"/>
+              <a:buChar char="•"/>
+            </a:pPr>
+            <a:r>
+              <a:rPr lang="de-DE" dirty="0"/>
+              <a:t>Erlaubt sind:</a:t>
+            </a:r>
+          </a:p>
+          <a:p>
+            <a:pPr marL="495300" lvl="3" indent="-285750">
+              <a:buFont typeface="Arial" panose="020B0604020202020204" pitchFamily="34" charset="0"/>
+              <a:buChar char="•"/>
+            </a:pPr>
+            <a:r>
+              <a:rPr lang="de-DE" dirty="0"/>
+              <a:t>10 Feeds</a:t>
+            </a:r>
+          </a:p>
+          <a:p>
+            <a:pPr marL="495300" lvl="3" indent="-285750">
+              <a:buFont typeface="Arial" panose="020B0604020202020204" pitchFamily="34" charset="0"/>
+              <a:buChar char="•"/>
+            </a:pPr>
+            <a:r>
+              <a:rPr lang="de-DE" dirty="0"/>
+              <a:t>10 Groups</a:t>
+            </a:r>
+          </a:p>
+          <a:p>
+            <a:pPr marL="495300" lvl="3" indent="-285750">
+              <a:buFont typeface="Arial" panose="020B0604020202020204" pitchFamily="34" charset="0"/>
+              <a:buChar char="•"/>
+            </a:pPr>
+            <a:r>
+              <a:rPr lang="de-DE" dirty="0"/>
+              <a:t>5 Dashboards</a:t>
+            </a:r>
+          </a:p>
+          <a:p>
+            <a:pPr marL="285750" indent="-285750">
+              <a:buFont typeface="Arial" panose="020B0604020202020204" pitchFamily="34" charset="0"/>
+              <a:buChar char="•"/>
+            </a:pPr>
+            <a:r>
+              <a:rPr lang="de-DE" dirty="0"/>
+              <a:t>Datenrate:</a:t>
+            </a:r>
+          </a:p>
+          <a:p>
+            <a:pPr marL="495300" lvl="3" indent="-285750">
+              <a:buFont typeface="Arial" panose="020B0604020202020204" pitchFamily="34" charset="0"/>
+              <a:buChar char="•"/>
+            </a:pPr>
+            <a:r>
+              <a:rPr lang="de-DE" dirty="0"/>
+              <a:t>Maximum: 125 Datensätze / 60 s   ~   2 Datensätze / s </a:t>
+            </a:r>
+          </a:p>
+          <a:p>
+            <a:pPr marL="681038" lvl="4" indent="-285750">
+              <a:buFont typeface="Arial" panose="020B0604020202020204" pitchFamily="34" charset="0"/>
+              <a:buChar char="•"/>
+            </a:pPr>
+            <a:r>
+              <a:rPr lang="de-DE" dirty="0"/>
+              <a:t>~6,5h</a:t>
+            </a:r>
+          </a:p>
+          <a:p>
+            <a:pPr marL="309563" lvl="2" indent="-285750">
+              <a:buFont typeface="Arial" panose="020B0604020202020204" pitchFamily="34" charset="0"/>
+              <a:buChar char="•"/>
+            </a:pPr>
+            <a:r>
+              <a:rPr lang="de-DE" dirty="0"/>
+              <a:t>Daten werden maximal 30 Tage gespeichert</a:t>
+            </a:r>
+          </a:p>
+        </p:txBody>
+      </p:sp>
+      <p:sp>
+        <p:nvSpPr>
           <p:cNvPr id="4" name="Titel 3"/>
           <p:cNvSpPr>
             <a:spLocks noGrp="1"/>
@@ -24062,8 +24494,21 @@
             </a:r>
             <a:r>
               <a:rPr lang="de-DE" dirty="0"/>
-              <a:t> IO – Feeds</a:t>
-            </a:r>
+              <a:t> IO – Data </a:t>
+            </a:r>
+            <a:r>
+              <a:rPr lang="de-DE" dirty="0" err="1"/>
+              <a:t>Policies</a:t>
+            </a:r>
+            <a:r>
+              <a:rPr lang="de-DE" dirty="0"/>
+              <a:t> </a:t>
+            </a:r>
+            <a:r>
+              <a:rPr lang="de-DE" sz="1400" dirty="0"/>
+              <a:t>[16]</a:t>
+            </a:r>
+            <a:endParaRPr lang="de-DE" dirty="0"/>
           </a:p>
         </p:txBody>
       </p:sp>
@@ -24087,77 +24532,13 @@
               <a:t>Hochschule Mannheim | Julia Geigl, Klemens Behr, Kevin Höfle</a:t>
             </a:r>
             <a:endParaRPr lang="de-DE" altLang="de-DE" dirty="0"/>
-          </a:p>
-        </p:txBody>
-      </p:sp>
-      <p:pic>
-        <p:nvPicPr>
-          <p:cNvPr id="3" name="Grafik 2"/>
-          <p:cNvPicPr>
-            <a:picLocks noChangeAspect="1"/>
-          </p:cNvPicPr>
-          <p:nvPr/>
-        </p:nvPicPr>
-        <p:blipFill>
-          <a:blip r:embed="rId3"/>
-          <a:stretch>
-            <a:fillRect/>
-          </a:stretch>
-        </p:blipFill>
-        <p:spPr>
-          <a:xfrm>
-            <a:off x="503548" y="2996952"/>
-            <a:ext cx="8218276" cy="2972568"/>
-          </a:xfrm>
-          <a:prstGeom prst="rect">
-            <a:avLst/>
-          </a:prstGeom>
-        </p:spPr>
-      </p:pic>
-      <p:sp>
-        <p:nvSpPr>
-          <p:cNvPr id="8" name="Textfeld 7"/>
-          <p:cNvSpPr txBox="1"/>
-          <p:nvPr/>
-        </p:nvSpPr>
-        <p:spPr>
-          <a:xfrm>
-            <a:off x="503548" y="2444104"/>
-            <a:ext cx="7884876" cy="400110"/>
-          </a:xfrm>
-          <a:prstGeom prst="rect">
-            <a:avLst/>
-          </a:prstGeom>
-          <a:noFill/>
-        </p:spPr>
-        <p:txBody>
-          <a:bodyPr wrap="square" rtlCol="0">
-            <a:spAutoFit/>
-          </a:bodyPr>
-          <a:lstStyle/>
-          <a:p>
-            <a:pPr algn="l"/>
-            <a:r>
-              <a:rPr lang="de-DE" sz="2000" dirty="0"/>
-              <a:t>Feed enthält die Daten </a:t>
-            </a:r>
-            <a:r>
-              <a:rPr lang="de-DE" sz="2000" dirty="0">
-                <a:sym typeface="Wingdings" panose="05000000000000000000" pitchFamily="2" charset="2"/>
-              </a:rPr>
-              <a:t> </a:t>
-            </a:r>
-            <a:r>
-              <a:rPr lang="de-DE" sz="2000" dirty="0"/>
-              <a:t> Folge von Daten</a:t>
-            </a:r>
           </a:p>
         </p:txBody>
       </p:sp>
     </p:spTree>
     <p:extLst>
       <p:ext uri="{BB962C8B-B14F-4D97-AF65-F5344CB8AC3E}">
-        <p14:creationId xmlns:p14="http://schemas.microsoft.com/office/powerpoint/2010/main" val="2769674007"/>
+        <p14:creationId xmlns:p14="http://schemas.microsoft.com/office/powerpoint/2010/main" val="528410086"/>
       </p:ext>
     </p:extLst>
   </p:cSld>
@@ -24204,6 +24585,174 @@
               <a:rPr lang="de-DE" smtClean="0"/>
               <a:pPr/>
               <a:t>42</a:t>
+            </a:fld>
+            <a:endParaRPr lang="de-DE" dirty="0"/>
+          </a:p>
+        </p:txBody>
+      </p:sp>
+      <p:sp>
+        <p:nvSpPr>
+          <p:cNvPr id="4" name="Titel 3"/>
+          <p:cNvSpPr>
+            <a:spLocks noGrp="1"/>
+          </p:cNvSpPr>
+          <p:nvPr>
+            <p:ph type="title"/>
+          </p:nvPr>
+        </p:nvSpPr>
+        <p:spPr/>
+        <p:txBody>
+          <a:bodyPr/>
+          <a:lstStyle/>
+          <a:p>
+            <a:r>
+              <a:rPr lang="de-DE" dirty="0" err="1"/>
+              <a:t>Adafruit</a:t>
+            </a:r>
+            <a:r>
+              <a:rPr lang="de-DE" dirty="0"/>
+              <a:t> IO – Feeds</a:t>
+            </a:r>
+          </a:p>
+        </p:txBody>
+      </p:sp>
+      <p:sp>
+        <p:nvSpPr>
+          <p:cNvPr id="5" name="Fußzeilenplatzhalter 4"/>
+          <p:cNvSpPr>
+            <a:spLocks noGrp="1"/>
+          </p:cNvSpPr>
+          <p:nvPr>
+            <p:ph type="ftr" sz="quarter" idx="16"/>
+          </p:nvPr>
+        </p:nvSpPr>
+        <p:spPr/>
+        <p:txBody>
+          <a:bodyPr/>
+          <a:lstStyle/>
+          <a:p>
+            <a:r>
+              <a:rPr lang="de-DE" altLang="de-DE"/>
+              <a:t>Hochschule Mannheim | Julia Geigl, Klemens Behr, Kevin Höfle</a:t>
+            </a:r>
+            <a:endParaRPr lang="de-DE" altLang="de-DE" dirty="0"/>
+          </a:p>
+        </p:txBody>
+      </p:sp>
+      <p:pic>
+        <p:nvPicPr>
+          <p:cNvPr id="3" name="Grafik 2"/>
+          <p:cNvPicPr>
+            <a:picLocks noChangeAspect="1"/>
+          </p:cNvPicPr>
+          <p:nvPr/>
+        </p:nvPicPr>
+        <p:blipFill>
+          <a:blip r:embed="rId3"/>
+          <a:stretch>
+            <a:fillRect/>
+          </a:stretch>
+        </p:blipFill>
+        <p:spPr>
+          <a:xfrm>
+            <a:off x="503548" y="2996952"/>
+            <a:ext cx="8218276" cy="2972568"/>
+          </a:xfrm>
+          <a:prstGeom prst="rect">
+            <a:avLst/>
+          </a:prstGeom>
+        </p:spPr>
+      </p:pic>
+      <p:sp>
+        <p:nvSpPr>
+          <p:cNvPr id="8" name="Textfeld 7"/>
+          <p:cNvSpPr txBox="1"/>
+          <p:nvPr/>
+        </p:nvSpPr>
+        <p:spPr>
+          <a:xfrm>
+            <a:off x="503548" y="2444104"/>
+            <a:ext cx="7884876" cy="400110"/>
+          </a:xfrm>
+          <a:prstGeom prst="rect">
+            <a:avLst/>
+          </a:prstGeom>
+          <a:noFill/>
+        </p:spPr>
+        <p:txBody>
+          <a:bodyPr wrap="square" rtlCol="0">
+            <a:spAutoFit/>
+          </a:bodyPr>
+          <a:lstStyle/>
+          <a:p>
+            <a:pPr algn="l"/>
+            <a:r>
+              <a:rPr lang="de-DE" sz="2000" dirty="0"/>
+              <a:t>Feed enthält die Daten </a:t>
+            </a:r>
+            <a:r>
+              <a:rPr lang="de-DE" sz="2000" dirty="0">
+                <a:sym typeface="Wingdings" panose="05000000000000000000" pitchFamily="2" charset="2"/>
+              </a:rPr>
+              <a:t> </a:t>
+            </a:r>
+            <a:r>
+              <a:rPr lang="de-DE" sz="2000" dirty="0"/>
+              <a:t> Folge von Daten</a:t>
+            </a:r>
+          </a:p>
+        </p:txBody>
+      </p:sp>
+    </p:spTree>
+    <p:extLst>
+      <p:ext uri="{BB962C8B-B14F-4D97-AF65-F5344CB8AC3E}">
+        <p14:creationId xmlns:p14="http://schemas.microsoft.com/office/powerpoint/2010/main" val="2769674007"/>
+      </p:ext>
+    </p:extLst>
+  </p:cSld>
+  <p:clrMapOvr>
+    <a:masterClrMapping/>
+  </p:clrMapOvr>
+  <p:transition/>
+</p:sld>
+</file>
+
+<file path=ppt/slides/slide43.xml><?xml version="1.0" encoding="utf-8"?>
+<p:sld xmlns:a="http://schemas.openxmlformats.org/drawingml/2006/main" xmlns:r="http://schemas.openxmlformats.org/officeDocument/2006/relationships" xmlns:p="http://schemas.openxmlformats.org/presentationml/2006/main" show="0">
+  <p:cSld>
+    <p:spTree>
+      <p:nvGrpSpPr>
+        <p:cNvPr id="1" name=""/>
+        <p:cNvGrpSpPr/>
+        <p:nvPr/>
+      </p:nvGrpSpPr>
+      <p:grpSpPr>
+        <a:xfrm>
+          <a:off x="0" y="0"/>
+          <a:ext cx="0" cy="0"/>
+          <a:chOff x="0" y="0"/>
+          <a:chExt cx="0" cy="0"/>
+        </a:xfrm>
+      </p:grpSpPr>
+      <p:sp>
+        <p:nvSpPr>
+          <p:cNvPr id="2" name="Foliennummernplatzhalter 1"/>
+          <p:cNvSpPr>
+            <a:spLocks noGrp="1"/>
+          </p:cNvSpPr>
+          <p:nvPr>
+            <p:ph type="sldNum" sz="quarter" idx="11"/>
+          </p:nvPr>
+        </p:nvSpPr>
+        <p:spPr/>
+        <p:txBody>
+          <a:bodyPr/>
+          <a:lstStyle/>
+          <a:p>
+            <a:fld id="{57D12BB6-0ED4-46B6-AB23-7758AD07EFBF}" type="slidenum">
+              <a:rPr lang="de-DE" smtClean="0"/>
+              <a:pPr/>
+              <a:t>43</a:t>
             </a:fld>
             <a:endParaRPr lang="de-DE" dirty="0"/>
           </a:p>
@@ -24367,8 +24916,8 @@
 </p:sld>
 </file>
 
-<file path=ppt/slides/slide43.xml><?xml version="1.0" encoding="utf-8"?>
-<p:sld xmlns:a="http://schemas.openxmlformats.org/drawingml/2006/main" xmlns:r="http://schemas.openxmlformats.org/officeDocument/2006/relationships" xmlns:p="http://schemas.openxmlformats.org/presentationml/2006/main">
+<file path=ppt/slides/slide44.xml><?xml version="1.0" encoding="utf-8"?>
+<p:sld xmlns:a="http://schemas.openxmlformats.org/drawingml/2006/main" xmlns:r="http://schemas.openxmlformats.org/officeDocument/2006/relationships" xmlns:p="http://schemas.openxmlformats.org/presentationml/2006/main" show="0">
   <p:cSld>
     <p:spTree>
       <p:nvGrpSpPr>
@@ -24402,7 +24951,7 @@
             <a:fld id="{57D12BB6-0ED4-46B6-AB23-7758AD07EFBF}" type="slidenum">
               <a:rPr lang="de-DE" smtClean="0"/>
               <a:pPr/>
-              <a:t>43</a:t>
+              <a:t>44</a:t>
             </a:fld>
             <a:endParaRPr lang="de-DE" dirty="0"/>
           </a:p>
@@ -24525,8 +25074,8 @@
 </p:sld>
 </file>
 
-<file path=ppt/slides/slide44.xml><?xml version="1.0" encoding="utf-8"?>
-<p:sld xmlns:a="http://schemas.openxmlformats.org/drawingml/2006/main" xmlns:r="http://schemas.openxmlformats.org/officeDocument/2006/relationships" xmlns:p="http://schemas.openxmlformats.org/presentationml/2006/main">
+<file path=ppt/slides/slide45.xml><?xml version="1.0" encoding="utf-8"?>
+<p:sld xmlns:a="http://schemas.openxmlformats.org/drawingml/2006/main" xmlns:r="http://schemas.openxmlformats.org/officeDocument/2006/relationships" xmlns:p="http://schemas.openxmlformats.org/presentationml/2006/main" show="0">
   <p:cSld>
     <p:spTree>
       <p:nvGrpSpPr>
@@ -24560,7 +25109,7 @@
             <a:fld id="{57D12BB6-0ED4-46B6-AB23-7758AD07EFBF}" type="slidenum">
               <a:rPr lang="de-DE" smtClean="0"/>
               <a:pPr/>
-              <a:t>44</a:t>
+              <a:t>45</a:t>
             </a:fld>
             <a:endParaRPr lang="de-DE" dirty="0"/>
           </a:p>
@@ -24631,7 +25180,7 @@
         </p:blipFill>
         <p:spPr>
           <a:xfrm>
-            <a:off x="1493478" y="2491188"/>
+            <a:off x="1295636" y="2132856"/>
             <a:ext cx="6696794" cy="3878229"/>
           </a:xfrm>
           <a:prstGeom prst="rect">
@@ -24653,8 +25202,8 @@
 </p:sld>
 </file>
 
-<file path=ppt/slides/slide45.xml><?xml version="1.0" encoding="utf-8"?>
-<p:sld xmlns:a="http://schemas.openxmlformats.org/drawingml/2006/main" xmlns:r="http://schemas.openxmlformats.org/officeDocument/2006/relationships" xmlns:p="http://schemas.openxmlformats.org/presentationml/2006/main">
+<file path=ppt/slides/slide46.xml><?xml version="1.0" encoding="utf-8"?>
+<p:sld xmlns:a="http://schemas.openxmlformats.org/drawingml/2006/main" xmlns:r="http://schemas.openxmlformats.org/officeDocument/2006/relationships" xmlns:p="http://schemas.openxmlformats.org/presentationml/2006/main" show="0">
   <p:cSld>
     <p:spTree>
       <p:nvGrpSpPr>
@@ -24688,7 +25237,7 @@
             <a:fld id="{57D12BB6-0ED4-46B6-AB23-7758AD07EFBF}" type="slidenum">
               <a:rPr lang="de-DE" smtClean="0"/>
               <a:pPr/>
-              <a:t>45</a:t>
+              <a:t>46</a:t>
             </a:fld>
             <a:endParaRPr lang="de-DE" dirty="0"/>
           </a:p>
@@ -24811,8 +25360,8 @@
 </p:sld>
 </file>
 
-<file path=ppt/slides/slide46.xml><?xml version="1.0" encoding="utf-8"?>
-<p:sld xmlns:a="http://schemas.openxmlformats.org/drawingml/2006/main" xmlns:r="http://schemas.openxmlformats.org/officeDocument/2006/relationships" xmlns:p="http://schemas.openxmlformats.org/presentationml/2006/main">
+<file path=ppt/slides/slide47.xml><?xml version="1.0" encoding="utf-8"?>
+<p:sld xmlns:a="http://schemas.openxmlformats.org/drawingml/2006/main" xmlns:r="http://schemas.openxmlformats.org/officeDocument/2006/relationships" xmlns:p="http://schemas.openxmlformats.org/presentationml/2006/main" show="0">
   <p:cSld>
     <p:spTree>
       <p:nvGrpSpPr>
@@ -24846,7 +25395,7 @@
             <a:fld id="{57D12BB6-0ED4-46B6-AB23-7758AD07EFBF}" type="slidenum">
               <a:rPr lang="de-DE" smtClean="0"/>
               <a:pPr/>
-              <a:t>46</a:t>
+              <a:t>47</a:t>
             </a:fld>
             <a:endParaRPr lang="de-DE" dirty="0"/>
           </a:p>
@@ -24897,8 +25446,8 @@
           <a:lstStyle/>
           <a:p>
             <a:pPr marL="285750" indent="-285750">
-              <a:buFont typeface="Courier New" panose="02070309020205020404" pitchFamily="49" charset="0"/>
-              <a:buChar char="o"/>
+              <a:buFont typeface="Arial" panose="020B0604020202020204" pitchFamily="34" charset="0"/>
+              <a:buChar char="•"/>
             </a:pPr>
             <a:r>
               <a:rPr lang="de-DE" dirty="0"/>
@@ -24907,8 +25456,8 @@
           </a:p>
           <a:p>
             <a:pPr marL="285750" indent="-285750">
-              <a:buFont typeface="Courier New" panose="02070309020205020404" pitchFamily="49" charset="0"/>
-              <a:buChar char="o"/>
+              <a:buFont typeface="Arial" panose="020B0604020202020204" pitchFamily="34" charset="0"/>
+              <a:buChar char="•"/>
             </a:pPr>
             <a:r>
               <a:rPr lang="de-DE" dirty="0"/>
@@ -24994,7 +25543,7 @@
 </p:sld>
 </file>
 
-<file path=ppt/slides/slide47.xml><?xml version="1.0" encoding="utf-8"?>
+<file path=ppt/slides/slide48.xml><?xml version="1.0" encoding="utf-8"?>
 <p:sld xmlns:a="http://schemas.openxmlformats.org/drawingml/2006/main" xmlns:r="http://schemas.openxmlformats.org/officeDocument/2006/relationships" xmlns:p="http://schemas.openxmlformats.org/presentationml/2006/main">
   <p:cSld>
     <p:spTree>
@@ -25029,7 +25578,7 @@
             <a:fld id="{57D12BB6-0ED4-46B6-AB23-7758AD07EFBF}" type="slidenum">
               <a:rPr lang="de-DE" smtClean="0"/>
               <a:pPr/>
-              <a:t>47</a:t>
+              <a:t>48</a:t>
             </a:fld>
             <a:endParaRPr lang="de-DE" dirty="0"/>
           </a:p>
@@ -25143,7 +25692,7 @@
             </a:r>
             <a:r>
               <a:rPr lang="de-DE" dirty="0" err="1"/>
-              <a:t>Than</a:t>
+              <a:t>Then</a:t>
             </a:r>
             <a:r>
               <a:rPr lang="de-DE" dirty="0"/>
@@ -25218,7 +25767,7 @@
 </p:sld>
 </file>
 
-<file path=ppt/slides/slide48.xml><?xml version="1.0" encoding="utf-8"?>
+<file path=ppt/slides/slide49.xml><?xml version="1.0" encoding="utf-8"?>
 <p:sld xmlns:a="http://schemas.openxmlformats.org/drawingml/2006/main" xmlns:r="http://schemas.openxmlformats.org/officeDocument/2006/relationships" xmlns:p="http://schemas.openxmlformats.org/presentationml/2006/main">
   <p:cSld>
     <p:spTree>
@@ -25253,7 +25802,7 @@
             <a:fld id="{57D12BB6-0ED4-46B6-AB23-7758AD07EFBF}" type="slidenum">
               <a:rPr lang="de-DE" smtClean="0"/>
               <a:pPr/>
-              <a:t>48</a:t>
+              <a:t>49</a:t>
             </a:fld>
             <a:endParaRPr lang="de-DE" dirty="0"/>
           </a:p>
@@ -25332,141 +25881,6 @@
     <p:extLst>
       <p:ext uri="{BB962C8B-B14F-4D97-AF65-F5344CB8AC3E}">
         <p14:creationId xmlns:p14="http://schemas.microsoft.com/office/powerpoint/2010/main" val="2060748048"/>
-      </p:ext>
-    </p:extLst>
-  </p:cSld>
-  <p:clrMapOvr>
-    <a:masterClrMapping/>
-  </p:clrMapOvr>
-  <p:transition/>
-</p:sld>
-</file>
-
-<file path=ppt/slides/slide49.xml><?xml version="1.0" encoding="utf-8"?>
-<p:sld xmlns:a="http://schemas.openxmlformats.org/drawingml/2006/main" xmlns:r="http://schemas.openxmlformats.org/officeDocument/2006/relationships" xmlns:p="http://schemas.openxmlformats.org/presentationml/2006/main" show="0">
-  <p:cSld>
-    <p:spTree>
-      <p:nvGrpSpPr>
-        <p:cNvPr id="1" name=""/>
-        <p:cNvGrpSpPr/>
-        <p:nvPr/>
-      </p:nvGrpSpPr>
-      <p:grpSpPr>
-        <a:xfrm>
-          <a:off x="0" y="0"/>
-          <a:ext cx="0" cy="0"/>
-          <a:chOff x="0" y="0"/>
-          <a:chExt cx="0" cy="0"/>
-        </a:xfrm>
-      </p:grpSpPr>
-      <p:sp>
-        <p:nvSpPr>
-          <p:cNvPr id="2" name="Foliennummernplatzhalter 1"/>
-          <p:cNvSpPr>
-            <a:spLocks noGrp="1"/>
-          </p:cNvSpPr>
-          <p:nvPr>
-            <p:ph type="sldNum" sz="quarter" idx="11"/>
-          </p:nvPr>
-        </p:nvSpPr>
-        <p:spPr/>
-        <p:txBody>
-          <a:bodyPr/>
-          <a:lstStyle/>
-          <a:p>
-            <a:fld id="{57D12BB6-0ED4-46B6-AB23-7758AD07EFBF}" type="slidenum">
-              <a:rPr lang="de-DE" smtClean="0"/>
-              <a:pPr/>
-              <a:t>49</a:t>
-            </a:fld>
-            <a:endParaRPr lang="de-DE" dirty="0"/>
-          </a:p>
-        </p:txBody>
-      </p:sp>
-      <p:sp>
-        <p:nvSpPr>
-          <p:cNvPr id="4" name="Titel 3"/>
-          <p:cNvSpPr>
-            <a:spLocks noGrp="1"/>
-          </p:cNvSpPr>
-          <p:nvPr>
-            <p:ph type="title"/>
-          </p:nvPr>
-        </p:nvSpPr>
-        <p:spPr>
-          <a:xfrm>
-            <a:off x="971550" y="1338104"/>
-            <a:ext cx="7740650" cy="863600"/>
-          </a:xfrm>
-        </p:spPr>
-        <p:txBody>
-          <a:bodyPr/>
-          <a:lstStyle/>
-          <a:p>
-            <a:r>
-              <a:rPr lang="de-DE" dirty="0"/>
-              <a:t> Montage</a:t>
-            </a:r>
-          </a:p>
-        </p:txBody>
-      </p:sp>
-      <p:sp>
-        <p:nvSpPr>
-          <p:cNvPr id="5" name="Fußzeilenplatzhalter 4"/>
-          <p:cNvSpPr>
-            <a:spLocks noGrp="1"/>
-          </p:cNvSpPr>
-          <p:nvPr>
-            <p:ph type="ftr" sz="quarter" idx="16"/>
-          </p:nvPr>
-        </p:nvSpPr>
-        <p:spPr/>
-        <p:txBody>
-          <a:bodyPr/>
-          <a:lstStyle/>
-          <a:p>
-            <a:r>
-              <a:rPr lang="de-DE" altLang="de-DE"/>
-              <a:t>Hochschule Mannheim | Julia Geigl, Klemens Behr, Kevin Höfle</a:t>
-            </a:r>
-            <a:endParaRPr lang="de-DE" altLang="de-DE" dirty="0"/>
-          </a:p>
-        </p:txBody>
-      </p:sp>
-      <p:pic>
-        <p:nvPicPr>
-          <p:cNvPr id="6" name="Grafik 5"/>
-          <p:cNvPicPr>
-            <a:picLocks noChangeAspect="1"/>
-          </p:cNvPicPr>
-          <p:nvPr/>
-        </p:nvPicPr>
-        <p:blipFill>
-          <a:blip r:embed="rId3" cstate="print">
-            <a:extLst>
-              <a:ext uri="{28A0092B-C50C-407E-A947-70E740481C1C}">
-                <a14:useLocalDpi xmlns:a14="http://schemas.microsoft.com/office/drawing/2010/main" val="0"/>
-              </a:ext>
-            </a:extLst>
-          </a:blip>
-          <a:stretch>
-            <a:fillRect/>
-          </a:stretch>
-        </p:blipFill>
-        <p:spPr>
-          <a:xfrm>
-            <a:off x="5004048" y="1427766"/>
-            <a:ext cx="2756130" cy="4906518"/>
-          </a:xfrm>
-          <a:prstGeom prst="rect">
-            <a:avLst/>
-          </a:prstGeom>
-        </p:spPr>
-      </p:pic>
-    </p:spTree>
-    <p:extLst>
-      <p:ext uri="{BB962C8B-B14F-4D97-AF65-F5344CB8AC3E}">
-        <p14:creationId xmlns:p14="http://schemas.microsoft.com/office/powerpoint/2010/main" val="3409337842"/>
       </p:ext>
     </p:extLst>
   </p:cSld>
@@ -25875,7 +26289,7 @@
 </file>
 
 <file path=ppt/slides/slide50.xml><?xml version="1.0" encoding="utf-8"?>
-<p:sld xmlns:a="http://schemas.openxmlformats.org/drawingml/2006/main" xmlns:r="http://schemas.openxmlformats.org/officeDocument/2006/relationships" xmlns:p="http://schemas.openxmlformats.org/presentationml/2006/main">
+<p:sld xmlns:a="http://schemas.openxmlformats.org/drawingml/2006/main" xmlns:r="http://schemas.openxmlformats.org/officeDocument/2006/relationships" xmlns:p="http://schemas.openxmlformats.org/presentationml/2006/main" show="0">
   <p:cSld>
     <p:spTree>
       <p:nvGrpSpPr>
@@ -25927,8 +26341,8 @@
         </p:nvSpPr>
         <p:spPr>
           <a:xfrm>
-            <a:off x="179512" y="3212976"/>
-            <a:ext cx="7164796" cy="863600"/>
+            <a:off x="971550" y="1338104"/>
+            <a:ext cx="7740650" cy="863600"/>
           </a:xfrm>
         </p:spPr>
         <p:txBody>
@@ -25936,8 +26350,8 @@
           <a:lstStyle/>
           <a:p>
             <a:r>
-              <a:rPr lang="de-DE" sz="6600" dirty="0"/>
-              <a:t>Live Demo</a:t>
+              <a:rPr lang="de-DE" dirty="0"/>
+              <a:t> Montage</a:t>
             </a:r>
           </a:p>
         </p:txBody>
@@ -25965,97 +26379,40 @@
           </a:p>
         </p:txBody>
       </p:sp>
-      <p:sp>
-        <p:nvSpPr>
-          <p:cNvPr id="6" name="Textfeld 5"/>
-          <p:cNvSpPr txBox="1"/>
+      <p:pic>
+        <p:nvPicPr>
+          <p:cNvPr id="6" name="Grafik 5"/>
+          <p:cNvPicPr>
+            <a:picLocks noChangeAspect="1"/>
+          </p:cNvPicPr>
           <p:nvPr/>
-        </p:nvSpPr>
+        </p:nvPicPr>
+        <p:blipFill>
+          <a:blip r:embed="rId3" cstate="print">
+            <a:extLst>
+              <a:ext uri="{28A0092B-C50C-407E-A947-70E740481C1C}">
+                <a14:useLocalDpi xmlns:a14="http://schemas.microsoft.com/office/drawing/2010/main" val="0"/>
+              </a:ext>
+            </a:extLst>
+          </a:blip>
+          <a:stretch>
+            <a:fillRect/>
+          </a:stretch>
+        </p:blipFill>
         <p:spPr>
           <a:xfrm>
-            <a:off x="179512" y="4221088"/>
-            <a:ext cx="8892988" cy="369332"/>
+            <a:off x="5004048" y="1427766"/>
+            <a:ext cx="2756130" cy="4906518"/>
           </a:xfrm>
           <a:prstGeom prst="rect">
             <a:avLst/>
           </a:prstGeom>
-          <a:noFill/>
         </p:spPr>
-        <p:txBody>
-          <a:bodyPr wrap="square" rtlCol="0">
-            <a:spAutoFit/>
-          </a:bodyPr>
-          <a:lstStyle/>
-          <a:p>
-            <a:pPr algn="l"/>
-            <a:r>
-              <a:rPr lang="de-DE" dirty="0">
-                <a:solidFill>
-                  <a:schemeClr val="bg1">
-                    <a:lumMod val="75000"/>
-                  </a:schemeClr>
-                </a:solidFill>
-              </a:rPr>
-              <a:t>Intro</a:t>
-            </a:r>
-            <a:r>
-              <a:rPr lang="de-DE" dirty="0"/>
-              <a:t> </a:t>
-            </a:r>
-            <a:r>
-              <a:rPr lang="de-DE" dirty="0" err="1">
-                <a:solidFill>
-                  <a:schemeClr val="bg1">
-                    <a:lumMod val="75000"/>
-                  </a:schemeClr>
-                </a:solidFill>
-              </a:rPr>
-              <a:t>Sensoren&amp;Bibliotheken</a:t>
-            </a:r>
-            <a:r>
-              <a:rPr lang="de-DE" dirty="0">
-                <a:solidFill>
-                  <a:schemeClr val="bg1">
-                    <a:lumMod val="75000"/>
-                  </a:schemeClr>
-                </a:solidFill>
-              </a:rPr>
-              <a:t> Kommunikation Programmablauf </a:t>
-            </a:r>
-            <a:r>
-              <a:rPr lang="de-DE" dirty="0" err="1">
-                <a:solidFill>
-                  <a:schemeClr val="bg1">
-                    <a:lumMod val="75000"/>
-                  </a:schemeClr>
-                </a:solidFill>
-              </a:rPr>
-              <a:t>IoT</a:t>
-            </a:r>
-            <a:r>
-              <a:rPr lang="de-DE" dirty="0">
-                <a:solidFill>
-                  <a:schemeClr val="bg1">
-                    <a:lumMod val="75000"/>
-                  </a:schemeClr>
-                </a:solidFill>
-              </a:rPr>
-              <a:t>-Plattform</a:t>
-            </a:r>
-            <a:endParaRPr lang="en-GB" dirty="0">
-              <a:solidFill>
-                <a:schemeClr val="bg1">
-                  <a:lumMod val="75000"/>
-                </a:schemeClr>
-              </a:solidFill>
-            </a:endParaRPr>
-          </a:p>
-        </p:txBody>
-      </p:sp>
+      </p:pic>
     </p:spTree>
     <p:extLst>
       <p:ext uri="{BB962C8B-B14F-4D97-AF65-F5344CB8AC3E}">
-        <p14:creationId xmlns:p14="http://schemas.microsoft.com/office/powerpoint/2010/main" val="3016203418"/>
+        <p14:creationId xmlns:p14="http://schemas.microsoft.com/office/powerpoint/2010/main" val="3409337842"/>
       </p:ext>
     </p:extLst>
   </p:cSld>
@@ -26109,368 +26466,27 @@
       </p:sp>
       <p:sp>
         <p:nvSpPr>
-          <p:cNvPr id="3" name="Textplatzhalter 2"/>
-          <p:cNvSpPr>
-            <a:spLocks noGrp="1"/>
-          </p:cNvSpPr>
-          <p:nvPr>
-            <p:ph type="body" sz="quarter" idx="15"/>
+          <p:cNvPr id="4" name="Titel 3"/>
+          <p:cNvSpPr>
+            <a:spLocks noGrp="1"/>
+          </p:cNvSpPr>
+          <p:nvPr>
+            <p:ph type="title"/>
           </p:nvPr>
         </p:nvSpPr>
         <p:spPr>
           <a:xfrm>
-            <a:off x="971550" y="2292349"/>
-            <a:ext cx="7740650" cy="4257675"/>
+            <a:off x="179512" y="3212976"/>
+            <a:ext cx="7164796" cy="863600"/>
           </a:xfrm>
         </p:spPr>
         <p:txBody>
           <a:bodyPr/>
           <a:lstStyle/>
           <a:p>
-            <a:pPr marL="0" indent="0">
-              <a:buNone/>
-            </a:pPr>
-            <a:r>
-              <a:rPr lang="de-DE" sz="1000" dirty="0"/>
-              <a:t>[1] </a:t>
-            </a:r>
-            <a:r>
-              <a:rPr lang="de-DE" sz="1000" dirty="0">
-                <a:hlinkClick r:id="rId2"/>
-              </a:rPr>
-              <a:t>http://blog.gemalto.com/wp-content/uploads/2015/01/M2M-world-of-connected-services.jpg</a:t>
-            </a:r>
-            <a:r>
-              <a:rPr lang="de-DE" sz="1000" dirty="0"/>
-              <a:t> 05.11.2016</a:t>
-            </a:r>
-          </a:p>
-          <a:p>
-            <a:pPr marL="0" indent="0">
-              <a:buNone/>
-            </a:pPr>
-            <a:r>
-              <a:rPr lang="de-DE" sz="1000" dirty="0"/>
-              <a:t>[2] </a:t>
-            </a:r>
-            <a:r>
-              <a:rPr lang="de-DE" sz="1000" dirty="0">
-                <a:hlinkClick r:id="rId3"/>
-              </a:rPr>
-              <a:t>http://howtomechatronics.com/wp-content/uploads/2016/01/DHT11-DDHT22-Working-Principle.png?x57244</a:t>
-            </a:r>
-            <a:r>
-              <a:rPr lang="de-DE" sz="1000" dirty="0"/>
-              <a:t> 05.11.2016 </a:t>
-            </a:r>
-          </a:p>
-          <a:p>
-            <a:pPr marL="0" indent="0">
-              <a:buNone/>
-            </a:pPr>
-            <a:r>
-              <a:rPr lang="de-DE" sz="1000" dirty="0"/>
-              <a:t>[3] </a:t>
-            </a:r>
-            <a:r>
-              <a:rPr lang="de-DE" sz="1000" dirty="0">
-                <a:hlinkClick r:id="rId4"/>
-              </a:rPr>
-              <a:t>http://ic4l.net/wp-content/uploads/dht11-module-300x300.png</a:t>
-            </a:r>
-            <a:r>
-              <a:rPr lang="de-DE" sz="1000" dirty="0"/>
-              <a:t> 05.11.2016</a:t>
-            </a:r>
-          </a:p>
-          <a:p>
-            <a:pPr marL="0" indent="0">
-              <a:buNone/>
-            </a:pPr>
-            <a:r>
-              <a:rPr lang="de-DE" sz="1000" dirty="0"/>
-              <a:t>[4] DHT11 </a:t>
-            </a:r>
-            <a:r>
-              <a:rPr lang="de-DE" sz="1000" dirty="0" err="1"/>
-              <a:t>Humidity</a:t>
-            </a:r>
-            <a:r>
-              <a:rPr lang="de-DE" sz="1000" dirty="0"/>
-              <a:t> &amp; </a:t>
-            </a:r>
-            <a:r>
-              <a:rPr lang="de-DE" sz="1000" dirty="0" err="1"/>
-              <a:t>Temperature</a:t>
-            </a:r>
-            <a:r>
-              <a:rPr lang="de-DE" sz="1000" dirty="0"/>
-              <a:t> Sensor D-</a:t>
-            </a:r>
-            <a:r>
-              <a:rPr lang="de-DE" sz="1000" dirty="0" err="1"/>
-              <a:t>Robotics</a:t>
-            </a:r>
-            <a:r>
-              <a:rPr lang="de-DE" sz="1000" dirty="0"/>
-              <a:t> UK, D-</a:t>
-            </a:r>
-            <a:r>
-              <a:rPr lang="de-DE" sz="1000" dirty="0" err="1"/>
-              <a:t>Robotics</a:t>
-            </a:r>
-            <a:r>
-              <a:rPr lang="de-DE" sz="1000" dirty="0"/>
-              <a:t> 7/30/2010 </a:t>
-            </a:r>
-            <a:r>
-              <a:rPr lang="de-DE" sz="1000" dirty="0">
-                <a:hlinkClick r:id="rId5"/>
-              </a:rPr>
-              <a:t>http://www.micropik.com/PDF/dht11.pdf</a:t>
-            </a:r>
-            <a:r>
-              <a:rPr lang="de-DE" sz="1000" dirty="0"/>
-              <a:t> Seite XX, Absatz XX 05.11.2016</a:t>
-            </a:r>
-          </a:p>
-          <a:p>
-            <a:pPr marL="0" indent="0">
-              <a:buNone/>
-            </a:pPr>
-            <a:r>
-              <a:rPr lang="de-DE" sz="1000" dirty="0"/>
-              <a:t>[5] </a:t>
-            </a:r>
-            <a:r>
-              <a:rPr lang="de-DE" sz="1000" dirty="0">
-                <a:hlinkClick r:id="rId6"/>
-              </a:rPr>
-              <a:t>https://youtu.be/VelviRLkUeo</a:t>
-            </a:r>
-            <a:r>
-              <a:rPr lang="de-DE" sz="1000" dirty="0"/>
-              <a:t> 05.11.2016</a:t>
-            </a:r>
-          </a:p>
-          <a:p>
-            <a:pPr marL="0" indent="0">
-              <a:buNone/>
-            </a:pPr>
-            <a:r>
-              <a:rPr lang="de-DE" sz="1000" dirty="0"/>
-              <a:t>[6] </a:t>
-            </a:r>
-            <a:r>
-              <a:rPr lang="de-DE" sz="1000" dirty="0">
-                <a:hlinkClick r:id="rId7"/>
-              </a:rPr>
-              <a:t>https://www.adafruit.com/about</a:t>
-            </a:r>
-            <a:r>
-              <a:rPr lang="de-DE" sz="1000" dirty="0"/>
-              <a:t> 05.11.2016</a:t>
-            </a:r>
-          </a:p>
-          <a:p>
-            <a:pPr marL="0" indent="0">
-              <a:buNone/>
-            </a:pPr>
-            <a:r>
-              <a:rPr lang="de-DE" sz="1000" dirty="0"/>
-              <a:t>[7] </a:t>
-            </a:r>
-            <a:r>
-              <a:rPr lang="de-DE" sz="1000" dirty="0">
-                <a:hlinkClick r:id="rId8"/>
-              </a:rPr>
-              <a:t>https://io.adafruit.com/logos/logo_2x.png 05.11.2016</a:t>
-            </a:r>
-            <a:endParaRPr lang="de-DE" sz="1000" dirty="0"/>
-          </a:p>
-          <a:p>
-            <a:pPr marL="0" indent="0">
-              <a:buNone/>
-            </a:pPr>
-            <a:r>
-              <a:rPr lang="de-DE" sz="1000" dirty="0"/>
-              <a:t>[8] </a:t>
-            </a:r>
-            <a:r>
-              <a:rPr lang="de-DE" sz="1000" dirty="0">
-                <a:hlinkClick r:id="rId9"/>
-              </a:rPr>
-              <a:t>http://4sitewebsolutions.com/hvac/wp-content/uploads/2013/04/carrier3.png 06.11.2016</a:t>
-            </a:r>
-            <a:r>
-              <a:rPr lang="de-DE" sz="1000" dirty="0"/>
-              <a:t> </a:t>
-            </a:r>
-          </a:p>
-          <a:p>
-            <a:pPr marL="0" indent="0">
-              <a:buNone/>
-            </a:pPr>
-            <a:r>
-              <a:rPr lang="de-DE" sz="1000" dirty="0"/>
-              <a:t>[9] </a:t>
-            </a:r>
-            <a:r>
-              <a:rPr lang="de-DE" sz="1000" dirty="0">
-                <a:hlinkClick r:id="rId10"/>
-              </a:rPr>
-              <a:t>http://www.umweltbundesamt.de/themen/gesundheit/umwelteinfluesse-auf-den-menschen/schimmel/richtig-lueften-schimmelbildung-vermeiden 06.11.2016</a:t>
-            </a:r>
-            <a:endParaRPr lang="de-DE" sz="1000" dirty="0"/>
-          </a:p>
-          <a:p>
-            <a:pPr marL="0" indent="0">
-              <a:buNone/>
-            </a:pPr>
-            <a:r>
-              <a:rPr lang="de-DE" sz="1000" dirty="0"/>
-              <a:t>[10]http://images.google.de/imgres?imgurl=http%3A%2F%2Fwww.radon.com%2Fimages%2Ffigure6.gif&amp;imgrefurl=http%3A%2F%2Fwww.radon.com%2Fradon%2Fradon_analysis.html&amp;h=268&amp;w=337&amp;tbnid=OpSfZ3xZmypDgM%3A&amp;vet=1&amp;docid=NvviVYV6guTSMM&amp;ei=WKwhWKbEJcHlUea2gfgL&amp;tbm=isch&amp;client=firefox-b-ab&amp;iact=rc&amp;uact=3&amp;dur=460&amp;page=0&amp;start=0&amp;ndsp=41&amp;ved=0ahUKEwim0KyA_ZjQAhXBchQKHWZbAL8QMwggKAQwBA&amp;bih=969&amp;biw=1920 08.11.2016 </a:t>
-            </a:r>
-          </a:p>
-          <a:p>
-            <a:pPr marL="0" indent="0">
-              <a:buNone/>
-            </a:pPr>
-            <a:r>
-              <a:rPr lang="de-DE" sz="1000" dirty="0"/>
-              <a:t>[11] </a:t>
-            </a:r>
-            <a:r>
-              <a:rPr lang="de-DE" sz="1000" dirty="0">
-                <a:hlinkClick r:id="rId11"/>
-              </a:rPr>
-              <a:t>https://www.adafruit.com/category/17</a:t>
-            </a:r>
-            <a:r>
-              <a:rPr lang="de-DE" sz="1000" dirty="0"/>
-              <a:t> 	06.12.2016</a:t>
-            </a:r>
-          </a:p>
-          <a:p>
-            <a:pPr marL="0" indent="0">
-              <a:buNone/>
-            </a:pPr>
-            <a:r>
-              <a:rPr lang="de-DE" sz="1000" dirty="0"/>
-              <a:t>[12] </a:t>
-            </a:r>
-            <a:r>
-              <a:rPr lang="de-DE" sz="1000" dirty="0">
-                <a:hlinkClick r:id="rId12"/>
-              </a:rPr>
-              <a:t>https://learn.adafruit.com/adafruit-io/overview</a:t>
-            </a:r>
-            <a:r>
-              <a:rPr lang="de-DE" sz="1000" dirty="0"/>
-              <a:t>	06.12.2016</a:t>
-            </a:r>
-          </a:p>
-          <a:p>
-            <a:pPr marL="0" indent="0">
-              <a:buNone/>
-            </a:pPr>
-            <a:r>
-              <a:rPr lang="de-DE" sz="1000" dirty="0"/>
-              <a:t>[13] </a:t>
-            </a:r>
-            <a:r>
-              <a:rPr lang="de-DE" sz="1000" dirty="0">
-                <a:hlinkClick r:id="rId13"/>
-              </a:rPr>
-              <a:t>https://learn.adafruit.com/adafruit-io/client-libraries</a:t>
-            </a:r>
-            <a:r>
-              <a:rPr lang="de-DE" sz="1000" dirty="0"/>
-              <a:t>	06.12.2016</a:t>
-            </a:r>
-          </a:p>
-          <a:p>
-            <a:pPr marL="0" indent="0">
-              <a:buNone/>
-            </a:pPr>
-            <a:r>
-              <a:rPr lang="de-DE" sz="1000" dirty="0"/>
-              <a:t>[14] </a:t>
-            </a:r>
-            <a:r>
-              <a:rPr lang="de-DE" sz="1000" dirty="0">
-                <a:hlinkClick r:id="rId14"/>
-              </a:rPr>
-              <a:t>https://learn.adafruit.com/adafruit-io/browser</a:t>
-            </a:r>
-            <a:r>
-              <a:rPr lang="de-DE" sz="1000" dirty="0"/>
-              <a:t>		06.12.2016</a:t>
-            </a:r>
-          </a:p>
-          <a:p>
-            <a:pPr marL="0" indent="0">
-              <a:buNone/>
-            </a:pPr>
-            <a:r>
-              <a:rPr lang="de-DE" sz="1000" dirty="0"/>
-              <a:t>[15] </a:t>
-            </a:r>
-            <a:r>
-              <a:rPr lang="de-DE" sz="1000" dirty="0">
-                <a:hlinkClick r:id="rId15"/>
-              </a:rPr>
-              <a:t>https://learn.adafruit.com/adafruit-io/mqtt-api</a:t>
-            </a:r>
-            <a:r>
-              <a:rPr lang="de-DE" sz="1000" dirty="0"/>
-              <a:t>		06.12.2016</a:t>
-            </a:r>
-          </a:p>
-          <a:p>
-            <a:pPr marL="0" indent="0">
-              <a:buNone/>
-            </a:pPr>
-            <a:endParaRPr lang="de-DE" sz="1000" dirty="0"/>
-          </a:p>
-          <a:p>
-            <a:pPr marL="0" indent="0">
-              <a:buNone/>
-            </a:pPr>
-            <a:endParaRPr lang="de-DE" sz="1000" dirty="0"/>
-          </a:p>
-          <a:p>
-            <a:pPr marL="0" indent="0">
-              <a:buNone/>
-            </a:pPr>
-            <a:endParaRPr lang="de-DE" sz="1000" dirty="0"/>
-          </a:p>
-          <a:p>
-            <a:pPr marL="0" indent="0">
-              <a:buNone/>
-            </a:pPr>
-            <a:endParaRPr lang="de-DE" sz="1000" dirty="0"/>
-          </a:p>
-        </p:txBody>
-      </p:sp>
-      <p:sp>
-        <p:nvSpPr>
-          <p:cNvPr id="4" name="Titel 3"/>
-          <p:cNvSpPr>
-            <a:spLocks noGrp="1"/>
-          </p:cNvSpPr>
-          <p:nvPr>
-            <p:ph type="title"/>
-          </p:nvPr>
-        </p:nvSpPr>
-        <p:spPr/>
-        <p:txBody>
-          <a:bodyPr/>
-          <a:lstStyle/>
-          <a:p>
-            <a:r>
-              <a:rPr lang="de-DE" dirty="0"/>
-              <a:t>Quellen</a:t>
+            <a:r>
+              <a:rPr lang="de-DE" sz="6600" dirty="0"/>
+              <a:t>Live Demo</a:t>
             </a:r>
           </a:p>
         </p:txBody>
@@ -26495,13 +26511,100 @@
               <a:t>Hochschule Mannheim | Julia Geigl, Klemens Behr, Kevin Höfle</a:t>
             </a:r>
             <a:endParaRPr lang="de-DE" altLang="de-DE" dirty="0"/>
+          </a:p>
+        </p:txBody>
+      </p:sp>
+      <p:sp>
+        <p:nvSpPr>
+          <p:cNvPr id="6" name="Textfeld 5"/>
+          <p:cNvSpPr txBox="1"/>
+          <p:nvPr/>
+        </p:nvSpPr>
+        <p:spPr>
+          <a:xfrm>
+            <a:off x="179512" y="4221088"/>
+            <a:ext cx="8892988" cy="369332"/>
+          </a:xfrm>
+          <a:prstGeom prst="rect">
+            <a:avLst/>
+          </a:prstGeom>
+          <a:noFill/>
+        </p:spPr>
+        <p:txBody>
+          <a:bodyPr wrap="square" rtlCol="0">
+            <a:spAutoFit/>
+          </a:bodyPr>
+          <a:lstStyle/>
+          <a:p>
+            <a:pPr algn="l"/>
+            <a:r>
+              <a:rPr lang="de-DE" dirty="0">
+                <a:solidFill>
+                  <a:schemeClr val="bg1">
+                    <a:lumMod val="75000"/>
+                  </a:schemeClr>
+                </a:solidFill>
+              </a:rPr>
+              <a:t>Intro</a:t>
+            </a:r>
+            <a:r>
+              <a:rPr lang="de-DE" dirty="0"/>
+              <a:t> </a:t>
+            </a:r>
+            <a:r>
+              <a:rPr lang="de-DE" dirty="0" err="1">
+                <a:solidFill>
+                  <a:schemeClr val="bg1">
+                    <a:lumMod val="75000"/>
+                  </a:schemeClr>
+                </a:solidFill>
+              </a:rPr>
+              <a:t>Sensoren&amp;Bibliotheken</a:t>
+            </a:r>
+            <a:r>
+              <a:rPr lang="de-DE" dirty="0">
+                <a:solidFill>
+                  <a:schemeClr val="bg1">
+                    <a:lumMod val="75000"/>
+                  </a:schemeClr>
+                </a:solidFill>
+              </a:rPr>
+              <a:t> Kommunikation Programmablauf </a:t>
+            </a:r>
+            <a:r>
+              <a:rPr lang="de-DE" dirty="0" err="1">
+                <a:solidFill>
+                  <a:schemeClr val="bg1">
+                    <a:lumMod val="75000"/>
+                  </a:schemeClr>
+                </a:solidFill>
+              </a:rPr>
+              <a:t>IoT</a:t>
+            </a:r>
+            <a:r>
+              <a:rPr lang="de-DE" dirty="0">
+                <a:solidFill>
+                  <a:schemeClr val="bg1">
+                    <a:lumMod val="75000"/>
+                  </a:schemeClr>
+                </a:solidFill>
+              </a:rPr>
+              <a:t>-Plattform</a:t>
+            </a:r>
+            <a:endParaRPr lang="en-GB" dirty="0">
+              <a:solidFill>
+                <a:schemeClr val="bg1">
+                  <a:lumMod val="75000"/>
+                </a:schemeClr>
+              </a:solidFill>
+            </a:endParaRPr>
           </a:p>
         </p:txBody>
       </p:sp>
     </p:spTree>
     <p:extLst>
       <p:ext uri="{BB962C8B-B14F-4D97-AF65-F5344CB8AC3E}">
-        <p14:creationId xmlns:p14="http://schemas.microsoft.com/office/powerpoint/2010/main" val="3863859420"/>
+        <p14:creationId xmlns:p14="http://schemas.microsoft.com/office/powerpoint/2010/main" val="3016203418"/>
       </p:ext>
     </p:extLst>
   </p:cSld>
@@ -26555,6 +26658,478 @@
       </p:sp>
       <p:sp>
         <p:nvSpPr>
+          <p:cNvPr id="3" name="Textplatzhalter 2"/>
+          <p:cNvSpPr>
+            <a:spLocks noGrp="1"/>
+          </p:cNvSpPr>
+          <p:nvPr>
+            <p:ph type="body" sz="quarter" idx="15"/>
+          </p:nvPr>
+        </p:nvSpPr>
+        <p:spPr>
+          <a:xfrm>
+            <a:off x="971550" y="2292349"/>
+            <a:ext cx="7740650" cy="4257675"/>
+          </a:xfrm>
+        </p:spPr>
+        <p:txBody>
+          <a:bodyPr/>
+          <a:lstStyle/>
+          <a:p>
+            <a:pPr marL="0" indent="0">
+              <a:buNone/>
+            </a:pPr>
+            <a:r>
+              <a:rPr lang="de-DE" sz="1000" dirty="0"/>
+              <a:t>[1] </a:t>
+            </a:r>
+            <a:r>
+              <a:rPr lang="de-DE" sz="1000" dirty="0">
+                <a:hlinkClick r:id="rId2"/>
+              </a:rPr>
+              <a:t>http://blog.gemalto.com/wp-content/uploads/2015/01/M2M-world-of-connected-services.jpg</a:t>
+            </a:r>
+            <a:r>
+              <a:rPr lang="de-DE" sz="1000" dirty="0"/>
+              <a:t> 05.11.2016</a:t>
+            </a:r>
+          </a:p>
+          <a:p>
+            <a:pPr marL="0" indent="0">
+              <a:buNone/>
+            </a:pPr>
+            <a:r>
+              <a:rPr lang="de-DE" sz="1000" dirty="0"/>
+              <a:t>[2] </a:t>
+            </a:r>
+            <a:r>
+              <a:rPr lang="de-DE" sz="1000" dirty="0">
+                <a:hlinkClick r:id="rId3"/>
+              </a:rPr>
+              <a:t>http://howtomechatronics.com/wp-content/uploads/2016/01/DHT11-DDHT22-Working-Principle.png?x57244</a:t>
+            </a:r>
+            <a:r>
+              <a:rPr lang="de-DE" sz="1000" dirty="0"/>
+              <a:t> 05.11.2016 </a:t>
+            </a:r>
+          </a:p>
+          <a:p>
+            <a:pPr marL="0" indent="0">
+              <a:buNone/>
+            </a:pPr>
+            <a:r>
+              <a:rPr lang="de-DE" sz="1000" dirty="0"/>
+              <a:t>[3] </a:t>
+            </a:r>
+            <a:r>
+              <a:rPr lang="de-DE" sz="1000" dirty="0">
+                <a:hlinkClick r:id="rId4"/>
+              </a:rPr>
+              <a:t>http://ic4l.net/wp-content/uploads/dht11-module-300x300.png</a:t>
+            </a:r>
+            <a:r>
+              <a:rPr lang="de-DE" sz="1000" dirty="0"/>
+              <a:t> 05.11.2016</a:t>
+            </a:r>
+          </a:p>
+          <a:p>
+            <a:pPr marL="0" indent="0">
+              <a:buNone/>
+            </a:pPr>
+            <a:r>
+              <a:rPr lang="de-DE" sz="1000" dirty="0"/>
+              <a:t>[4] DHT11 </a:t>
+            </a:r>
+            <a:r>
+              <a:rPr lang="de-DE" sz="1000" dirty="0" err="1"/>
+              <a:t>Humidity</a:t>
+            </a:r>
+            <a:r>
+              <a:rPr lang="de-DE" sz="1000" dirty="0"/>
+              <a:t> &amp; </a:t>
+            </a:r>
+            <a:r>
+              <a:rPr lang="de-DE" sz="1000" dirty="0" err="1"/>
+              <a:t>Temperature</a:t>
+            </a:r>
+            <a:r>
+              <a:rPr lang="de-DE" sz="1000" dirty="0"/>
+              <a:t> Sensor D-</a:t>
+            </a:r>
+            <a:r>
+              <a:rPr lang="de-DE" sz="1000" dirty="0" err="1"/>
+              <a:t>Robotics</a:t>
+            </a:r>
+            <a:r>
+              <a:rPr lang="de-DE" sz="1000" dirty="0"/>
+              <a:t> UK, D-</a:t>
+            </a:r>
+            <a:r>
+              <a:rPr lang="de-DE" sz="1000" dirty="0" err="1"/>
+              <a:t>Robotics</a:t>
+            </a:r>
+            <a:r>
+              <a:rPr lang="de-DE" sz="1000" dirty="0"/>
+              <a:t> 7/30/2010 </a:t>
+            </a:r>
+            <a:r>
+              <a:rPr lang="de-DE" sz="1000" dirty="0">
+                <a:hlinkClick r:id="rId5"/>
+              </a:rPr>
+              <a:t>http://www.micropik.com/PDF/dht11.pdf</a:t>
+            </a:r>
+            <a:r>
+              <a:rPr lang="de-DE" sz="1000" dirty="0"/>
+              <a:t> Seite XX, Absatz XX 05.11.2016</a:t>
+            </a:r>
+          </a:p>
+          <a:p>
+            <a:pPr marL="0" indent="0">
+              <a:buNone/>
+            </a:pPr>
+            <a:r>
+              <a:rPr lang="de-DE" sz="1000" dirty="0"/>
+              <a:t>[5] </a:t>
+            </a:r>
+            <a:r>
+              <a:rPr lang="de-DE" sz="1000" dirty="0">
+                <a:hlinkClick r:id="rId6"/>
+              </a:rPr>
+              <a:t>https://youtu.be/VelviRLkUeo</a:t>
+            </a:r>
+            <a:r>
+              <a:rPr lang="de-DE" sz="1000" dirty="0"/>
+              <a:t> 05.11.2016</a:t>
+            </a:r>
+          </a:p>
+          <a:p>
+            <a:pPr marL="0" indent="0">
+              <a:buNone/>
+            </a:pPr>
+            <a:r>
+              <a:rPr lang="de-DE" sz="1000" dirty="0"/>
+              <a:t>[6] </a:t>
+            </a:r>
+            <a:r>
+              <a:rPr lang="de-DE" sz="1000" dirty="0">
+                <a:hlinkClick r:id="rId7"/>
+              </a:rPr>
+              <a:t>https://www.adafruit.com/about</a:t>
+            </a:r>
+            <a:r>
+              <a:rPr lang="de-DE" sz="1000" dirty="0"/>
+              <a:t> 05.11.2016</a:t>
+            </a:r>
+          </a:p>
+          <a:p>
+            <a:pPr marL="0" indent="0">
+              <a:buNone/>
+            </a:pPr>
+            <a:r>
+              <a:rPr lang="de-DE" sz="1000" dirty="0"/>
+              <a:t>[7] </a:t>
+            </a:r>
+            <a:r>
+              <a:rPr lang="de-DE" sz="1000" dirty="0">
+                <a:hlinkClick r:id="rId8"/>
+              </a:rPr>
+              <a:t>https://io.adafruit.com/logos/logo_2x.png 05.11.2016</a:t>
+            </a:r>
+            <a:endParaRPr lang="de-DE" sz="1000" dirty="0"/>
+          </a:p>
+          <a:p>
+            <a:pPr marL="0" indent="0">
+              <a:buNone/>
+            </a:pPr>
+            <a:r>
+              <a:rPr lang="de-DE" sz="1000" dirty="0"/>
+              <a:t>[8] </a:t>
+            </a:r>
+            <a:r>
+              <a:rPr lang="de-DE" sz="1000" dirty="0">
+                <a:hlinkClick r:id="rId9"/>
+              </a:rPr>
+              <a:t>http://4sitewebsolutions.com/hvac/wp-content/uploads/2013/04/carrier3.png 06.11.2016</a:t>
+            </a:r>
+            <a:r>
+              <a:rPr lang="de-DE" sz="1000" dirty="0"/>
+              <a:t> </a:t>
+            </a:r>
+          </a:p>
+          <a:p>
+            <a:pPr marL="0" indent="0">
+              <a:buNone/>
+            </a:pPr>
+            <a:r>
+              <a:rPr lang="de-DE" sz="1000" dirty="0"/>
+              <a:t>[9] </a:t>
+            </a:r>
+            <a:r>
+              <a:rPr lang="de-DE" sz="1000" dirty="0">
+                <a:hlinkClick r:id="rId10"/>
+              </a:rPr>
+              <a:t>http://www.umweltbundesamt.de/themen/gesundheit/umwelteinfluesse-auf-den-menschen/schimmel/richtig-lueften-schimmelbildung-vermeiden 06.11.2016</a:t>
+            </a:r>
+            <a:endParaRPr lang="de-DE" sz="1000" dirty="0"/>
+          </a:p>
+          <a:p>
+            <a:pPr marL="0" indent="0">
+              <a:buNone/>
+            </a:pPr>
+            <a:r>
+              <a:rPr lang="de-DE" sz="1000" dirty="0"/>
+              <a:t>[10]http://images.google.de/imgres?imgurl=http%3A%2F%2Fwww.radon.com%2Fimages%2Ffigure6.gif&amp;imgrefurl=http%3A%2F%2Fwww.radon.com%2Fradon%2Fradon_analysis.html&amp;h=268&amp;w=337&amp;tbnid=OpSfZ3xZmypDgM%3A&amp;vet=1&amp;docid=NvviVYV6guTSMM&amp;ei=WKwhWKbEJcHlUea2gfgL&amp;tbm=isch&amp;client=firefox-b-ab&amp;iact=rc&amp;uact=3&amp;dur=460&amp;page=0&amp;start=0&amp;ndsp=41&amp;ved=0ahUKEwim0KyA_ZjQAhXBchQKHWZbAL8QMwggKAQwBA&amp;bih=969&amp;biw=1920 08.11.2016 </a:t>
+            </a:r>
+          </a:p>
+          <a:p>
+            <a:pPr marL="0" indent="0">
+              <a:buNone/>
+            </a:pPr>
+            <a:r>
+              <a:rPr lang="de-DE" sz="1000" dirty="0"/>
+              <a:t>[11] </a:t>
+            </a:r>
+            <a:r>
+              <a:rPr lang="de-DE" sz="1000" dirty="0">
+                <a:hlinkClick r:id="rId11"/>
+              </a:rPr>
+              <a:t>https://www.adafruit.com/category/17</a:t>
+            </a:r>
+            <a:r>
+              <a:rPr lang="de-DE" sz="1000" dirty="0"/>
+              <a:t> 	06.12.2016</a:t>
+            </a:r>
+          </a:p>
+          <a:p>
+            <a:pPr marL="0" indent="0">
+              <a:buNone/>
+            </a:pPr>
+            <a:r>
+              <a:rPr lang="de-DE" sz="1000" dirty="0"/>
+              <a:t>[12] </a:t>
+            </a:r>
+            <a:r>
+              <a:rPr lang="de-DE" sz="1000" dirty="0">
+                <a:hlinkClick r:id="rId12"/>
+              </a:rPr>
+              <a:t>https://learn.adafruit.com/adafruit-io/overview</a:t>
+            </a:r>
+            <a:r>
+              <a:rPr lang="de-DE" sz="1000" dirty="0"/>
+              <a:t>	06.12.2016</a:t>
+            </a:r>
+          </a:p>
+          <a:p>
+            <a:pPr marL="0" indent="0">
+              <a:buNone/>
+            </a:pPr>
+            <a:r>
+              <a:rPr lang="de-DE" sz="1000" dirty="0"/>
+              <a:t>[13] </a:t>
+            </a:r>
+            <a:r>
+              <a:rPr lang="de-DE" sz="1000" dirty="0">
+                <a:hlinkClick r:id="rId13"/>
+              </a:rPr>
+              <a:t>https://learn.adafruit.com/adafruit-io/client-libraries</a:t>
+            </a:r>
+            <a:r>
+              <a:rPr lang="de-DE" sz="1000" dirty="0"/>
+              <a:t>	06.12.2016</a:t>
+            </a:r>
+          </a:p>
+          <a:p>
+            <a:pPr marL="0" indent="0">
+              <a:buNone/>
+            </a:pPr>
+            <a:r>
+              <a:rPr lang="de-DE" sz="1000" dirty="0"/>
+              <a:t>[14] </a:t>
+            </a:r>
+            <a:r>
+              <a:rPr lang="de-DE" sz="1000" dirty="0">
+                <a:hlinkClick r:id="rId14"/>
+              </a:rPr>
+              <a:t>https://learn.adafruit.com/adafruit-io/browser</a:t>
+            </a:r>
+            <a:r>
+              <a:rPr lang="de-DE" sz="1000" dirty="0"/>
+              <a:t>		06.12.2016</a:t>
+            </a:r>
+          </a:p>
+          <a:p>
+            <a:pPr marL="0" indent="0">
+              <a:buNone/>
+            </a:pPr>
+            <a:r>
+              <a:rPr lang="de-DE" sz="1000" dirty="0"/>
+              <a:t>[15] </a:t>
+            </a:r>
+            <a:r>
+              <a:rPr lang="de-DE" sz="1000" dirty="0">
+                <a:hlinkClick r:id="rId15"/>
+              </a:rPr>
+              <a:t>https://learn.adafruit.com/adafruit-io/mqtt-api</a:t>
+            </a:r>
+            <a:r>
+              <a:rPr lang="de-DE" sz="1000" dirty="0"/>
+              <a:t>		06.12.2016</a:t>
+            </a:r>
+          </a:p>
+          <a:p>
+            <a:pPr marL="0" indent="0">
+              <a:buNone/>
+            </a:pPr>
+            <a:r>
+              <a:rPr lang="de-DE" sz="1000"/>
+              <a:t>[16] </a:t>
+            </a:r>
+            <a:r>
+              <a:rPr lang="de-DE" sz="1000">
+                <a:hlinkClick r:id="rId16"/>
+              </a:rPr>
+              <a:t>https</a:t>
+            </a:r>
+            <a:r>
+              <a:rPr lang="de-DE" sz="1000">
+                <a:hlinkClick r:id="rId16"/>
+              </a:rPr>
+              <a:t>://learn.adafruit.com/adafruit-io/data-policies</a:t>
+            </a:r>
+            <a:r>
+              <a:rPr lang="de-DE" sz="1000"/>
+              <a:t>	13.12.2016</a:t>
+            </a:r>
+            <a:endParaRPr lang="de-DE" sz="1000" dirty="0"/>
+          </a:p>
+          <a:p>
+            <a:pPr marL="0" indent="0">
+              <a:buNone/>
+            </a:pPr>
+            <a:endParaRPr lang="de-DE" sz="1000" dirty="0"/>
+          </a:p>
+          <a:p>
+            <a:pPr marL="0" indent="0">
+              <a:buNone/>
+            </a:pPr>
+            <a:endParaRPr lang="de-DE" sz="1000" dirty="0"/>
+          </a:p>
+          <a:p>
+            <a:pPr marL="0" indent="0">
+              <a:buNone/>
+            </a:pPr>
+            <a:endParaRPr lang="de-DE" sz="1000" dirty="0"/>
+          </a:p>
+          <a:p>
+            <a:pPr marL="0" indent="0">
+              <a:buNone/>
+            </a:pPr>
+            <a:endParaRPr lang="de-DE" sz="1000" dirty="0"/>
+          </a:p>
+        </p:txBody>
+      </p:sp>
+      <p:sp>
+        <p:nvSpPr>
+          <p:cNvPr id="4" name="Titel 3"/>
+          <p:cNvSpPr>
+            <a:spLocks noGrp="1"/>
+          </p:cNvSpPr>
+          <p:nvPr>
+            <p:ph type="title"/>
+          </p:nvPr>
+        </p:nvSpPr>
+        <p:spPr/>
+        <p:txBody>
+          <a:bodyPr/>
+          <a:lstStyle/>
+          <a:p>
+            <a:r>
+              <a:rPr lang="de-DE" dirty="0"/>
+              <a:t>Quellen</a:t>
+            </a:r>
+          </a:p>
+        </p:txBody>
+      </p:sp>
+      <p:sp>
+        <p:nvSpPr>
+          <p:cNvPr id="5" name="Fußzeilenplatzhalter 4"/>
+          <p:cNvSpPr>
+            <a:spLocks noGrp="1"/>
+          </p:cNvSpPr>
+          <p:nvPr>
+            <p:ph type="ftr" sz="quarter" idx="16"/>
+          </p:nvPr>
+        </p:nvSpPr>
+        <p:spPr/>
+        <p:txBody>
+          <a:bodyPr/>
+          <a:lstStyle/>
+          <a:p>
+            <a:r>
+              <a:rPr lang="de-DE" altLang="de-DE"/>
+              <a:t>Hochschule Mannheim | Julia Geigl, Klemens Behr, Kevin Höfle</a:t>
+            </a:r>
+            <a:endParaRPr lang="de-DE" altLang="de-DE" dirty="0"/>
+          </a:p>
+        </p:txBody>
+      </p:sp>
+    </p:spTree>
+    <p:extLst>
+      <p:ext uri="{BB962C8B-B14F-4D97-AF65-F5344CB8AC3E}">
+        <p14:creationId xmlns:p14="http://schemas.microsoft.com/office/powerpoint/2010/main" val="3863859420"/>
+      </p:ext>
+    </p:extLst>
+  </p:cSld>
+  <p:clrMapOvr>
+    <a:masterClrMapping/>
+  </p:clrMapOvr>
+  <p:transition/>
+</p:sld>
+</file>
+
+<file path=ppt/slides/slide53.xml><?xml version="1.0" encoding="utf-8"?>
+<p:sld xmlns:a="http://schemas.openxmlformats.org/drawingml/2006/main" xmlns:r="http://schemas.openxmlformats.org/officeDocument/2006/relationships" xmlns:p="http://schemas.openxmlformats.org/presentationml/2006/main">
+  <p:cSld>
+    <p:spTree>
+      <p:nvGrpSpPr>
+        <p:cNvPr id="1" name=""/>
+        <p:cNvGrpSpPr/>
+        <p:nvPr/>
+      </p:nvGrpSpPr>
+      <p:grpSpPr>
+        <a:xfrm>
+          <a:off x="0" y="0"/>
+          <a:ext cx="0" cy="0"/>
+          <a:chOff x="0" y="0"/>
+          <a:chExt cx="0" cy="0"/>
+        </a:xfrm>
+      </p:grpSpPr>
+      <p:sp>
+        <p:nvSpPr>
+          <p:cNvPr id="2" name="Foliennummernplatzhalter 1"/>
+          <p:cNvSpPr>
+            <a:spLocks noGrp="1"/>
+          </p:cNvSpPr>
+          <p:nvPr>
+            <p:ph type="sldNum" sz="quarter" idx="11"/>
+          </p:nvPr>
+        </p:nvSpPr>
+        <p:spPr/>
+        <p:txBody>
+          <a:bodyPr/>
+          <a:lstStyle/>
+          <a:p>
+            <a:fld id="{57D12BB6-0ED4-46B6-AB23-7758AD07EFBF}" type="slidenum">
+              <a:rPr lang="de-DE" smtClean="0"/>
+              <a:pPr/>
+              <a:t>53</a:t>
+            </a:fld>
+            <a:endParaRPr lang="de-DE" dirty="0"/>
+          </a:p>
+        </p:txBody>
+      </p:sp>
+      <p:sp>
+        <p:nvSpPr>
           <p:cNvPr id="4" name="Titel 3"/>
           <p:cNvSpPr>
             <a:spLocks noGrp="1"/>
@@ -26637,7 +27212,6 @@
               <a:rPr lang="de-DE" dirty="0"/>
               <a:t>Code verfügbar unter: https://github.com/ProjektlaborEmbeddedSecurity/Projekt</a:t>
             </a:r>
-            <a:endParaRPr lang="de-DE" dirty="0"/>
           </a:p>
         </p:txBody>
       </p:sp>
@@ -26655,7 +27229,7 @@
 </p:sld>
 </file>
 
-<file path=ppt/slides/slide53.xml><?xml version="1.0" encoding="utf-8"?>
+<file path=ppt/slides/slide54.xml><?xml version="1.0" encoding="utf-8"?>
 <p:sld xmlns:a="http://schemas.openxmlformats.org/drawingml/2006/main" xmlns:r="http://schemas.openxmlformats.org/officeDocument/2006/relationships" xmlns:p="http://schemas.openxmlformats.org/presentationml/2006/main" show="0">
   <p:cSld>
     <p:spTree>
@@ -26690,7 +27264,7 @@
             <a:fld id="{57D12BB6-0ED4-46B6-AB23-7758AD07EFBF}" type="slidenum">
               <a:rPr lang="de-DE" smtClean="0"/>
               <a:pPr/>
-              <a:t>53</a:t>
+              <a:t>54</a:t>
             </a:fld>
             <a:endParaRPr lang="de-DE" dirty="0"/>
           </a:p>
@@ -27308,7 +27882,7 @@
 </p:sld>
 </file>
 
-<file path=ppt/slides/slide54.xml><?xml version="1.0" encoding="utf-8"?>
+<file path=ppt/slides/slide55.xml><?xml version="1.0" encoding="utf-8"?>
 <p:sld xmlns:a="http://schemas.openxmlformats.org/drawingml/2006/main" xmlns:r="http://schemas.openxmlformats.org/officeDocument/2006/relationships" xmlns:p="http://schemas.openxmlformats.org/presentationml/2006/main" show="0">
   <p:cSld>
     <p:spTree>
@@ -27343,7 +27917,7 @@
             <a:fld id="{57D12BB6-0ED4-46B6-AB23-7758AD07EFBF}" type="slidenum">
               <a:rPr lang="de-DE" smtClean="0"/>
               <a:pPr/>
-              <a:t>54</a:t>
+              <a:t>55</a:t>
             </a:fld>
             <a:endParaRPr lang="de-DE" dirty="0"/>
           </a:p>
@@ -27444,7 +28018,7 @@
 </p:sld>
 </file>
 
-<file path=ppt/slides/slide55.xml><?xml version="1.0" encoding="utf-8"?>
+<file path=ppt/slides/slide56.xml><?xml version="1.0" encoding="utf-8"?>
 <p:sld xmlns:a="http://schemas.openxmlformats.org/drawingml/2006/main" xmlns:r="http://schemas.openxmlformats.org/officeDocument/2006/relationships" xmlns:p="http://schemas.openxmlformats.org/presentationml/2006/main" show="0">
   <p:cSld>
     <p:spTree>
@@ -27479,7 +28053,7 @@
             <a:fld id="{57D12BB6-0ED4-46B6-AB23-7758AD07EFBF}" type="slidenum">
               <a:rPr lang="de-DE" smtClean="0"/>
               <a:pPr/>
-              <a:t>55</a:t>
+              <a:t>56</a:t>
             </a:fld>
             <a:endParaRPr lang="de-DE" dirty="0"/>
           </a:p>

</xml_diff>